<commit_message>
Adding RQs to new slide
</commit_message>
<xml_diff>
--- a/Presentations/Supervisor Meetings/2024/Upcoming Meeting.pptx
+++ b/Presentations/Supervisor Meetings/2024/Upcoming Meeting.pptx
@@ -117,7 +117,7 @@
 <file path=ppt/revisionInfo.xml><?xml version="1.0" encoding="utf-8"?>
 <p1510:revInfo xmlns:a="http://schemas.openxmlformats.org/drawingml/2006/main" xmlns:r="http://schemas.openxmlformats.org/officeDocument/2006/relationships" xmlns:p1510="http://schemas.microsoft.com/office/powerpoint/2015/10/main">
   <p1510:revLst>
-    <p1510:client id="{B7574C7C-3686-460F-9B9F-2A9122AA95F8}" v="22" dt="2024-02-13T20:16:58.468"/>
+    <p1510:client id="{B7574C7C-3686-460F-9B9F-2A9122AA95F8}" v="32" dt="2024-02-16T15:23:47.806"/>
   </p1510:revLst>
 </p1510:revInfo>
 </file>
@@ -1478,7 +1478,7 @@
   <pc:docChgLst>
     <pc:chgData name="Sean O Fithcheallaigh" userId="47659c31-a575-4792-8be3-61268c4ee0d6" providerId="ADAL" clId="{B7574C7C-3686-460F-9B9F-2A9122AA95F8}"/>
     <pc:docChg chg="undo custSel addSld delSld modSld modMainMaster">
-      <pc:chgData name="Sean O Fithcheallaigh" userId="47659c31-a575-4792-8be3-61268c4ee0d6" providerId="ADAL" clId="{B7574C7C-3686-460F-9B9F-2A9122AA95F8}" dt="2024-02-13T21:34:41.910" v="1208" actId="20577"/>
+      <pc:chgData name="Sean O Fithcheallaigh" userId="47659c31-a575-4792-8be3-61268c4ee0d6" providerId="ADAL" clId="{B7574C7C-3686-460F-9B9F-2A9122AA95F8}" dt="2024-02-16T15:26:36.337" v="1800" actId="122"/>
       <pc:docMkLst>
         <pc:docMk/>
       </pc:docMkLst>
@@ -1498,7 +1498,7 @@
         </pc:spChg>
       </pc:sldChg>
       <pc:sldChg chg="addSp delSp modSp mod">
-        <pc:chgData name="Sean O Fithcheallaigh" userId="47659c31-a575-4792-8be3-61268c4ee0d6" providerId="ADAL" clId="{B7574C7C-3686-460F-9B9F-2A9122AA95F8}" dt="2024-02-12T21:08:34.338" v="270" actId="1076"/>
+        <pc:chgData name="Sean O Fithcheallaigh" userId="47659c31-a575-4792-8be3-61268c4ee0d6" providerId="ADAL" clId="{B7574C7C-3686-460F-9B9F-2A9122AA95F8}" dt="2024-02-16T14:57:22.743" v="1212" actId="1076"/>
         <pc:sldMkLst>
           <pc:docMk/>
           <pc:sldMk cId="3126834720" sldId="257"/>
@@ -1623,6 +1623,14 @@
             <ac:graphicFrameMk id="12" creationId="{A5A4C080-DB32-26A6-3579-42B671D802FD}"/>
           </ac:graphicFrameMkLst>
         </pc:graphicFrameChg>
+        <pc:picChg chg="add mod">
+          <ac:chgData name="Sean O Fithcheallaigh" userId="47659c31-a575-4792-8be3-61268c4ee0d6" providerId="ADAL" clId="{B7574C7C-3686-460F-9B9F-2A9122AA95F8}" dt="2024-02-16T14:57:22.743" v="1212" actId="1076"/>
+          <ac:picMkLst>
+            <pc:docMk/>
+            <pc:sldMk cId="3126834720" sldId="257"/>
+            <ac:picMk id="4" creationId="{C91C3543-115C-A4F3-BC64-B38A1BD0D772}"/>
+          </ac:picMkLst>
+        </pc:picChg>
         <pc:picChg chg="add del mod">
           <ac:chgData name="Sean O Fithcheallaigh" userId="47659c31-a575-4792-8be3-61268c4ee0d6" providerId="ADAL" clId="{B7574C7C-3686-460F-9B9F-2A9122AA95F8}" dt="2024-02-12T19:49:22.881" v="20" actId="478"/>
           <ac:picMkLst>
@@ -1647,8 +1655,8 @@
             <ac:picMk id="24" creationId="{0DD4D4B0-0A52-1DF7-B880-785EA01EC5FA}"/>
           </ac:picMkLst>
         </pc:picChg>
-        <pc:picChg chg="add mod">
-          <ac:chgData name="Sean O Fithcheallaigh" userId="47659c31-a575-4792-8be3-61268c4ee0d6" providerId="ADAL" clId="{B7574C7C-3686-460F-9B9F-2A9122AA95F8}" dt="2024-02-12T21:07:07.750" v="226" actId="1076"/>
+        <pc:picChg chg="add del mod">
+          <ac:chgData name="Sean O Fithcheallaigh" userId="47659c31-a575-4792-8be3-61268c4ee0d6" providerId="ADAL" clId="{B7574C7C-3686-460F-9B9F-2A9122AA95F8}" dt="2024-02-16T14:57:20.042" v="1211" actId="478"/>
           <ac:picMkLst>
             <pc:docMk/>
             <pc:sldMk cId="3126834720" sldId="257"/>
@@ -1684,14 +1692,14 @@
           <pc:sldMk cId="317938089" sldId="261"/>
         </pc:sldMkLst>
       </pc:sldChg>
-      <pc:sldChg chg="addSp delSp modSp new mod">
-        <pc:chgData name="Sean O Fithcheallaigh" userId="47659c31-a575-4792-8be3-61268c4ee0d6" providerId="ADAL" clId="{B7574C7C-3686-460F-9B9F-2A9122AA95F8}" dt="2024-02-13T21:34:41.910" v="1208" actId="20577"/>
+      <pc:sldChg chg="addSp delSp modSp new mod chgLayout">
+        <pc:chgData name="Sean O Fithcheallaigh" userId="47659c31-a575-4792-8be3-61268c4ee0d6" providerId="ADAL" clId="{B7574C7C-3686-460F-9B9F-2A9122AA95F8}" dt="2024-02-16T15:26:36.337" v="1800" actId="122"/>
         <pc:sldMkLst>
           <pc:docMk/>
           <pc:sldMk cId="2974212779" sldId="262"/>
         </pc:sldMkLst>
-        <pc:spChg chg="mod">
-          <ac:chgData name="Sean O Fithcheallaigh" userId="47659c31-a575-4792-8be3-61268c4ee0d6" providerId="ADAL" clId="{B7574C7C-3686-460F-9B9F-2A9122AA95F8}" dt="2024-02-13T20:04:25.423" v="289" actId="20577"/>
+        <pc:spChg chg="mod ord">
+          <ac:chgData name="Sean O Fithcheallaigh" userId="47659c31-a575-4792-8be3-61268c4ee0d6" providerId="ADAL" clId="{B7574C7C-3686-460F-9B9F-2A9122AA95F8}" dt="2024-02-16T15:26:36.337" v="1800" actId="122"/>
           <ac:spMkLst>
             <pc:docMk/>
             <pc:sldMk cId="2974212779" sldId="262"/>
@@ -1706,8 +1714,104 @@
             <ac:spMk id="3" creationId="{2D3412BC-DD0F-EA80-C9A0-D9F40F09173D}"/>
           </ac:spMkLst>
         </pc:spChg>
-        <pc:graphicFrameChg chg="add mod ord modGraphic">
-          <ac:chgData name="Sean O Fithcheallaigh" userId="47659c31-a575-4792-8be3-61268c4ee0d6" providerId="ADAL" clId="{B7574C7C-3686-460F-9B9F-2A9122AA95F8}" dt="2024-02-13T21:34:41.910" v="1208" actId="20577"/>
+        <pc:spChg chg="add del mod">
+          <ac:chgData name="Sean O Fithcheallaigh" userId="47659c31-a575-4792-8be3-61268c4ee0d6" providerId="ADAL" clId="{B7574C7C-3686-460F-9B9F-2A9122AA95F8}" dt="2024-02-16T15:09:44.619" v="1445" actId="478"/>
+          <ac:spMkLst>
+            <pc:docMk/>
+            <pc:sldMk cId="2974212779" sldId="262"/>
+            <ac:spMk id="3" creationId="{51F93FA8-3939-B691-B925-DB5285307CE7}"/>
+          </ac:spMkLst>
+        </pc:spChg>
+        <pc:spChg chg="add del mod">
+          <ac:chgData name="Sean O Fithcheallaigh" userId="47659c31-a575-4792-8be3-61268c4ee0d6" providerId="ADAL" clId="{B7574C7C-3686-460F-9B9F-2A9122AA95F8}" dt="2024-02-16T15:09:58.157" v="1450" actId="478"/>
+          <ac:spMkLst>
+            <pc:docMk/>
+            <pc:sldMk cId="2974212779" sldId="262"/>
+            <ac:spMk id="6" creationId="{4285F86F-BA5A-8281-4E6D-39A7AEF6D97A}"/>
+          </ac:spMkLst>
+        </pc:spChg>
+        <pc:spChg chg="add mod">
+          <ac:chgData name="Sean O Fithcheallaigh" userId="47659c31-a575-4792-8be3-61268c4ee0d6" providerId="ADAL" clId="{B7574C7C-3686-460F-9B9F-2A9122AA95F8}" dt="2024-02-16T15:20:27.339" v="1597" actId="1076"/>
+          <ac:spMkLst>
+            <pc:docMk/>
+            <pc:sldMk cId="2974212779" sldId="262"/>
+            <ac:spMk id="8" creationId="{E62E95DE-1F47-7F82-7AE9-6E0238820223}"/>
+          </ac:spMkLst>
+        </pc:spChg>
+        <pc:spChg chg="add mod">
+          <ac:chgData name="Sean O Fithcheallaigh" userId="47659c31-a575-4792-8be3-61268c4ee0d6" providerId="ADAL" clId="{B7574C7C-3686-460F-9B9F-2A9122AA95F8}" dt="2024-02-16T15:25:58.234" v="1793" actId="1076"/>
+          <ac:spMkLst>
+            <pc:docMk/>
+            <pc:sldMk cId="2974212779" sldId="262"/>
+            <ac:spMk id="10" creationId="{7ADD75FB-3E51-CABF-D1C7-E1417E081915}"/>
+          </ac:spMkLst>
+        </pc:spChg>
+        <pc:spChg chg="add del mod">
+          <ac:chgData name="Sean O Fithcheallaigh" userId="47659c31-a575-4792-8be3-61268c4ee0d6" providerId="ADAL" clId="{B7574C7C-3686-460F-9B9F-2A9122AA95F8}" dt="2024-02-16T15:10:24.217" v="1459" actId="478"/>
+          <ac:spMkLst>
+            <pc:docMk/>
+            <pc:sldMk cId="2974212779" sldId="262"/>
+            <ac:spMk id="12" creationId="{9DBD96AD-1B54-B48A-174D-8682810F84E0}"/>
+          </ac:spMkLst>
+        </pc:spChg>
+        <pc:spChg chg="add mod">
+          <ac:chgData name="Sean O Fithcheallaigh" userId="47659c31-a575-4792-8be3-61268c4ee0d6" providerId="ADAL" clId="{B7574C7C-3686-460F-9B9F-2A9122AA95F8}" dt="2024-02-16T15:20:25.026" v="1596" actId="1076"/>
+          <ac:spMkLst>
+            <pc:docMk/>
+            <pc:sldMk cId="2974212779" sldId="262"/>
+            <ac:spMk id="13" creationId="{5C025563-8660-1FD1-DCD9-043A3F3BBD94}"/>
+          </ac:spMkLst>
+        </pc:spChg>
+        <pc:spChg chg="add mod">
+          <ac:chgData name="Sean O Fithcheallaigh" userId="47659c31-a575-4792-8be3-61268c4ee0d6" providerId="ADAL" clId="{B7574C7C-3686-460F-9B9F-2A9122AA95F8}" dt="2024-02-16T15:25:51.110" v="1791" actId="1076"/>
+          <ac:spMkLst>
+            <pc:docMk/>
+            <pc:sldMk cId="2974212779" sldId="262"/>
+            <ac:spMk id="14" creationId="{D9D0AB5B-65B7-2487-EF79-97B298F3FB34}"/>
+          </ac:spMkLst>
+        </pc:spChg>
+        <pc:spChg chg="add mod">
+          <ac:chgData name="Sean O Fithcheallaigh" userId="47659c31-a575-4792-8be3-61268c4ee0d6" providerId="ADAL" clId="{B7574C7C-3686-460F-9B9F-2A9122AA95F8}" dt="2024-02-16T15:25:53.774" v="1792" actId="1076"/>
+          <ac:spMkLst>
+            <pc:docMk/>
+            <pc:sldMk cId="2974212779" sldId="262"/>
+            <ac:spMk id="15" creationId="{A073518C-85F6-E23E-B2B9-0105D35E8078}"/>
+          </ac:spMkLst>
+        </pc:spChg>
+        <pc:spChg chg="add mod">
+          <ac:chgData name="Sean O Fithcheallaigh" userId="47659c31-a575-4792-8be3-61268c4ee0d6" providerId="ADAL" clId="{B7574C7C-3686-460F-9B9F-2A9122AA95F8}" dt="2024-02-16T15:20:22.258" v="1595" actId="1076"/>
+          <ac:spMkLst>
+            <pc:docMk/>
+            <pc:sldMk cId="2974212779" sldId="262"/>
+            <ac:spMk id="16" creationId="{7FEFDBC4-98A8-7C96-563D-DC6799A0BC52}"/>
+          </ac:spMkLst>
+        </pc:spChg>
+        <pc:spChg chg="add mod">
+          <ac:chgData name="Sean O Fithcheallaigh" userId="47659c31-a575-4792-8be3-61268c4ee0d6" providerId="ADAL" clId="{B7574C7C-3686-460F-9B9F-2A9122AA95F8}" dt="2024-02-16T15:26:26.362" v="1798" actId="1076"/>
+          <ac:spMkLst>
+            <pc:docMk/>
+            <pc:sldMk cId="2974212779" sldId="262"/>
+            <ac:spMk id="17" creationId="{EB4D7126-56C1-F57F-BC03-FB969A2EBA95}"/>
+          </ac:spMkLst>
+        </pc:spChg>
+        <pc:spChg chg="add mod">
+          <ac:chgData name="Sean O Fithcheallaigh" userId="47659c31-a575-4792-8be3-61268c4ee0d6" providerId="ADAL" clId="{B7574C7C-3686-460F-9B9F-2A9122AA95F8}" dt="2024-02-16T15:26:18.610" v="1796" actId="1076"/>
+          <ac:spMkLst>
+            <pc:docMk/>
+            <pc:sldMk cId="2974212779" sldId="262"/>
+            <ac:spMk id="18" creationId="{AAB7BBFE-E7BF-F713-3D50-5C45479A7548}"/>
+          </ac:spMkLst>
+        </pc:spChg>
+        <pc:spChg chg="add mod">
+          <ac:chgData name="Sean O Fithcheallaigh" userId="47659c31-a575-4792-8be3-61268c4ee0d6" providerId="ADAL" clId="{B7574C7C-3686-460F-9B9F-2A9122AA95F8}" dt="2024-02-16T15:26:20.953" v="1797" actId="1076"/>
+          <ac:spMkLst>
+            <pc:docMk/>
+            <pc:sldMk cId="2974212779" sldId="262"/>
+            <ac:spMk id="19" creationId="{19D8ABCD-558E-12FD-A869-7CB2DE308229}"/>
+          </ac:spMkLst>
+        </pc:spChg>
+        <pc:graphicFrameChg chg="add del mod ord modGraphic">
+          <ac:chgData name="Sean O Fithcheallaigh" userId="47659c31-a575-4792-8be3-61268c4ee0d6" providerId="ADAL" clId="{B7574C7C-3686-460F-9B9F-2A9122AA95F8}" dt="2024-02-16T15:10:19.808" v="1458" actId="478"/>
           <ac:graphicFrameMkLst>
             <pc:docMk/>
             <pc:sldMk cId="2974212779" sldId="262"/>
@@ -2018,7 +2122,7 @@
           <a:p>
             <a:fld id="{0CD94E99-FA29-4EFF-88BE-3447E30E8C4D}" type="datetimeFigureOut">
               <a:rPr lang="en-GB" smtClean="0"/>
-              <a:t>13/02/2024</a:t>
+              <a:t>16/02/2024</a:t>
             </a:fld>
             <a:endParaRPr lang="en-GB"/>
           </a:p>
@@ -2226,7 +2330,7 @@
           <a:p>
             <a:fld id="{0CD94E99-FA29-4EFF-88BE-3447E30E8C4D}" type="datetimeFigureOut">
               <a:rPr lang="en-GB" smtClean="0"/>
-              <a:t>13/02/2024</a:t>
+              <a:t>16/02/2024</a:t>
             </a:fld>
             <a:endParaRPr lang="en-GB"/>
           </a:p>
@@ -2484,7 +2588,7 @@
           <a:p>
             <a:fld id="{0CD94E99-FA29-4EFF-88BE-3447E30E8C4D}" type="datetimeFigureOut">
               <a:rPr lang="en-GB" smtClean="0"/>
-              <a:t>13/02/2024</a:t>
+              <a:t>16/02/2024</a:t>
             </a:fld>
             <a:endParaRPr lang="en-GB"/>
           </a:p>
@@ -2662,7 +2766,7 @@
           <a:p>
             <a:fld id="{0CD94E99-FA29-4EFF-88BE-3447E30E8C4D}" type="datetimeFigureOut">
               <a:rPr lang="en-GB" smtClean="0"/>
-              <a:t>13/02/2024</a:t>
+              <a:t>16/02/2024</a:t>
             </a:fld>
             <a:endParaRPr lang="en-GB"/>
           </a:p>
@@ -2999,7 +3103,7 @@
           <a:p>
             <a:fld id="{0CD94E99-FA29-4EFF-88BE-3447E30E8C4D}" type="datetimeFigureOut">
               <a:rPr lang="en-GB" smtClean="0"/>
-              <a:t>13/02/2024</a:t>
+              <a:t>16/02/2024</a:t>
             </a:fld>
             <a:endParaRPr lang="en-GB"/>
           </a:p>
@@ -3279,7 +3383,7 @@
           <a:p>
             <a:fld id="{0CD94E99-FA29-4EFF-88BE-3447E30E8C4D}" type="datetimeFigureOut">
               <a:rPr lang="en-GB" smtClean="0"/>
-              <a:t>13/02/2024</a:t>
+              <a:t>16/02/2024</a:t>
             </a:fld>
             <a:endParaRPr lang="en-GB"/>
           </a:p>
@@ -3658,7 +3762,7 @@
           <a:p>
             <a:fld id="{0CD94E99-FA29-4EFF-88BE-3447E30E8C4D}" type="datetimeFigureOut">
               <a:rPr lang="en-GB" smtClean="0"/>
-              <a:t>13/02/2024</a:t>
+              <a:t>16/02/2024</a:t>
             </a:fld>
             <a:endParaRPr lang="en-GB"/>
           </a:p>
@@ -3776,7 +3880,7 @@
           <a:p>
             <a:fld id="{0CD94E99-FA29-4EFF-88BE-3447E30E8C4D}" type="datetimeFigureOut">
               <a:rPr lang="en-GB" smtClean="0"/>
-              <a:t>13/02/2024</a:t>
+              <a:t>16/02/2024</a:t>
             </a:fld>
             <a:endParaRPr lang="en-GB"/>
           </a:p>
@@ -3949,7 +4053,7 @@
           <a:p>
             <a:fld id="{0CD94E99-FA29-4EFF-88BE-3447E30E8C4D}" type="datetimeFigureOut">
               <a:rPr lang="en-GB" smtClean="0"/>
-              <a:t>13/02/2024</a:t>
+              <a:t>16/02/2024</a:t>
             </a:fld>
             <a:endParaRPr lang="en-GB"/>
           </a:p>
@@ -4305,7 +4409,7 @@
           <a:p>
             <a:fld id="{0CD94E99-FA29-4EFF-88BE-3447E30E8C4D}" type="datetimeFigureOut">
               <a:rPr lang="en-GB" smtClean="0"/>
-              <a:t>13/02/2024</a:t>
+              <a:t>16/02/2024</a:t>
             </a:fld>
             <a:endParaRPr lang="en-GB"/>
           </a:p>
@@ -4684,7 +4788,7 @@
           <a:p>
             <a:fld id="{0CD94E99-FA29-4EFF-88BE-3447E30E8C4D}" type="datetimeFigureOut">
               <a:rPr lang="en-GB" smtClean="0"/>
-              <a:t>13/02/2024</a:t>
+              <a:t>16/02/2024</a:t>
             </a:fld>
             <a:endParaRPr lang="en-GB"/>
           </a:p>
@@ -4973,7 +5077,7 @@
           <a:p>
             <a:fld id="{0CD94E99-FA29-4EFF-88BE-3447E30E8C4D}" type="datetimeFigureOut">
               <a:rPr lang="en-GB" smtClean="0"/>
-              <a:t>13/02/2024</a:t>
+              <a:t>16/02/2024</a:t>
             </a:fld>
             <a:endParaRPr lang="en-GB"/>
           </a:p>
@@ -6010,12 +6114,48 @@
           </a:p>
         </p:txBody>
       </p:sp>
+      <p:sp>
+        <p:nvSpPr>
+          <p:cNvPr id="28" name="TextBox 27">
+            <a:extLst>
+              <a:ext uri="{FF2B5EF4-FFF2-40B4-BE49-F238E27FC236}">
+                <a16:creationId xmlns:a16="http://schemas.microsoft.com/office/drawing/2014/main" id="{96652C29-5EF2-FFC2-5E0D-819921E7E15A}"/>
+              </a:ext>
+            </a:extLst>
+          </p:cNvPr>
+          <p:cNvSpPr txBox="1"/>
+          <p:nvPr/>
+        </p:nvSpPr>
+        <p:spPr>
+          <a:xfrm>
+            <a:off x="8654658" y="4469258"/>
+            <a:ext cx="1951753" cy="369332"/>
+          </a:xfrm>
+          <a:prstGeom prst="rect">
+            <a:avLst/>
+          </a:prstGeom>
+          <a:noFill/>
+        </p:spPr>
+        <p:txBody>
+          <a:bodyPr wrap="none" rtlCol="0">
+            <a:spAutoFit/>
+          </a:bodyPr>
+          <a:lstStyle/>
+          <a:p>
+            <a:pPr algn="ctr"/>
+            <a:r>
+              <a:rPr lang="en-US" dirty="0"/>
+              <a:t>ARTICLE SEARCHES</a:t>
+            </a:r>
+          </a:p>
+        </p:txBody>
+      </p:sp>
       <p:pic>
         <p:nvPicPr>
-          <p:cNvPr id="26" name="Graphic 25" descr="Newspaper with solid fill">
+          <p:cNvPr id="4" name="Graphic 3" descr="Document outline">
             <a:extLst>
               <a:ext uri="{FF2B5EF4-FFF2-40B4-BE49-F238E27FC236}">
-                <a16:creationId xmlns:a16="http://schemas.microsoft.com/office/drawing/2014/main" id="{28C865F2-E07A-5A6F-E23E-F58FAAF85216}"/>
+                <a16:creationId xmlns:a16="http://schemas.microsoft.com/office/drawing/2014/main" id="{C91C3543-115C-A4F3-BC64-B38A1BD0D772}"/>
               </a:ext>
             </a:extLst>
           </p:cNvPr>
@@ -6041,7 +6181,7 @@
         </p:blipFill>
         <p:spPr>
           <a:xfrm>
-            <a:off x="9114206" y="2971799"/>
+            <a:off x="9173334" y="2971799"/>
             <a:ext cx="914400" cy="914400"/>
           </a:xfrm>
           <a:prstGeom prst="rect">
@@ -6049,42 +6189,6 @@
           </a:prstGeom>
         </p:spPr>
       </p:pic>
-      <p:sp>
-        <p:nvSpPr>
-          <p:cNvPr id="28" name="TextBox 27">
-            <a:extLst>
-              <a:ext uri="{FF2B5EF4-FFF2-40B4-BE49-F238E27FC236}">
-                <a16:creationId xmlns:a16="http://schemas.microsoft.com/office/drawing/2014/main" id="{96652C29-5EF2-FFC2-5E0D-819921E7E15A}"/>
-              </a:ext>
-            </a:extLst>
-          </p:cNvPr>
-          <p:cNvSpPr txBox="1"/>
-          <p:nvPr/>
-        </p:nvSpPr>
-        <p:spPr>
-          <a:xfrm>
-            <a:off x="8654658" y="4469258"/>
-            <a:ext cx="1951753" cy="369332"/>
-          </a:xfrm>
-          <a:prstGeom prst="rect">
-            <a:avLst/>
-          </a:prstGeom>
-          <a:noFill/>
-        </p:spPr>
-        <p:txBody>
-          <a:bodyPr wrap="none" rtlCol="0">
-            <a:spAutoFit/>
-          </a:bodyPr>
-          <a:lstStyle/>
-          <a:p>
-            <a:pPr algn="ctr"/>
-            <a:r>
-              <a:rPr lang="en-US" dirty="0"/>
-              <a:t>ARTICLE SEARCHES</a:t>
-            </a:r>
-          </a:p>
-        </p:txBody>
-      </p:sp>
     </p:spTree>
     <p:extLst>
       <p:ext uri="{BB962C8B-B14F-4D97-AF65-F5344CB8AC3E}">
@@ -6136,201 +6240,400 @@
           <a:bodyPr/>
           <a:lstStyle/>
           <a:p>
+            <a:pPr algn="ctr"/>
             <a:r>
               <a:rPr lang="en-US" dirty="0"/>
-              <a:t>Research Question</a:t>
+              <a:t>Research Questions</a:t>
             </a:r>
             <a:endParaRPr lang="en-GB" dirty="0"/>
           </a:p>
         </p:txBody>
       </p:sp>
-      <p:graphicFrame>
-        <p:nvGraphicFramePr>
-          <p:cNvPr id="4" name="Content Placeholder 3">
+      <p:sp>
+        <p:nvSpPr>
+          <p:cNvPr id="8" name="TextBox 7">
             <a:extLst>
               <a:ext uri="{FF2B5EF4-FFF2-40B4-BE49-F238E27FC236}">
-                <a16:creationId xmlns:a16="http://schemas.microsoft.com/office/drawing/2014/main" id="{214AC544-048D-9AC6-C15B-95DB87E65341}"/>
+                <a16:creationId xmlns:a16="http://schemas.microsoft.com/office/drawing/2014/main" id="{E62E95DE-1F47-7F82-7AE9-6E0238820223}"/>
               </a:ext>
             </a:extLst>
           </p:cNvPr>
-          <p:cNvGraphicFramePr>
-            <a:graphicFrameLocks noGrp="1"/>
-          </p:cNvGraphicFramePr>
-          <p:nvPr>
-            <p:ph idx="1"/>
-            <p:extLst>
-              <p:ext uri="{D42A27DB-BD31-4B8C-83A1-F6EECF244321}">
-                <p14:modId xmlns:p14="http://schemas.microsoft.com/office/powerpoint/2010/main" val="321224982"/>
-              </p:ext>
-            </p:extLst>
-          </p:nvPr>
-        </p:nvGraphicFramePr>
-        <p:xfrm>
-          <a:off x="1096963" y="1846263"/>
-          <a:ext cx="10058400" cy="2844800"/>
-        </p:xfrm>
-        <a:graphic>
-          <a:graphicData uri="http://schemas.openxmlformats.org/drawingml/2006/table">
-            <a:tbl>
-              <a:tblPr firstRow="1" bandRow="1">
-                <a:tableStyleId>{5C22544A-7EE6-4342-B048-85BDC9FD1C3A}</a:tableStyleId>
-              </a:tblPr>
-              <a:tblGrid>
-                <a:gridCol w="1029788">
-                  <a:extLst>
-                    <a:ext uri="{9D8B030D-6E8A-4147-A177-3AD203B41FA5}">
-                      <a16:colId xmlns:a16="http://schemas.microsoft.com/office/drawing/2014/main" val="2982368362"/>
-                    </a:ext>
-                  </a:extLst>
-                </a:gridCol>
-                <a:gridCol w="9028612">
-                  <a:extLst>
-                    <a:ext uri="{9D8B030D-6E8A-4147-A177-3AD203B41FA5}">
-                      <a16:colId xmlns:a16="http://schemas.microsoft.com/office/drawing/2014/main" val="3194187255"/>
-                    </a:ext>
-                  </a:extLst>
-                </a:gridCol>
-              </a:tblGrid>
-              <a:tr h="370840">
-                <a:tc>
-                  <a:txBody>
-                    <a:bodyPr/>
-                    <a:lstStyle/>
-                    <a:p>
-                      <a:r>
-                        <a:rPr lang="en-US" dirty="0"/>
-                        <a:t>Number</a:t>
-                      </a:r>
-                      <a:endParaRPr lang="en-GB" dirty="0"/>
-                    </a:p>
-                  </a:txBody>
-                  <a:tcPr/>
-                </a:tc>
-                <a:tc>
-                  <a:txBody>
-                    <a:bodyPr/>
-                    <a:lstStyle/>
-                    <a:p>
-                      <a:r>
-                        <a:rPr lang="en-US" dirty="0"/>
-                        <a:t>Research Question</a:t>
-                      </a:r>
-                      <a:endParaRPr lang="en-GB" dirty="0"/>
-                    </a:p>
-                  </a:txBody>
-                  <a:tcPr/>
-                </a:tc>
-                <a:extLst>
-                  <a:ext uri="{0D108BD9-81ED-4DB2-BD59-A6C34878D82A}">
-                    <a16:rowId xmlns:a16="http://schemas.microsoft.com/office/drawing/2014/main" val="2797290972"/>
-                  </a:ext>
-                </a:extLst>
-              </a:tr>
-              <a:tr h="370840">
-                <a:tc>
-                  <a:txBody>
-                    <a:bodyPr/>
-                    <a:lstStyle/>
-                    <a:p>
-                      <a:r>
-                        <a:rPr lang="en-US" dirty="0"/>
-                        <a:t>1</a:t>
-                      </a:r>
-                      <a:endParaRPr lang="en-GB" dirty="0"/>
-                    </a:p>
-                  </a:txBody>
-                  <a:tcPr/>
-                </a:tc>
-                <a:tc>
-                  <a:txBody>
-                    <a:bodyPr/>
-                    <a:lstStyle/>
-                    <a:p>
-                      <a:r>
-                        <a:rPr lang="en-US" dirty="0"/>
-                        <a:t>With the ever-increasing use of IoT devices, can FL algorithms or tools be designed to operate specifically on resources Edge devices to minimize computational and communications costs. The models will have to be adaptable to non independently and identically distributed data (IID)</a:t>
-                      </a:r>
-                      <a:endParaRPr lang="en-GB" dirty="0"/>
-                    </a:p>
-                  </a:txBody>
-                  <a:tcPr/>
-                </a:tc>
-                <a:extLst>
-                  <a:ext uri="{0D108BD9-81ED-4DB2-BD59-A6C34878D82A}">
-                    <a16:rowId xmlns:a16="http://schemas.microsoft.com/office/drawing/2014/main" val="2730460639"/>
-                  </a:ext>
-                </a:extLst>
-              </a:tr>
-              <a:tr h="370840">
-                <a:tc>
-                  <a:txBody>
-                    <a:bodyPr/>
-                    <a:lstStyle/>
-                    <a:p>
-                      <a:r>
-                        <a:rPr lang="en-US" dirty="0"/>
-                        <a:t>2</a:t>
-                      </a:r>
-                      <a:endParaRPr lang="en-GB" dirty="0"/>
-                    </a:p>
-                  </a:txBody>
-                  <a:tcPr/>
-                </a:tc>
-                <a:tc>
-                  <a:txBody>
-                    <a:bodyPr/>
-                    <a:lstStyle/>
-                    <a:p>
-                      <a:r>
-                        <a:rPr lang="en-US" dirty="0"/>
-                        <a:t>In any large distributed network, there is a chance that some nodes can be lost, due to a range of issues, such as loss of power, lost of connection and so on. Can a FL architecture be designed that can identify the missing nodes, and adapt </a:t>
-                      </a:r>
-                      <a:r>
-                        <a:rPr lang="en-US"/>
-                        <a:t>so that </a:t>
-                      </a:r>
-                      <a:endParaRPr lang="en-GB" dirty="0"/>
-                    </a:p>
-                  </a:txBody>
-                  <a:tcPr/>
-                </a:tc>
-                <a:extLst>
-                  <a:ext uri="{0D108BD9-81ED-4DB2-BD59-A6C34878D82A}">
-                    <a16:rowId xmlns:a16="http://schemas.microsoft.com/office/drawing/2014/main" val="3648500703"/>
-                  </a:ext>
-                </a:extLst>
-              </a:tr>
-              <a:tr h="370840">
-                <a:tc>
-                  <a:txBody>
-                    <a:bodyPr/>
-                    <a:lstStyle/>
-                    <a:p>
-                      <a:endParaRPr lang="en-GB"/>
-                    </a:p>
-                  </a:txBody>
-                  <a:tcPr/>
-                </a:tc>
-                <a:tc>
-                  <a:txBody>
-                    <a:bodyPr/>
-                    <a:lstStyle/>
-                    <a:p>
-                      <a:endParaRPr lang="en-GB" dirty="0"/>
-                    </a:p>
-                  </a:txBody>
-                  <a:tcPr/>
-                </a:tc>
-                <a:extLst>
-                  <a:ext uri="{0D108BD9-81ED-4DB2-BD59-A6C34878D82A}">
-                    <a16:rowId xmlns:a16="http://schemas.microsoft.com/office/drawing/2014/main" val="1517453135"/>
-                  </a:ext>
-                </a:extLst>
-              </a:tr>
-            </a:tbl>
-          </a:graphicData>
-        </a:graphic>
-      </p:graphicFrame>
+          <p:cNvSpPr txBox="1"/>
+          <p:nvPr/>
+        </p:nvSpPr>
+        <p:spPr>
+          <a:xfrm>
+            <a:off x="5862556" y="3559822"/>
+            <a:ext cx="6094520" cy="1167503"/>
+          </a:xfrm>
+          <a:prstGeom prst="rect">
+            <a:avLst/>
+          </a:prstGeom>
+          <a:noFill/>
+        </p:spPr>
+        <p:txBody>
+          <a:bodyPr wrap="square">
+            <a:normAutofit fontScale="92500" lnSpcReduction="20000"/>
+          </a:bodyPr>
+          <a:lstStyle/>
+          <a:p>
+            <a:pPr algn="ctr"/>
+            <a:r>
+              <a:rPr lang="en-US" dirty="0"/>
+              <a:t>With the ever-increasing use of IoT devices, </a:t>
+            </a:r>
+            <a:r>
+              <a:rPr lang="en-US" b="1" dirty="0"/>
+              <a:t>can FL algorithms or tools be designed to operate specifically on resources Edge devices to minimize computational and communications costs</a:t>
+            </a:r>
+            <a:r>
+              <a:rPr lang="en-US" dirty="0"/>
+              <a:t>. The models should be adaptable to non independently and identically distributed data (IID). </a:t>
+            </a:r>
+          </a:p>
+          <a:p>
+            <a:endParaRPr lang="en-US" dirty="0"/>
+          </a:p>
+        </p:txBody>
+      </p:sp>
+      <p:sp>
+        <p:nvSpPr>
+          <p:cNvPr id="10" name="TextBox 9">
+            <a:extLst>
+              <a:ext uri="{FF2B5EF4-FFF2-40B4-BE49-F238E27FC236}">
+                <a16:creationId xmlns:a16="http://schemas.microsoft.com/office/drawing/2014/main" id="{7ADD75FB-3E51-CABF-D1C7-E1417E081915}"/>
+              </a:ext>
+            </a:extLst>
+          </p:cNvPr>
+          <p:cNvSpPr txBox="1"/>
+          <p:nvPr/>
+        </p:nvSpPr>
+        <p:spPr>
+          <a:xfrm>
+            <a:off x="1189434" y="2125202"/>
+            <a:ext cx="6094520" cy="1009385"/>
+          </a:xfrm>
+          <a:prstGeom prst="rect">
+            <a:avLst/>
+          </a:prstGeom>
+          <a:noFill/>
+        </p:spPr>
+        <p:txBody>
+          <a:bodyPr wrap="square">
+            <a:normAutofit fontScale="92500" lnSpcReduction="20000"/>
+          </a:bodyPr>
+          <a:lstStyle/>
+          <a:p>
+            <a:pPr algn="ctr"/>
+            <a:r>
+              <a:rPr lang="en-US" dirty="0"/>
+              <a:t>In any large distributed network, there is a chance that some nodes can be lost, for a range of reason. </a:t>
+            </a:r>
+            <a:r>
+              <a:rPr lang="en-US" b="1" dirty="0"/>
+              <a:t>Can a FL architecture be designed to be resilient, allowing it to identify missing nodes, and adapt so that there is no loss in performance? </a:t>
+            </a:r>
+            <a:endParaRPr lang="en-GB" b="1" dirty="0"/>
+          </a:p>
+        </p:txBody>
+      </p:sp>
+      <p:sp>
+        <p:nvSpPr>
+          <p:cNvPr id="13" name="Rectangle: Rounded Corners 12">
+            <a:extLst>
+              <a:ext uri="{FF2B5EF4-FFF2-40B4-BE49-F238E27FC236}">
+                <a16:creationId xmlns:a16="http://schemas.microsoft.com/office/drawing/2014/main" id="{5C025563-8660-1FD1-DCD9-043A3F3BBD94}"/>
+              </a:ext>
+            </a:extLst>
+          </p:cNvPr>
+          <p:cNvSpPr/>
+          <p:nvPr/>
+        </p:nvSpPr>
+        <p:spPr>
+          <a:xfrm>
+            <a:off x="5862556" y="3515360"/>
+            <a:ext cx="6094520" cy="1200329"/>
+          </a:xfrm>
+          <a:prstGeom prst="roundRect">
+            <a:avLst/>
+          </a:prstGeom>
+          <a:noFill/>
+        </p:spPr>
+        <p:style>
+          <a:lnRef idx="2">
+            <a:schemeClr val="accent1">
+              <a:shade val="15000"/>
+            </a:schemeClr>
+          </a:lnRef>
+          <a:fillRef idx="1">
+            <a:schemeClr val="accent1"/>
+          </a:fillRef>
+          <a:effectRef idx="0">
+            <a:schemeClr val="accent1"/>
+          </a:effectRef>
+          <a:fontRef idx="minor">
+            <a:schemeClr val="lt1"/>
+          </a:fontRef>
+        </p:style>
+        <p:txBody>
+          <a:bodyPr rtlCol="0" anchor="ctr">
+            <a:normAutofit/>
+          </a:bodyPr>
+          <a:lstStyle/>
+          <a:p>
+            <a:pPr algn="ctr"/>
+            <a:endParaRPr lang="en-GB"/>
+          </a:p>
+        </p:txBody>
+      </p:sp>
+      <p:sp>
+        <p:nvSpPr>
+          <p:cNvPr id="14" name="TextBox 13">
+            <a:extLst>
+              <a:ext uri="{FF2B5EF4-FFF2-40B4-BE49-F238E27FC236}">
+                <a16:creationId xmlns:a16="http://schemas.microsoft.com/office/drawing/2014/main" id="{D9D0AB5B-65B7-2487-EF79-97B298F3FB34}"/>
+              </a:ext>
+            </a:extLst>
+          </p:cNvPr>
+          <p:cNvSpPr txBox="1"/>
+          <p:nvPr/>
+        </p:nvSpPr>
+        <p:spPr>
+          <a:xfrm>
+            <a:off x="1097280" y="1737847"/>
+            <a:ext cx="2109488" cy="369332"/>
+          </a:xfrm>
+          <a:prstGeom prst="rect">
+            <a:avLst/>
+          </a:prstGeom>
+          <a:noFill/>
+        </p:spPr>
+        <p:txBody>
+          <a:bodyPr wrap="none" rtlCol="0">
+            <a:spAutoFit/>
+          </a:bodyPr>
+          <a:lstStyle/>
+          <a:p>
+            <a:r>
+              <a:rPr lang="en-US" dirty="0"/>
+              <a:t>Research Question 1</a:t>
+            </a:r>
+            <a:endParaRPr lang="en-GB" dirty="0"/>
+          </a:p>
+        </p:txBody>
+      </p:sp>
+      <p:sp>
+        <p:nvSpPr>
+          <p:cNvPr id="15" name="Rectangle: Rounded Corners 14">
+            <a:extLst>
+              <a:ext uri="{FF2B5EF4-FFF2-40B4-BE49-F238E27FC236}">
+                <a16:creationId xmlns:a16="http://schemas.microsoft.com/office/drawing/2014/main" id="{A073518C-85F6-E23E-B2B9-0105D35E8078}"/>
+              </a:ext>
+            </a:extLst>
+          </p:cNvPr>
+          <p:cNvSpPr/>
+          <p:nvPr/>
+        </p:nvSpPr>
+        <p:spPr>
+          <a:xfrm>
+            <a:off x="1189434" y="2114669"/>
+            <a:ext cx="6094520" cy="1009385"/>
+          </a:xfrm>
+          <a:prstGeom prst="roundRect">
+            <a:avLst/>
+          </a:prstGeom>
+          <a:noFill/>
+        </p:spPr>
+        <p:style>
+          <a:lnRef idx="2">
+            <a:schemeClr val="accent1">
+              <a:shade val="15000"/>
+            </a:schemeClr>
+          </a:lnRef>
+          <a:fillRef idx="1">
+            <a:schemeClr val="accent1"/>
+          </a:fillRef>
+          <a:effectRef idx="0">
+            <a:schemeClr val="accent1"/>
+          </a:effectRef>
+          <a:fontRef idx="minor">
+            <a:schemeClr val="lt1"/>
+          </a:fontRef>
+        </p:style>
+        <p:txBody>
+          <a:bodyPr rtlCol="0" anchor="ctr"/>
+          <a:lstStyle/>
+          <a:p>
+            <a:pPr algn="ctr"/>
+            <a:endParaRPr lang="en-GB"/>
+          </a:p>
+        </p:txBody>
+      </p:sp>
+      <p:sp>
+        <p:nvSpPr>
+          <p:cNvPr id="16" name="TextBox 15">
+            <a:extLst>
+              <a:ext uri="{FF2B5EF4-FFF2-40B4-BE49-F238E27FC236}">
+                <a16:creationId xmlns:a16="http://schemas.microsoft.com/office/drawing/2014/main" id="{7FEFDBC4-98A8-7C96-563D-DC6799A0BC52}"/>
+              </a:ext>
+            </a:extLst>
+          </p:cNvPr>
+          <p:cNvSpPr txBox="1"/>
+          <p:nvPr/>
+        </p:nvSpPr>
+        <p:spPr>
+          <a:xfrm>
+            <a:off x="8795980" y="3134392"/>
+            <a:ext cx="3161096" cy="369332"/>
+          </a:xfrm>
+          <a:prstGeom prst="rect">
+            <a:avLst/>
+          </a:prstGeom>
+          <a:noFill/>
+        </p:spPr>
+        <p:txBody>
+          <a:bodyPr wrap="square" rtlCol="0">
+            <a:spAutoFit/>
+          </a:bodyPr>
+          <a:lstStyle/>
+          <a:p>
+            <a:pPr algn="r"/>
+            <a:r>
+              <a:rPr lang="en-US" dirty="0"/>
+              <a:t>Research Question 2</a:t>
+            </a:r>
+            <a:endParaRPr lang="en-GB" dirty="0"/>
+          </a:p>
+        </p:txBody>
+      </p:sp>
+      <p:sp>
+        <p:nvSpPr>
+          <p:cNvPr id="17" name="Rectangle: Rounded Corners 16">
+            <a:extLst>
+              <a:ext uri="{FF2B5EF4-FFF2-40B4-BE49-F238E27FC236}">
+                <a16:creationId xmlns:a16="http://schemas.microsoft.com/office/drawing/2014/main" id="{EB4D7126-56C1-F57F-BC03-FB969A2EBA95}"/>
+              </a:ext>
+            </a:extLst>
+          </p:cNvPr>
+          <p:cNvSpPr/>
+          <p:nvPr/>
+        </p:nvSpPr>
+        <p:spPr>
+          <a:xfrm>
+            <a:off x="1189434" y="5106995"/>
+            <a:ext cx="6094520" cy="954485"/>
+          </a:xfrm>
+          <a:prstGeom prst="roundRect">
+            <a:avLst/>
+          </a:prstGeom>
+          <a:noFill/>
+        </p:spPr>
+        <p:style>
+          <a:lnRef idx="2">
+            <a:schemeClr val="accent1">
+              <a:shade val="15000"/>
+            </a:schemeClr>
+          </a:lnRef>
+          <a:fillRef idx="1">
+            <a:schemeClr val="accent1"/>
+          </a:fillRef>
+          <a:effectRef idx="0">
+            <a:schemeClr val="accent1"/>
+          </a:effectRef>
+          <a:fontRef idx="minor">
+            <a:schemeClr val="lt1"/>
+          </a:fontRef>
+        </p:style>
+        <p:txBody>
+          <a:bodyPr rtlCol="0" anchor="ctr">
+            <a:normAutofit/>
+          </a:bodyPr>
+          <a:lstStyle/>
+          <a:p>
+            <a:pPr algn="ctr"/>
+            <a:endParaRPr lang="en-GB"/>
+          </a:p>
+        </p:txBody>
+      </p:sp>
+      <p:sp>
+        <p:nvSpPr>
+          <p:cNvPr id="18" name="TextBox 17">
+            <a:extLst>
+              <a:ext uri="{FF2B5EF4-FFF2-40B4-BE49-F238E27FC236}">
+                <a16:creationId xmlns:a16="http://schemas.microsoft.com/office/drawing/2014/main" id="{AAB7BBFE-E7BF-F713-3D50-5C45479A7548}"/>
+              </a:ext>
+            </a:extLst>
+          </p:cNvPr>
+          <p:cNvSpPr txBox="1"/>
+          <p:nvPr/>
+        </p:nvSpPr>
+        <p:spPr>
+          <a:xfrm>
+            <a:off x="1189434" y="4715689"/>
+            <a:ext cx="3161096" cy="369332"/>
+          </a:xfrm>
+          <a:prstGeom prst="rect">
+            <a:avLst/>
+          </a:prstGeom>
+          <a:noFill/>
+        </p:spPr>
+        <p:txBody>
+          <a:bodyPr wrap="square" rtlCol="0">
+            <a:spAutoFit/>
+          </a:bodyPr>
+          <a:lstStyle/>
+          <a:p>
+            <a:r>
+              <a:rPr lang="en-US" dirty="0"/>
+              <a:t>Research Question 3</a:t>
+            </a:r>
+            <a:endParaRPr lang="en-GB" dirty="0"/>
+          </a:p>
+        </p:txBody>
+      </p:sp>
+      <p:sp>
+        <p:nvSpPr>
+          <p:cNvPr id="19" name="TextBox 18">
+            <a:extLst>
+              <a:ext uri="{FF2B5EF4-FFF2-40B4-BE49-F238E27FC236}">
+                <a16:creationId xmlns:a16="http://schemas.microsoft.com/office/drawing/2014/main" id="{19D8ABCD-558E-12FD-A869-7CB2DE308229}"/>
+              </a:ext>
+            </a:extLst>
+          </p:cNvPr>
+          <p:cNvSpPr txBox="1"/>
+          <p:nvPr/>
+        </p:nvSpPr>
+        <p:spPr>
+          <a:xfrm>
+            <a:off x="1189434" y="5106995"/>
+            <a:ext cx="6094520" cy="954484"/>
+          </a:xfrm>
+          <a:prstGeom prst="rect">
+            <a:avLst/>
+          </a:prstGeom>
+          <a:noFill/>
+        </p:spPr>
+        <p:txBody>
+          <a:bodyPr wrap="square">
+            <a:normAutofit/>
+          </a:bodyPr>
+          <a:lstStyle/>
+          <a:p>
+            <a:pPr algn="ctr"/>
+            <a:r>
+              <a:rPr lang="en-US" b="1" dirty="0"/>
+              <a:t>Can we design efficient aggregation algorithms for FL </a:t>
+            </a:r>
+            <a:r>
+              <a:rPr lang="en-US" dirty="0"/>
+              <a:t>that minimize the data exchange between clients and servers while not reducing the model accuracy?</a:t>
+            </a:r>
+          </a:p>
+          <a:p>
+            <a:endParaRPr lang="en-US" dirty="0"/>
+          </a:p>
+        </p:txBody>
+      </p:sp>
     </p:spTree>
     <p:extLst>
       <p:ext uri="{BB962C8B-B14F-4D97-AF65-F5344CB8AC3E}">

</xml_diff>

<commit_message>
Changing layout to expand on RQs
</commit_message>
<xml_diff>
--- a/Presentations/Supervisor Meetings/2024/Upcoming Meeting.pptx
+++ b/Presentations/Supervisor Meetings/2024/Upcoming Meeting.pptx
@@ -8,6 +8,9 @@
     <p:sldId id="256" r:id="rId2"/>
     <p:sldId id="257" r:id="rId3"/>
     <p:sldId id="262" r:id="rId4"/>
+    <p:sldId id="263" r:id="rId5"/>
+    <p:sldId id="264" r:id="rId6"/>
+    <p:sldId id="265" r:id="rId7"/>
   </p:sldIdLst>
   <p:sldSz cx="12192000" cy="6858000"/>
   <p:notesSz cx="6858000" cy="9144000"/>
@@ -117,7 +120,7 @@
 <file path=ppt/revisionInfo.xml><?xml version="1.0" encoding="utf-8"?>
 <p1510:revInfo xmlns:a="http://schemas.openxmlformats.org/drawingml/2006/main" xmlns:r="http://schemas.openxmlformats.org/officeDocument/2006/relationships" xmlns:p1510="http://schemas.microsoft.com/office/powerpoint/2015/10/main">
   <p1510:revLst>
-    <p1510:client id="{B7574C7C-3686-460F-9B9F-2A9122AA95F8}" v="32" dt="2024-02-16T15:23:47.806"/>
+    <p1510:client id="{B7574C7C-3686-460F-9B9F-2A9122AA95F8}" v="34" dt="2024-02-17T12:44:38.054"/>
   </p1510:revLst>
 </p1510:revInfo>
 </file>
@@ -1478,7 +1481,7 @@
   <pc:docChgLst>
     <pc:chgData name="Sean O Fithcheallaigh" userId="47659c31-a575-4792-8be3-61268c4ee0d6" providerId="ADAL" clId="{B7574C7C-3686-460F-9B9F-2A9122AA95F8}"/>
     <pc:docChg chg="undo custSel addSld delSld modSld modMainMaster">
-      <pc:chgData name="Sean O Fithcheallaigh" userId="47659c31-a575-4792-8be3-61268c4ee0d6" providerId="ADAL" clId="{B7574C7C-3686-460F-9B9F-2A9122AA95F8}" dt="2024-02-16T15:26:36.337" v="1800" actId="122"/>
+      <pc:chgData name="Sean O Fithcheallaigh" userId="47659c31-a575-4792-8be3-61268c4ee0d6" providerId="ADAL" clId="{B7574C7C-3686-460F-9B9F-2A9122AA95F8}" dt="2024-02-17T13:15:29.275" v="2050" actId="478"/>
       <pc:docMkLst>
         <pc:docMk/>
       </pc:docMkLst>
@@ -1693,7 +1696,7 @@
         </pc:sldMkLst>
       </pc:sldChg>
       <pc:sldChg chg="addSp delSp modSp new mod chgLayout">
-        <pc:chgData name="Sean O Fithcheallaigh" userId="47659c31-a575-4792-8be3-61268c4ee0d6" providerId="ADAL" clId="{B7574C7C-3686-460F-9B9F-2A9122AA95F8}" dt="2024-02-16T15:26:36.337" v="1800" actId="122"/>
+        <pc:chgData name="Sean O Fithcheallaigh" userId="47659c31-a575-4792-8be3-61268c4ee0d6" providerId="ADAL" clId="{B7574C7C-3686-460F-9B9F-2A9122AA95F8}" dt="2024-02-17T13:15:29.275" v="2050" actId="478"/>
         <pc:sldMkLst>
           <pc:docMk/>
           <pc:sldMk cId="2974212779" sldId="262"/>
@@ -1723,6 +1726,30 @@
           </ac:spMkLst>
         </pc:spChg>
         <pc:spChg chg="add del mod">
+          <ac:chgData name="Sean O Fithcheallaigh" userId="47659c31-a575-4792-8be3-61268c4ee0d6" providerId="ADAL" clId="{B7574C7C-3686-460F-9B9F-2A9122AA95F8}" dt="2024-02-17T12:31:11.160" v="2038" actId="478"/>
+          <ac:spMkLst>
+            <pc:docMk/>
+            <pc:sldMk cId="2974212779" sldId="262"/>
+            <ac:spMk id="3" creationId="{9D8D541C-4A34-9B5C-3767-BB510E72A5C8}"/>
+          </ac:spMkLst>
+        </pc:spChg>
+        <pc:spChg chg="add del mod">
+          <ac:chgData name="Sean O Fithcheallaigh" userId="47659c31-a575-4792-8be3-61268c4ee0d6" providerId="ADAL" clId="{B7574C7C-3686-460F-9B9F-2A9122AA95F8}" dt="2024-02-17T12:31:09.723" v="2037" actId="478"/>
+          <ac:spMkLst>
+            <pc:docMk/>
+            <pc:sldMk cId="2974212779" sldId="262"/>
+            <ac:spMk id="4" creationId="{17BB8BED-0715-C37B-A2A2-8D6185F598C4}"/>
+          </ac:spMkLst>
+        </pc:spChg>
+        <pc:spChg chg="add del mod">
+          <ac:chgData name="Sean O Fithcheallaigh" userId="47659c31-a575-4792-8be3-61268c4ee0d6" providerId="ADAL" clId="{B7574C7C-3686-460F-9B9F-2A9122AA95F8}" dt="2024-02-17T13:15:29.275" v="2050" actId="478"/>
+          <ac:spMkLst>
+            <pc:docMk/>
+            <pc:sldMk cId="2974212779" sldId="262"/>
+            <ac:spMk id="5" creationId="{689E7CD9-6C77-9903-0092-EA1DA26C3946}"/>
+          </ac:spMkLst>
+        </pc:spChg>
+        <pc:spChg chg="add del mod">
           <ac:chgData name="Sean O Fithcheallaigh" userId="47659c31-a575-4792-8be3-61268c4ee0d6" providerId="ADAL" clId="{B7574C7C-3686-460F-9B9F-2A9122AA95F8}" dt="2024-02-16T15:09:58.157" v="1450" actId="478"/>
           <ac:spMkLst>
             <pc:docMk/>
@@ -1730,8 +1757,8 @@
             <ac:spMk id="6" creationId="{4285F86F-BA5A-8281-4E6D-39A7AEF6D97A}"/>
           </ac:spMkLst>
         </pc:spChg>
-        <pc:spChg chg="add mod">
-          <ac:chgData name="Sean O Fithcheallaigh" userId="47659c31-a575-4792-8be3-61268c4ee0d6" providerId="ADAL" clId="{B7574C7C-3686-460F-9B9F-2A9122AA95F8}" dt="2024-02-16T15:20:27.339" v="1597" actId="1076"/>
+        <pc:spChg chg="add del mod">
+          <ac:chgData name="Sean O Fithcheallaigh" userId="47659c31-a575-4792-8be3-61268c4ee0d6" providerId="ADAL" clId="{B7574C7C-3686-460F-9B9F-2A9122AA95F8}" dt="2024-02-17T12:31:04.058" v="2033" actId="478"/>
           <ac:spMkLst>
             <pc:docMk/>
             <pc:sldMk cId="2974212779" sldId="262"/>
@@ -1739,7 +1766,7 @@
           </ac:spMkLst>
         </pc:spChg>
         <pc:spChg chg="add mod">
-          <ac:chgData name="Sean O Fithcheallaigh" userId="47659c31-a575-4792-8be3-61268c4ee0d6" providerId="ADAL" clId="{B7574C7C-3686-460F-9B9F-2A9122AA95F8}" dt="2024-02-16T15:25:58.234" v="1793" actId="1076"/>
+          <ac:chgData name="Sean O Fithcheallaigh" userId="47659c31-a575-4792-8be3-61268c4ee0d6" providerId="ADAL" clId="{B7574C7C-3686-460F-9B9F-2A9122AA95F8}" dt="2024-02-17T12:09:00.941" v="1932" actId="27636"/>
           <ac:spMkLst>
             <pc:docMk/>
             <pc:sldMk cId="2974212779" sldId="262"/>
@@ -1754,8 +1781,8 @@
             <ac:spMk id="12" creationId="{9DBD96AD-1B54-B48A-174D-8682810F84E0}"/>
           </ac:spMkLst>
         </pc:spChg>
-        <pc:spChg chg="add mod">
-          <ac:chgData name="Sean O Fithcheallaigh" userId="47659c31-a575-4792-8be3-61268c4ee0d6" providerId="ADAL" clId="{B7574C7C-3686-460F-9B9F-2A9122AA95F8}" dt="2024-02-16T15:20:25.026" v="1596" actId="1076"/>
+        <pc:spChg chg="add del mod">
+          <ac:chgData name="Sean O Fithcheallaigh" userId="47659c31-a575-4792-8be3-61268c4ee0d6" providerId="ADAL" clId="{B7574C7C-3686-460F-9B9F-2A9122AA95F8}" dt="2024-02-17T12:31:02.358" v="2032" actId="478"/>
           <ac:spMkLst>
             <pc:docMk/>
             <pc:sldMk cId="2974212779" sldId="262"/>
@@ -1771,39 +1798,39 @@
           </ac:spMkLst>
         </pc:spChg>
         <pc:spChg chg="add mod">
-          <ac:chgData name="Sean O Fithcheallaigh" userId="47659c31-a575-4792-8be3-61268c4ee0d6" providerId="ADAL" clId="{B7574C7C-3686-460F-9B9F-2A9122AA95F8}" dt="2024-02-16T15:25:53.774" v="1792" actId="1076"/>
+          <ac:chgData name="Sean O Fithcheallaigh" userId="47659c31-a575-4792-8be3-61268c4ee0d6" providerId="ADAL" clId="{B7574C7C-3686-460F-9B9F-2A9122AA95F8}" dt="2024-02-17T12:09:06.466" v="1933" actId="14100"/>
           <ac:spMkLst>
             <pc:docMk/>
             <pc:sldMk cId="2974212779" sldId="262"/>
             <ac:spMk id="15" creationId="{A073518C-85F6-E23E-B2B9-0105D35E8078}"/>
           </ac:spMkLst>
         </pc:spChg>
-        <pc:spChg chg="add mod">
-          <ac:chgData name="Sean O Fithcheallaigh" userId="47659c31-a575-4792-8be3-61268c4ee0d6" providerId="ADAL" clId="{B7574C7C-3686-460F-9B9F-2A9122AA95F8}" dt="2024-02-16T15:20:22.258" v="1595" actId="1076"/>
+        <pc:spChg chg="add del mod">
+          <ac:chgData name="Sean O Fithcheallaigh" userId="47659c31-a575-4792-8be3-61268c4ee0d6" providerId="ADAL" clId="{B7574C7C-3686-460F-9B9F-2A9122AA95F8}" dt="2024-02-17T12:31:01.399" v="2031" actId="478"/>
           <ac:spMkLst>
             <pc:docMk/>
             <pc:sldMk cId="2974212779" sldId="262"/>
             <ac:spMk id="16" creationId="{7FEFDBC4-98A8-7C96-563D-DC6799A0BC52}"/>
           </ac:spMkLst>
         </pc:spChg>
-        <pc:spChg chg="add mod">
-          <ac:chgData name="Sean O Fithcheallaigh" userId="47659c31-a575-4792-8be3-61268c4ee0d6" providerId="ADAL" clId="{B7574C7C-3686-460F-9B9F-2A9122AA95F8}" dt="2024-02-16T15:26:26.362" v="1798" actId="1076"/>
+        <pc:spChg chg="add del mod">
+          <ac:chgData name="Sean O Fithcheallaigh" userId="47659c31-a575-4792-8be3-61268c4ee0d6" providerId="ADAL" clId="{B7574C7C-3686-460F-9B9F-2A9122AA95F8}" dt="2024-02-17T12:31:06.512" v="2035" actId="478"/>
           <ac:spMkLst>
             <pc:docMk/>
             <pc:sldMk cId="2974212779" sldId="262"/>
             <ac:spMk id="17" creationId="{EB4D7126-56C1-F57F-BC03-FB969A2EBA95}"/>
           </ac:spMkLst>
         </pc:spChg>
-        <pc:spChg chg="add mod">
-          <ac:chgData name="Sean O Fithcheallaigh" userId="47659c31-a575-4792-8be3-61268c4ee0d6" providerId="ADAL" clId="{B7574C7C-3686-460F-9B9F-2A9122AA95F8}" dt="2024-02-16T15:26:18.610" v="1796" actId="1076"/>
+        <pc:spChg chg="add del mod">
+          <ac:chgData name="Sean O Fithcheallaigh" userId="47659c31-a575-4792-8be3-61268c4ee0d6" providerId="ADAL" clId="{B7574C7C-3686-460F-9B9F-2A9122AA95F8}" dt="2024-02-17T12:31:08.298" v="2036" actId="478"/>
           <ac:spMkLst>
             <pc:docMk/>
             <pc:sldMk cId="2974212779" sldId="262"/>
             <ac:spMk id="18" creationId="{AAB7BBFE-E7BF-F713-3D50-5C45479A7548}"/>
           </ac:spMkLst>
         </pc:spChg>
-        <pc:spChg chg="add mod">
-          <ac:chgData name="Sean O Fithcheallaigh" userId="47659c31-a575-4792-8be3-61268c4ee0d6" providerId="ADAL" clId="{B7574C7C-3686-460F-9B9F-2A9122AA95F8}" dt="2024-02-16T15:26:20.953" v="1797" actId="1076"/>
+        <pc:spChg chg="add del mod">
+          <ac:chgData name="Sean O Fithcheallaigh" userId="47659c31-a575-4792-8be3-61268c4ee0d6" providerId="ADAL" clId="{B7574C7C-3686-460F-9B9F-2A9122AA95F8}" dt="2024-02-17T12:31:05.469" v="2034" actId="478"/>
           <ac:spMkLst>
             <pc:docMk/>
             <pc:sldMk cId="2974212779" sldId="262"/>
@@ -1818,6 +1845,27 @@
             <ac:graphicFrameMk id="4" creationId="{214AC544-048D-9AC6-C15B-95DB87E65341}"/>
           </ac:graphicFrameMkLst>
         </pc:graphicFrameChg>
+      </pc:sldChg>
+      <pc:sldChg chg="add">
+        <pc:chgData name="Sean O Fithcheallaigh" userId="47659c31-a575-4792-8be3-61268c4ee0d6" providerId="ADAL" clId="{B7574C7C-3686-460F-9B9F-2A9122AA95F8}" dt="2024-02-17T12:30:52.121" v="2028" actId="2890"/>
+        <pc:sldMkLst>
+          <pc:docMk/>
+          <pc:sldMk cId="2342086455" sldId="263"/>
+        </pc:sldMkLst>
+      </pc:sldChg>
+      <pc:sldChg chg="add">
+        <pc:chgData name="Sean O Fithcheallaigh" userId="47659c31-a575-4792-8be3-61268c4ee0d6" providerId="ADAL" clId="{B7574C7C-3686-460F-9B9F-2A9122AA95F8}" dt="2024-02-17T12:30:54.602" v="2029" actId="2890"/>
+        <pc:sldMkLst>
+          <pc:docMk/>
+          <pc:sldMk cId="2844604785" sldId="264"/>
+        </pc:sldMkLst>
+      </pc:sldChg>
+      <pc:sldChg chg="add">
+        <pc:chgData name="Sean O Fithcheallaigh" userId="47659c31-a575-4792-8be3-61268c4ee0d6" providerId="ADAL" clId="{B7574C7C-3686-460F-9B9F-2A9122AA95F8}" dt="2024-02-17T12:30:56.947" v="2030" actId="2890"/>
+        <pc:sldMkLst>
+          <pc:docMk/>
+          <pc:sldMk cId="3782082519" sldId="265"/>
+        </pc:sldMkLst>
       </pc:sldChg>
       <pc:sldMasterChg chg="modSldLayout">
         <pc:chgData name="Sean O Fithcheallaigh" userId="47659c31-a575-4792-8be3-61268c4ee0d6" providerId="ADAL" clId="{B7574C7C-3686-460F-9B9F-2A9122AA95F8}" dt="2024-02-13T19:56:02.820" v="272"/>
@@ -2122,7 +2170,7 @@
           <a:p>
             <a:fld id="{0CD94E99-FA29-4EFF-88BE-3447E30E8C4D}" type="datetimeFigureOut">
               <a:rPr lang="en-GB" smtClean="0"/>
-              <a:t>16/02/2024</a:t>
+              <a:t>17/02/2024</a:t>
             </a:fld>
             <a:endParaRPr lang="en-GB"/>
           </a:p>
@@ -2330,7 +2378,7 @@
           <a:p>
             <a:fld id="{0CD94E99-FA29-4EFF-88BE-3447E30E8C4D}" type="datetimeFigureOut">
               <a:rPr lang="en-GB" smtClean="0"/>
-              <a:t>16/02/2024</a:t>
+              <a:t>17/02/2024</a:t>
             </a:fld>
             <a:endParaRPr lang="en-GB"/>
           </a:p>
@@ -2588,7 +2636,7 @@
           <a:p>
             <a:fld id="{0CD94E99-FA29-4EFF-88BE-3447E30E8C4D}" type="datetimeFigureOut">
               <a:rPr lang="en-GB" smtClean="0"/>
-              <a:t>16/02/2024</a:t>
+              <a:t>17/02/2024</a:t>
             </a:fld>
             <a:endParaRPr lang="en-GB"/>
           </a:p>
@@ -2766,7 +2814,7 @@
           <a:p>
             <a:fld id="{0CD94E99-FA29-4EFF-88BE-3447E30E8C4D}" type="datetimeFigureOut">
               <a:rPr lang="en-GB" smtClean="0"/>
-              <a:t>16/02/2024</a:t>
+              <a:t>17/02/2024</a:t>
             </a:fld>
             <a:endParaRPr lang="en-GB"/>
           </a:p>
@@ -3103,7 +3151,7 @@
           <a:p>
             <a:fld id="{0CD94E99-FA29-4EFF-88BE-3447E30E8C4D}" type="datetimeFigureOut">
               <a:rPr lang="en-GB" smtClean="0"/>
-              <a:t>16/02/2024</a:t>
+              <a:t>17/02/2024</a:t>
             </a:fld>
             <a:endParaRPr lang="en-GB"/>
           </a:p>
@@ -3383,7 +3431,7 @@
           <a:p>
             <a:fld id="{0CD94E99-FA29-4EFF-88BE-3447E30E8C4D}" type="datetimeFigureOut">
               <a:rPr lang="en-GB" smtClean="0"/>
-              <a:t>16/02/2024</a:t>
+              <a:t>17/02/2024</a:t>
             </a:fld>
             <a:endParaRPr lang="en-GB"/>
           </a:p>
@@ -3762,7 +3810,7 @@
           <a:p>
             <a:fld id="{0CD94E99-FA29-4EFF-88BE-3447E30E8C4D}" type="datetimeFigureOut">
               <a:rPr lang="en-GB" smtClean="0"/>
-              <a:t>16/02/2024</a:t>
+              <a:t>17/02/2024</a:t>
             </a:fld>
             <a:endParaRPr lang="en-GB"/>
           </a:p>
@@ -3880,7 +3928,7 @@
           <a:p>
             <a:fld id="{0CD94E99-FA29-4EFF-88BE-3447E30E8C4D}" type="datetimeFigureOut">
               <a:rPr lang="en-GB" smtClean="0"/>
-              <a:t>16/02/2024</a:t>
+              <a:t>17/02/2024</a:t>
             </a:fld>
             <a:endParaRPr lang="en-GB"/>
           </a:p>
@@ -4053,7 +4101,7 @@
           <a:p>
             <a:fld id="{0CD94E99-FA29-4EFF-88BE-3447E30E8C4D}" type="datetimeFigureOut">
               <a:rPr lang="en-GB" smtClean="0"/>
-              <a:t>16/02/2024</a:t>
+              <a:t>17/02/2024</a:t>
             </a:fld>
             <a:endParaRPr lang="en-GB"/>
           </a:p>
@@ -4409,7 +4457,7 @@
           <a:p>
             <a:fld id="{0CD94E99-FA29-4EFF-88BE-3447E30E8C4D}" type="datetimeFigureOut">
               <a:rPr lang="en-GB" smtClean="0"/>
-              <a:t>16/02/2024</a:t>
+              <a:t>17/02/2024</a:t>
             </a:fld>
             <a:endParaRPr lang="en-GB"/>
           </a:p>
@@ -4788,7 +4836,7 @@
           <a:p>
             <a:fld id="{0CD94E99-FA29-4EFF-88BE-3447E30E8C4D}" type="datetimeFigureOut">
               <a:rPr lang="en-GB" smtClean="0"/>
-              <a:t>16/02/2024</a:t>
+              <a:t>17/02/2024</a:t>
             </a:fld>
             <a:endParaRPr lang="en-GB"/>
           </a:p>
@@ -5077,7 +5125,7 @@
           <a:p>
             <a:fld id="{0CD94E99-FA29-4EFF-88BE-3447E30E8C4D}" type="datetimeFigureOut">
               <a:rPr lang="en-GB" smtClean="0"/>
-              <a:t>16/02/2024</a:t>
+              <a:t>17/02/2024</a:t>
             </a:fld>
             <a:endParaRPr lang="en-GB"/>
           </a:p>
@@ -6251,53 +6299,6 @@
       </p:sp>
       <p:sp>
         <p:nvSpPr>
-          <p:cNvPr id="8" name="TextBox 7">
-            <a:extLst>
-              <a:ext uri="{FF2B5EF4-FFF2-40B4-BE49-F238E27FC236}">
-                <a16:creationId xmlns:a16="http://schemas.microsoft.com/office/drawing/2014/main" id="{E62E95DE-1F47-7F82-7AE9-6E0238820223}"/>
-              </a:ext>
-            </a:extLst>
-          </p:cNvPr>
-          <p:cNvSpPr txBox="1"/>
-          <p:nvPr/>
-        </p:nvSpPr>
-        <p:spPr>
-          <a:xfrm>
-            <a:off x="5862556" y="3559822"/>
-            <a:ext cx="6094520" cy="1167503"/>
-          </a:xfrm>
-          <a:prstGeom prst="rect">
-            <a:avLst/>
-          </a:prstGeom>
-          <a:noFill/>
-        </p:spPr>
-        <p:txBody>
-          <a:bodyPr wrap="square">
-            <a:normAutofit fontScale="92500" lnSpcReduction="20000"/>
-          </a:bodyPr>
-          <a:lstStyle/>
-          <a:p>
-            <a:pPr algn="ctr"/>
-            <a:r>
-              <a:rPr lang="en-US" dirty="0"/>
-              <a:t>With the ever-increasing use of IoT devices, </a:t>
-            </a:r>
-            <a:r>
-              <a:rPr lang="en-US" b="1" dirty="0"/>
-              <a:t>can FL algorithms or tools be designed to operate specifically on resources Edge devices to minimize computational and communications costs</a:t>
-            </a:r>
-            <a:r>
-              <a:rPr lang="en-US" dirty="0"/>
-              <a:t>. The models should be adaptable to non independently and identically distributed data (IID). </a:t>
-            </a:r>
-          </a:p>
-          <a:p>
-            <a:endParaRPr lang="en-US" dirty="0"/>
-          </a:p>
-        </p:txBody>
-      </p:sp>
-      <p:sp>
-        <p:nvSpPr>
           <p:cNvPr id="10" name="TextBox 9">
             <a:extLst>
               <a:ext uri="{FF2B5EF4-FFF2-40B4-BE49-F238E27FC236}">
@@ -6311,7 +6312,7 @@
         <p:spPr>
           <a:xfrm>
             <a:off x="1189434" y="2125202"/>
-            <a:ext cx="6094520" cy="1009385"/>
+            <a:ext cx="5468818" cy="875450"/>
           </a:xfrm>
           <a:prstGeom prst="rect">
             <a:avLst/>
@@ -6320,7 +6321,7 @@
         </p:spPr>
         <p:txBody>
           <a:bodyPr wrap="square">
-            <a:normAutofit fontScale="92500" lnSpcReduction="20000"/>
+            <a:normAutofit fontScale="85000" lnSpcReduction="20000"/>
           </a:bodyPr>
           <a:lstStyle/>
           <a:p>
@@ -6339,10 +6340,46 @@
       </p:sp>
       <p:sp>
         <p:nvSpPr>
-          <p:cNvPr id="13" name="Rectangle: Rounded Corners 12">
+          <p:cNvPr id="14" name="TextBox 13">
             <a:extLst>
               <a:ext uri="{FF2B5EF4-FFF2-40B4-BE49-F238E27FC236}">
-                <a16:creationId xmlns:a16="http://schemas.microsoft.com/office/drawing/2014/main" id="{5C025563-8660-1FD1-DCD9-043A3F3BBD94}"/>
+                <a16:creationId xmlns:a16="http://schemas.microsoft.com/office/drawing/2014/main" id="{D9D0AB5B-65B7-2487-EF79-97B298F3FB34}"/>
+              </a:ext>
+            </a:extLst>
+          </p:cNvPr>
+          <p:cNvSpPr txBox="1"/>
+          <p:nvPr/>
+        </p:nvSpPr>
+        <p:spPr>
+          <a:xfrm>
+            <a:off x="1097280" y="1737847"/>
+            <a:ext cx="2109488" cy="369332"/>
+          </a:xfrm>
+          <a:prstGeom prst="rect">
+            <a:avLst/>
+          </a:prstGeom>
+          <a:noFill/>
+        </p:spPr>
+        <p:txBody>
+          <a:bodyPr wrap="none" rtlCol="0">
+            <a:spAutoFit/>
+          </a:bodyPr>
+          <a:lstStyle/>
+          <a:p>
+            <a:r>
+              <a:rPr lang="en-US" dirty="0"/>
+              <a:t>Research Question 1</a:t>
+            </a:r>
+            <a:endParaRPr lang="en-GB" dirty="0"/>
+          </a:p>
+        </p:txBody>
+      </p:sp>
+      <p:sp>
+        <p:nvSpPr>
+          <p:cNvPr id="15" name="Rectangle: Rounded Corners 14">
+            <a:extLst>
+              <a:ext uri="{FF2B5EF4-FFF2-40B4-BE49-F238E27FC236}">
+                <a16:creationId xmlns:a16="http://schemas.microsoft.com/office/drawing/2014/main" id="{A073518C-85F6-E23E-B2B9-0105D35E8078}"/>
               </a:ext>
             </a:extLst>
           </p:cNvPr>
@@ -6351,8 +6388,8 @@
         </p:nvSpPr>
         <p:spPr>
           <a:xfrm>
-            <a:off x="5862556" y="3515360"/>
-            <a:ext cx="6094520" cy="1200329"/>
+            <a:off x="1189434" y="2114669"/>
+            <a:ext cx="5468818" cy="875451"/>
           </a:xfrm>
           <a:prstGeom prst="roundRect">
             <a:avLst/>
@@ -6376,9 +6413,7 @@
           </a:fontRef>
         </p:style>
         <p:txBody>
-          <a:bodyPr rtlCol="0" anchor="ctr">
-            <a:normAutofit/>
-          </a:bodyPr>
+          <a:bodyPr rtlCol="0" anchor="ctr"/>
           <a:lstStyle/>
           <a:p>
             <a:pPr algn="ctr"/>
@@ -6386,12 +6421,78 @@
           </a:p>
         </p:txBody>
       </p:sp>
-      <p:sp>
-        <p:nvSpPr>
-          <p:cNvPr id="14" name="TextBox 13">
+    </p:spTree>
+    <p:extLst>
+      <p:ext uri="{BB962C8B-B14F-4D97-AF65-F5344CB8AC3E}">
+        <p14:creationId xmlns:p14="http://schemas.microsoft.com/office/powerpoint/2010/main" val="2974212779"/>
+      </p:ext>
+    </p:extLst>
+  </p:cSld>
+  <p:clrMapOvr>
+    <a:masterClrMapping/>
+  </p:clrMapOvr>
+</p:sld>
+</file>
+
+<file path=ppt/slides/slide4.xml><?xml version="1.0" encoding="utf-8"?>
+<p:sld xmlns:a="http://schemas.openxmlformats.org/drawingml/2006/main" xmlns:r="http://schemas.openxmlformats.org/officeDocument/2006/relationships" xmlns:p="http://schemas.openxmlformats.org/presentationml/2006/main">
+  <p:cSld>
+    <p:spTree>
+      <p:nvGrpSpPr>
+        <p:cNvPr id="1" name="">
+          <a:extLst>
+            <a:ext uri="{FF2B5EF4-FFF2-40B4-BE49-F238E27FC236}">
+              <a16:creationId xmlns:a16="http://schemas.microsoft.com/office/drawing/2014/main" id="{C103487E-61DD-12BD-72AB-DDB959FE2FC0}"/>
+            </a:ext>
+          </a:extLst>
+        </p:cNvPr>
+        <p:cNvGrpSpPr/>
+        <p:nvPr/>
+      </p:nvGrpSpPr>
+      <p:grpSpPr>
+        <a:xfrm>
+          <a:off x="0" y="0"/>
+          <a:ext cx="0" cy="0"/>
+          <a:chOff x="0" y="0"/>
+          <a:chExt cx="0" cy="0"/>
+        </a:xfrm>
+      </p:grpSpPr>
+      <p:sp>
+        <p:nvSpPr>
+          <p:cNvPr id="2" name="Title 1">
             <a:extLst>
               <a:ext uri="{FF2B5EF4-FFF2-40B4-BE49-F238E27FC236}">
-                <a16:creationId xmlns:a16="http://schemas.microsoft.com/office/drawing/2014/main" id="{D9D0AB5B-65B7-2487-EF79-97B298F3FB34}"/>
+                <a16:creationId xmlns:a16="http://schemas.microsoft.com/office/drawing/2014/main" id="{5B79BE80-421F-E0A2-E347-1FB3E87F24E8}"/>
+              </a:ext>
+            </a:extLst>
+          </p:cNvPr>
+          <p:cNvSpPr>
+            <a:spLocks noGrp="1"/>
+          </p:cNvSpPr>
+          <p:nvPr>
+            <p:ph type="title"/>
+          </p:nvPr>
+        </p:nvSpPr>
+        <p:spPr/>
+        <p:txBody>
+          <a:bodyPr/>
+          <a:lstStyle/>
+          <a:p>
+            <a:pPr algn="ctr"/>
+            <a:r>
+              <a:rPr lang="en-US" dirty="0"/>
+              <a:t>Research Questions</a:t>
+            </a:r>
+            <a:endParaRPr lang="en-GB" dirty="0"/>
+          </a:p>
+        </p:txBody>
+      </p:sp>
+      <p:sp>
+        <p:nvSpPr>
+          <p:cNvPr id="8" name="TextBox 7">
+            <a:extLst>
+              <a:ext uri="{FF2B5EF4-FFF2-40B4-BE49-F238E27FC236}">
+                <a16:creationId xmlns:a16="http://schemas.microsoft.com/office/drawing/2014/main" id="{4122F22F-CC6A-21A3-E65B-6D9079943A2F}"/>
               </a:ext>
             </a:extLst>
           </p:cNvPr>
@@ -6400,8 +6501,8 @@
         </p:nvSpPr>
         <p:spPr>
           <a:xfrm>
-            <a:off x="1097280" y="1737847"/>
-            <a:ext cx="2109488" cy="369332"/>
+            <a:off x="5862556" y="3067088"/>
+            <a:ext cx="6094520" cy="1167503"/>
           </a:xfrm>
           <a:prstGeom prst="rect">
             <a:avLst/>
@@ -6409,25 +6510,77 @@
           <a:noFill/>
         </p:spPr>
         <p:txBody>
-          <a:bodyPr wrap="none" rtlCol="0">
-            <a:spAutoFit/>
+          <a:bodyPr wrap="square">
+            <a:normAutofit fontScale="85000" lnSpcReduction="10000"/>
           </a:bodyPr>
           <a:lstStyle/>
           <a:p>
+            <a:pPr algn="ctr"/>
             <a:r>
               <a:rPr lang="en-US" dirty="0"/>
-              <a:t>Research Question 1</a:t>
-            </a:r>
-            <a:endParaRPr lang="en-GB" dirty="0"/>
-          </a:p>
-        </p:txBody>
-      </p:sp>
-      <p:sp>
-        <p:nvSpPr>
-          <p:cNvPr id="15" name="Rectangle: Rounded Corners 14">
+              <a:t>With the ever-increasing use of IoT devices, </a:t>
+            </a:r>
+            <a:r>
+              <a:rPr lang="en-US" b="1" dirty="0"/>
+              <a:t>can FL algorithms or tools be designed to operate specifically on resources Edge devices to minimize computational and communications costs</a:t>
+            </a:r>
+            <a:r>
+              <a:rPr lang="en-US" dirty="0"/>
+              <a:t>. The models should be adaptable to non independently and identically distributed data (IID), and ideally be carried out on the device.</a:t>
+            </a:r>
+          </a:p>
+          <a:p>
+            <a:endParaRPr lang="en-US" dirty="0"/>
+          </a:p>
+        </p:txBody>
+      </p:sp>
+      <p:sp>
+        <p:nvSpPr>
+          <p:cNvPr id="10" name="TextBox 9">
             <a:extLst>
               <a:ext uri="{FF2B5EF4-FFF2-40B4-BE49-F238E27FC236}">
-                <a16:creationId xmlns:a16="http://schemas.microsoft.com/office/drawing/2014/main" id="{A073518C-85F6-E23E-B2B9-0105D35E8078}"/>
+                <a16:creationId xmlns:a16="http://schemas.microsoft.com/office/drawing/2014/main" id="{40CF2482-4A72-927A-E174-2D0AD48759E7}"/>
+              </a:ext>
+            </a:extLst>
+          </p:cNvPr>
+          <p:cNvSpPr txBox="1"/>
+          <p:nvPr/>
+        </p:nvSpPr>
+        <p:spPr>
+          <a:xfrm>
+            <a:off x="1189434" y="2125202"/>
+            <a:ext cx="5468818" cy="875450"/>
+          </a:xfrm>
+          <a:prstGeom prst="rect">
+            <a:avLst/>
+          </a:prstGeom>
+          <a:noFill/>
+        </p:spPr>
+        <p:txBody>
+          <a:bodyPr wrap="square">
+            <a:normAutofit fontScale="85000" lnSpcReduction="20000"/>
+          </a:bodyPr>
+          <a:lstStyle/>
+          <a:p>
+            <a:pPr algn="ctr"/>
+            <a:r>
+              <a:rPr lang="en-US" dirty="0"/>
+              <a:t>In any large distributed network, there is a chance that some nodes can be lost, for a range of reason. </a:t>
+            </a:r>
+            <a:r>
+              <a:rPr lang="en-US" b="1" dirty="0"/>
+              <a:t>Can a FL architecture be designed to be resilient, allowing it to identify missing nodes, and adapt so that there is no loss in performance? </a:t>
+            </a:r>
+            <a:endParaRPr lang="en-GB" b="1" dirty="0"/>
+          </a:p>
+        </p:txBody>
+      </p:sp>
+      <p:sp>
+        <p:nvSpPr>
+          <p:cNvPr id="13" name="Rectangle: Rounded Corners 12">
+            <a:extLst>
+              <a:ext uri="{FF2B5EF4-FFF2-40B4-BE49-F238E27FC236}">
+                <a16:creationId xmlns:a16="http://schemas.microsoft.com/office/drawing/2014/main" id="{C4D43637-DC10-B3A5-5029-8D1C5ADAC38A}"/>
               </a:ext>
             </a:extLst>
           </p:cNvPr>
@@ -6436,8 +6589,8 @@
         </p:nvSpPr>
         <p:spPr>
           <a:xfrm>
-            <a:off x="1189434" y="2114669"/>
-            <a:ext cx="6094520" cy="1009385"/>
+            <a:off x="5862556" y="3022626"/>
+            <a:ext cx="6094520" cy="1200329"/>
           </a:xfrm>
           <a:prstGeom prst="roundRect">
             <a:avLst/>
@@ -6461,7 +6614,9 @@
           </a:fontRef>
         </p:style>
         <p:txBody>
-          <a:bodyPr rtlCol="0" anchor="ctr"/>
+          <a:bodyPr rtlCol="0" anchor="ctr">
+            <a:normAutofit/>
+          </a:bodyPr>
           <a:lstStyle/>
           <a:p>
             <a:pPr algn="ctr"/>
@@ -6471,10 +6626,10 @@
       </p:sp>
       <p:sp>
         <p:nvSpPr>
-          <p:cNvPr id="16" name="TextBox 15">
+          <p:cNvPr id="14" name="TextBox 13">
             <a:extLst>
               <a:ext uri="{FF2B5EF4-FFF2-40B4-BE49-F238E27FC236}">
-                <a16:creationId xmlns:a16="http://schemas.microsoft.com/office/drawing/2014/main" id="{7FEFDBC4-98A8-7C96-563D-DC6799A0BC52}"/>
+                <a16:creationId xmlns:a16="http://schemas.microsoft.com/office/drawing/2014/main" id="{7EA31CE1-424E-0550-4A1F-6E858EE6B780}"/>
               </a:ext>
             </a:extLst>
           </p:cNvPr>
@@ -6483,8 +6638,8 @@
         </p:nvSpPr>
         <p:spPr>
           <a:xfrm>
-            <a:off x="8795980" y="3134392"/>
-            <a:ext cx="3161096" cy="369332"/>
+            <a:off x="1097280" y="1737847"/>
+            <a:ext cx="2109488" cy="369332"/>
           </a:xfrm>
           <a:prstGeom prst="rect">
             <a:avLst/>
@@ -6492,15 +6647,14 @@
           <a:noFill/>
         </p:spPr>
         <p:txBody>
-          <a:bodyPr wrap="square" rtlCol="0">
+          <a:bodyPr wrap="none" rtlCol="0">
             <a:spAutoFit/>
           </a:bodyPr>
           <a:lstStyle/>
           <a:p>
-            <a:pPr algn="r"/>
             <a:r>
               <a:rPr lang="en-US" dirty="0"/>
-              <a:t>Research Question 2</a:t>
+              <a:t>Research Question 1</a:t>
             </a:r>
             <a:endParaRPr lang="en-GB" dirty="0"/>
           </a:p>
@@ -6508,10 +6662,10 @@
       </p:sp>
       <p:sp>
         <p:nvSpPr>
-          <p:cNvPr id="17" name="Rectangle: Rounded Corners 16">
+          <p:cNvPr id="15" name="Rectangle: Rounded Corners 14">
             <a:extLst>
               <a:ext uri="{FF2B5EF4-FFF2-40B4-BE49-F238E27FC236}">
-                <a16:creationId xmlns:a16="http://schemas.microsoft.com/office/drawing/2014/main" id="{EB4D7126-56C1-F57F-BC03-FB969A2EBA95}"/>
+                <a16:creationId xmlns:a16="http://schemas.microsoft.com/office/drawing/2014/main" id="{11020F5C-E109-173E-5071-D5E09B0BE377}"/>
               </a:ext>
             </a:extLst>
           </p:cNvPr>
@@ -6520,8 +6674,8 @@
         </p:nvSpPr>
         <p:spPr>
           <a:xfrm>
-            <a:off x="1189434" y="5106995"/>
-            <a:ext cx="6094520" cy="954485"/>
+            <a:off x="1189434" y="2114669"/>
+            <a:ext cx="5468818" cy="875451"/>
           </a:xfrm>
           <a:prstGeom prst="roundRect">
             <a:avLst/>
@@ -6545,9 +6699,7 @@
           </a:fontRef>
         </p:style>
         <p:txBody>
-          <a:bodyPr rtlCol="0" anchor="ctr">
-            <a:normAutofit/>
-          </a:bodyPr>
+          <a:bodyPr rtlCol="0" anchor="ctr"/>
           <a:lstStyle/>
           <a:p>
             <a:pPr algn="ctr"/>
@@ -6557,10 +6709,10 @@
       </p:sp>
       <p:sp>
         <p:nvSpPr>
-          <p:cNvPr id="18" name="TextBox 17">
+          <p:cNvPr id="16" name="TextBox 15">
             <a:extLst>
               <a:ext uri="{FF2B5EF4-FFF2-40B4-BE49-F238E27FC236}">
-                <a16:creationId xmlns:a16="http://schemas.microsoft.com/office/drawing/2014/main" id="{AAB7BBFE-E7BF-F713-3D50-5C45479A7548}"/>
+                <a16:creationId xmlns:a16="http://schemas.microsoft.com/office/drawing/2014/main" id="{B8B448B7-BD48-5613-6948-EFF3941D1E25}"/>
               </a:ext>
             </a:extLst>
           </p:cNvPr>
@@ -6569,7 +6721,7 @@
         </p:nvSpPr>
         <p:spPr>
           <a:xfrm>
-            <a:off x="1189434" y="4715689"/>
+            <a:off x="8600671" y="2633193"/>
             <a:ext cx="3161096" cy="369332"/>
           </a:xfrm>
           <a:prstGeom prst="rect">
@@ -6583,9 +6735,10 @@
           </a:bodyPr>
           <a:lstStyle/>
           <a:p>
+            <a:pPr algn="r"/>
             <a:r>
               <a:rPr lang="en-US" dirty="0"/>
-              <a:t>Research Question 3</a:t>
+              <a:t>Research Question 2</a:t>
             </a:r>
             <a:endParaRPr lang="en-GB" dirty="0"/>
           </a:p>
@@ -6593,10 +6746,59 @@
       </p:sp>
       <p:sp>
         <p:nvSpPr>
-          <p:cNvPr id="19" name="TextBox 18">
+          <p:cNvPr id="17" name="Rectangle: Rounded Corners 16">
             <a:extLst>
               <a:ext uri="{FF2B5EF4-FFF2-40B4-BE49-F238E27FC236}">
-                <a16:creationId xmlns:a16="http://schemas.microsoft.com/office/drawing/2014/main" id="{19D8ABCD-558E-12FD-A869-7CB2DE308229}"/>
+                <a16:creationId xmlns:a16="http://schemas.microsoft.com/office/drawing/2014/main" id="{D6739F5E-E377-BB9D-ACD3-08A2D99FD298}"/>
+              </a:ext>
+            </a:extLst>
+          </p:cNvPr>
+          <p:cNvSpPr/>
+          <p:nvPr/>
+        </p:nvSpPr>
+        <p:spPr>
+          <a:xfrm>
+            <a:off x="1189434" y="4261046"/>
+            <a:ext cx="6094520" cy="954485"/>
+          </a:xfrm>
+          <a:prstGeom prst="roundRect">
+            <a:avLst/>
+          </a:prstGeom>
+          <a:noFill/>
+        </p:spPr>
+        <p:style>
+          <a:lnRef idx="2">
+            <a:schemeClr val="accent1">
+              <a:shade val="15000"/>
+            </a:schemeClr>
+          </a:lnRef>
+          <a:fillRef idx="1">
+            <a:schemeClr val="accent1"/>
+          </a:fillRef>
+          <a:effectRef idx="0">
+            <a:schemeClr val="accent1"/>
+          </a:effectRef>
+          <a:fontRef idx="minor">
+            <a:schemeClr val="lt1"/>
+          </a:fontRef>
+        </p:style>
+        <p:txBody>
+          <a:bodyPr rtlCol="0" anchor="ctr">
+            <a:normAutofit/>
+          </a:bodyPr>
+          <a:lstStyle/>
+          <a:p>
+            <a:pPr algn="ctr"/>
+            <a:endParaRPr lang="en-GB"/>
+          </a:p>
+        </p:txBody>
+      </p:sp>
+      <p:sp>
+        <p:nvSpPr>
+          <p:cNvPr id="18" name="TextBox 17">
+            <a:extLst>
+              <a:ext uri="{FF2B5EF4-FFF2-40B4-BE49-F238E27FC236}">
+                <a16:creationId xmlns:a16="http://schemas.microsoft.com/office/drawing/2014/main" id="{A4AED9BA-AC2D-E7FF-9EF3-CA8F477EF3F5}"/>
               </a:ext>
             </a:extLst>
           </p:cNvPr>
@@ -6605,8 +6807,8 @@
         </p:nvSpPr>
         <p:spPr>
           <a:xfrm>
-            <a:off x="1189434" y="5106995"/>
-            <a:ext cx="6094520" cy="954484"/>
+            <a:off x="1189434" y="3903378"/>
+            <a:ext cx="3161096" cy="369332"/>
           </a:xfrm>
           <a:prstGeom prst="rect">
             <a:avLst/>
@@ -6614,6 +6816,42 @@
           <a:noFill/>
         </p:spPr>
         <p:txBody>
+          <a:bodyPr wrap="square" rtlCol="0">
+            <a:spAutoFit/>
+          </a:bodyPr>
+          <a:lstStyle/>
+          <a:p>
+            <a:r>
+              <a:rPr lang="en-US" dirty="0"/>
+              <a:t>Research Question 3</a:t>
+            </a:r>
+            <a:endParaRPr lang="en-GB" dirty="0"/>
+          </a:p>
+        </p:txBody>
+      </p:sp>
+      <p:sp>
+        <p:nvSpPr>
+          <p:cNvPr id="19" name="TextBox 18">
+            <a:extLst>
+              <a:ext uri="{FF2B5EF4-FFF2-40B4-BE49-F238E27FC236}">
+                <a16:creationId xmlns:a16="http://schemas.microsoft.com/office/drawing/2014/main" id="{40C3CDF0-D04B-079A-749B-CBA45F7CD178}"/>
+              </a:ext>
+            </a:extLst>
+          </p:cNvPr>
+          <p:cNvSpPr txBox="1"/>
+          <p:nvPr/>
+        </p:nvSpPr>
+        <p:spPr>
+          <a:xfrm>
+            <a:off x="1189434" y="4261046"/>
+            <a:ext cx="6094520" cy="954484"/>
+          </a:xfrm>
+          <a:prstGeom prst="rect">
+            <a:avLst/>
+          </a:prstGeom>
+          <a:noFill/>
+        </p:spPr>
+        <p:txBody>
           <a:bodyPr wrap="square">
             <a:normAutofit/>
           </a:bodyPr>
@@ -6634,10 +6872,1176 @@
           </a:p>
         </p:txBody>
       </p:sp>
+      <p:sp>
+        <p:nvSpPr>
+          <p:cNvPr id="3" name="TextBox 2">
+            <a:extLst>
+              <a:ext uri="{FF2B5EF4-FFF2-40B4-BE49-F238E27FC236}">
+                <a16:creationId xmlns:a16="http://schemas.microsoft.com/office/drawing/2014/main" id="{265FF84C-36F7-3227-F237-3124768794CF}"/>
+              </a:ext>
+            </a:extLst>
+          </p:cNvPr>
+          <p:cNvSpPr txBox="1"/>
+          <p:nvPr/>
+        </p:nvSpPr>
+        <p:spPr>
+          <a:xfrm>
+            <a:off x="5997200" y="5376185"/>
+            <a:ext cx="6094520" cy="928382"/>
+          </a:xfrm>
+          <a:prstGeom prst="rect">
+            <a:avLst/>
+          </a:prstGeom>
+          <a:noFill/>
+        </p:spPr>
+        <p:txBody>
+          <a:bodyPr wrap="square">
+            <a:normAutofit/>
+          </a:bodyPr>
+          <a:lstStyle/>
+          <a:p>
+            <a:pPr algn="ctr"/>
+            <a:r>
+              <a:rPr lang="en-US" dirty="0"/>
+              <a:t>When thinking about robust and resilient FL systems, can blockchain </a:t>
+            </a:r>
+          </a:p>
+          <a:p>
+            <a:endParaRPr lang="en-US" dirty="0"/>
+          </a:p>
+        </p:txBody>
+      </p:sp>
+      <p:sp>
+        <p:nvSpPr>
+          <p:cNvPr id="4" name="Rectangle: Rounded Corners 3">
+            <a:extLst>
+              <a:ext uri="{FF2B5EF4-FFF2-40B4-BE49-F238E27FC236}">
+                <a16:creationId xmlns:a16="http://schemas.microsoft.com/office/drawing/2014/main" id="{2E49B197-D6B9-413F-11AC-DD26215C40C2}"/>
+              </a:ext>
+            </a:extLst>
+          </p:cNvPr>
+          <p:cNvSpPr/>
+          <p:nvPr/>
+        </p:nvSpPr>
+        <p:spPr>
+          <a:xfrm>
+            <a:off x="5997200" y="5338446"/>
+            <a:ext cx="6094520" cy="954485"/>
+          </a:xfrm>
+          <a:prstGeom prst="roundRect">
+            <a:avLst/>
+          </a:prstGeom>
+          <a:noFill/>
+        </p:spPr>
+        <p:style>
+          <a:lnRef idx="2">
+            <a:schemeClr val="accent1">
+              <a:shade val="15000"/>
+            </a:schemeClr>
+          </a:lnRef>
+          <a:fillRef idx="1">
+            <a:schemeClr val="accent1"/>
+          </a:fillRef>
+          <a:effectRef idx="0">
+            <a:schemeClr val="accent1"/>
+          </a:effectRef>
+          <a:fontRef idx="minor">
+            <a:schemeClr val="lt1"/>
+          </a:fontRef>
+        </p:style>
+        <p:txBody>
+          <a:bodyPr rtlCol="0" anchor="ctr">
+            <a:normAutofit/>
+          </a:bodyPr>
+          <a:lstStyle/>
+          <a:p>
+            <a:pPr algn="ctr"/>
+            <a:endParaRPr lang="en-GB"/>
+          </a:p>
+        </p:txBody>
+      </p:sp>
     </p:spTree>
     <p:extLst>
       <p:ext uri="{BB962C8B-B14F-4D97-AF65-F5344CB8AC3E}">
-        <p14:creationId xmlns:p14="http://schemas.microsoft.com/office/powerpoint/2010/main" val="2974212779"/>
+        <p14:creationId xmlns:p14="http://schemas.microsoft.com/office/powerpoint/2010/main" val="2342086455"/>
+      </p:ext>
+    </p:extLst>
+  </p:cSld>
+  <p:clrMapOvr>
+    <a:masterClrMapping/>
+  </p:clrMapOvr>
+</p:sld>
+</file>
+
+<file path=ppt/slides/slide5.xml><?xml version="1.0" encoding="utf-8"?>
+<p:sld xmlns:a="http://schemas.openxmlformats.org/drawingml/2006/main" xmlns:r="http://schemas.openxmlformats.org/officeDocument/2006/relationships" xmlns:p="http://schemas.openxmlformats.org/presentationml/2006/main">
+  <p:cSld>
+    <p:spTree>
+      <p:nvGrpSpPr>
+        <p:cNvPr id="1" name="">
+          <a:extLst>
+            <a:ext uri="{FF2B5EF4-FFF2-40B4-BE49-F238E27FC236}">
+              <a16:creationId xmlns:a16="http://schemas.microsoft.com/office/drawing/2014/main" id="{DAF4E386-B234-6A24-1032-34AFF508B01A}"/>
+            </a:ext>
+          </a:extLst>
+        </p:cNvPr>
+        <p:cNvGrpSpPr/>
+        <p:nvPr/>
+      </p:nvGrpSpPr>
+      <p:grpSpPr>
+        <a:xfrm>
+          <a:off x="0" y="0"/>
+          <a:ext cx="0" cy="0"/>
+          <a:chOff x="0" y="0"/>
+          <a:chExt cx="0" cy="0"/>
+        </a:xfrm>
+      </p:grpSpPr>
+      <p:sp>
+        <p:nvSpPr>
+          <p:cNvPr id="2" name="Title 1">
+            <a:extLst>
+              <a:ext uri="{FF2B5EF4-FFF2-40B4-BE49-F238E27FC236}">
+                <a16:creationId xmlns:a16="http://schemas.microsoft.com/office/drawing/2014/main" id="{519BD0A0-F247-AD31-6C24-4139506AF50E}"/>
+              </a:ext>
+            </a:extLst>
+          </p:cNvPr>
+          <p:cNvSpPr>
+            <a:spLocks noGrp="1"/>
+          </p:cNvSpPr>
+          <p:nvPr>
+            <p:ph type="title"/>
+          </p:nvPr>
+        </p:nvSpPr>
+        <p:spPr/>
+        <p:txBody>
+          <a:bodyPr/>
+          <a:lstStyle/>
+          <a:p>
+            <a:pPr algn="ctr"/>
+            <a:r>
+              <a:rPr lang="en-US" dirty="0"/>
+              <a:t>Research Questions</a:t>
+            </a:r>
+            <a:endParaRPr lang="en-GB" dirty="0"/>
+          </a:p>
+        </p:txBody>
+      </p:sp>
+      <p:sp>
+        <p:nvSpPr>
+          <p:cNvPr id="8" name="TextBox 7">
+            <a:extLst>
+              <a:ext uri="{FF2B5EF4-FFF2-40B4-BE49-F238E27FC236}">
+                <a16:creationId xmlns:a16="http://schemas.microsoft.com/office/drawing/2014/main" id="{FA70DBE6-F2CC-FDE2-2144-5B6F2D7D2FD5}"/>
+              </a:ext>
+            </a:extLst>
+          </p:cNvPr>
+          <p:cNvSpPr txBox="1"/>
+          <p:nvPr/>
+        </p:nvSpPr>
+        <p:spPr>
+          <a:xfrm>
+            <a:off x="5862556" y="3067088"/>
+            <a:ext cx="6094520" cy="1167503"/>
+          </a:xfrm>
+          <a:prstGeom prst="rect">
+            <a:avLst/>
+          </a:prstGeom>
+          <a:noFill/>
+        </p:spPr>
+        <p:txBody>
+          <a:bodyPr wrap="square">
+            <a:normAutofit fontScale="85000" lnSpcReduction="10000"/>
+          </a:bodyPr>
+          <a:lstStyle/>
+          <a:p>
+            <a:pPr algn="ctr"/>
+            <a:r>
+              <a:rPr lang="en-US" dirty="0"/>
+              <a:t>With the ever-increasing use of IoT devices, </a:t>
+            </a:r>
+            <a:r>
+              <a:rPr lang="en-US" b="1" dirty="0"/>
+              <a:t>can FL algorithms or tools be designed to operate specifically on resources Edge devices to minimize computational and communications costs</a:t>
+            </a:r>
+            <a:r>
+              <a:rPr lang="en-US" dirty="0"/>
+              <a:t>. The models should be adaptable to non independently and identically distributed data (IID), and ideally be carried out on the device.</a:t>
+            </a:r>
+          </a:p>
+          <a:p>
+            <a:endParaRPr lang="en-US" dirty="0"/>
+          </a:p>
+        </p:txBody>
+      </p:sp>
+      <p:sp>
+        <p:nvSpPr>
+          <p:cNvPr id="10" name="TextBox 9">
+            <a:extLst>
+              <a:ext uri="{FF2B5EF4-FFF2-40B4-BE49-F238E27FC236}">
+                <a16:creationId xmlns:a16="http://schemas.microsoft.com/office/drawing/2014/main" id="{6E99B88D-6F92-B1DC-8047-0B3100A9A188}"/>
+              </a:ext>
+            </a:extLst>
+          </p:cNvPr>
+          <p:cNvSpPr txBox="1"/>
+          <p:nvPr/>
+        </p:nvSpPr>
+        <p:spPr>
+          <a:xfrm>
+            <a:off x="1189434" y="2125202"/>
+            <a:ext cx="5468818" cy="875450"/>
+          </a:xfrm>
+          <a:prstGeom prst="rect">
+            <a:avLst/>
+          </a:prstGeom>
+          <a:noFill/>
+        </p:spPr>
+        <p:txBody>
+          <a:bodyPr wrap="square">
+            <a:normAutofit fontScale="85000" lnSpcReduction="20000"/>
+          </a:bodyPr>
+          <a:lstStyle/>
+          <a:p>
+            <a:pPr algn="ctr"/>
+            <a:r>
+              <a:rPr lang="en-US" dirty="0"/>
+              <a:t>In any large distributed network, there is a chance that some nodes can be lost, for a range of reason. </a:t>
+            </a:r>
+            <a:r>
+              <a:rPr lang="en-US" b="1" dirty="0"/>
+              <a:t>Can a FL architecture be designed to be resilient, allowing it to identify missing nodes, and adapt so that there is no loss in performance? </a:t>
+            </a:r>
+            <a:endParaRPr lang="en-GB" b="1" dirty="0"/>
+          </a:p>
+        </p:txBody>
+      </p:sp>
+      <p:sp>
+        <p:nvSpPr>
+          <p:cNvPr id="13" name="Rectangle: Rounded Corners 12">
+            <a:extLst>
+              <a:ext uri="{FF2B5EF4-FFF2-40B4-BE49-F238E27FC236}">
+                <a16:creationId xmlns:a16="http://schemas.microsoft.com/office/drawing/2014/main" id="{A4B880AF-35B5-94F0-1879-5389614D86B2}"/>
+              </a:ext>
+            </a:extLst>
+          </p:cNvPr>
+          <p:cNvSpPr/>
+          <p:nvPr/>
+        </p:nvSpPr>
+        <p:spPr>
+          <a:xfrm>
+            <a:off x="5862556" y="3022626"/>
+            <a:ext cx="6094520" cy="1200329"/>
+          </a:xfrm>
+          <a:prstGeom prst="roundRect">
+            <a:avLst/>
+          </a:prstGeom>
+          <a:noFill/>
+        </p:spPr>
+        <p:style>
+          <a:lnRef idx="2">
+            <a:schemeClr val="accent1">
+              <a:shade val="15000"/>
+            </a:schemeClr>
+          </a:lnRef>
+          <a:fillRef idx="1">
+            <a:schemeClr val="accent1"/>
+          </a:fillRef>
+          <a:effectRef idx="0">
+            <a:schemeClr val="accent1"/>
+          </a:effectRef>
+          <a:fontRef idx="minor">
+            <a:schemeClr val="lt1"/>
+          </a:fontRef>
+        </p:style>
+        <p:txBody>
+          <a:bodyPr rtlCol="0" anchor="ctr">
+            <a:normAutofit/>
+          </a:bodyPr>
+          <a:lstStyle/>
+          <a:p>
+            <a:pPr algn="ctr"/>
+            <a:endParaRPr lang="en-GB"/>
+          </a:p>
+        </p:txBody>
+      </p:sp>
+      <p:sp>
+        <p:nvSpPr>
+          <p:cNvPr id="14" name="TextBox 13">
+            <a:extLst>
+              <a:ext uri="{FF2B5EF4-FFF2-40B4-BE49-F238E27FC236}">
+                <a16:creationId xmlns:a16="http://schemas.microsoft.com/office/drawing/2014/main" id="{E582B5D7-66CD-0F41-2C6E-776FDD04B7E7}"/>
+              </a:ext>
+            </a:extLst>
+          </p:cNvPr>
+          <p:cNvSpPr txBox="1"/>
+          <p:nvPr/>
+        </p:nvSpPr>
+        <p:spPr>
+          <a:xfrm>
+            <a:off x="1097280" y="1737847"/>
+            <a:ext cx="2109488" cy="369332"/>
+          </a:xfrm>
+          <a:prstGeom prst="rect">
+            <a:avLst/>
+          </a:prstGeom>
+          <a:noFill/>
+        </p:spPr>
+        <p:txBody>
+          <a:bodyPr wrap="none" rtlCol="0">
+            <a:spAutoFit/>
+          </a:bodyPr>
+          <a:lstStyle/>
+          <a:p>
+            <a:r>
+              <a:rPr lang="en-US" dirty="0"/>
+              <a:t>Research Question 1</a:t>
+            </a:r>
+            <a:endParaRPr lang="en-GB" dirty="0"/>
+          </a:p>
+        </p:txBody>
+      </p:sp>
+      <p:sp>
+        <p:nvSpPr>
+          <p:cNvPr id="15" name="Rectangle: Rounded Corners 14">
+            <a:extLst>
+              <a:ext uri="{FF2B5EF4-FFF2-40B4-BE49-F238E27FC236}">
+                <a16:creationId xmlns:a16="http://schemas.microsoft.com/office/drawing/2014/main" id="{7E3C0550-7240-1B08-C482-CC122976F15D}"/>
+              </a:ext>
+            </a:extLst>
+          </p:cNvPr>
+          <p:cNvSpPr/>
+          <p:nvPr/>
+        </p:nvSpPr>
+        <p:spPr>
+          <a:xfrm>
+            <a:off x="1189434" y="2114669"/>
+            <a:ext cx="5468818" cy="875451"/>
+          </a:xfrm>
+          <a:prstGeom prst="roundRect">
+            <a:avLst/>
+          </a:prstGeom>
+          <a:noFill/>
+        </p:spPr>
+        <p:style>
+          <a:lnRef idx="2">
+            <a:schemeClr val="accent1">
+              <a:shade val="15000"/>
+            </a:schemeClr>
+          </a:lnRef>
+          <a:fillRef idx="1">
+            <a:schemeClr val="accent1"/>
+          </a:fillRef>
+          <a:effectRef idx="0">
+            <a:schemeClr val="accent1"/>
+          </a:effectRef>
+          <a:fontRef idx="minor">
+            <a:schemeClr val="lt1"/>
+          </a:fontRef>
+        </p:style>
+        <p:txBody>
+          <a:bodyPr rtlCol="0" anchor="ctr"/>
+          <a:lstStyle/>
+          <a:p>
+            <a:pPr algn="ctr"/>
+            <a:endParaRPr lang="en-GB"/>
+          </a:p>
+        </p:txBody>
+      </p:sp>
+      <p:sp>
+        <p:nvSpPr>
+          <p:cNvPr id="16" name="TextBox 15">
+            <a:extLst>
+              <a:ext uri="{FF2B5EF4-FFF2-40B4-BE49-F238E27FC236}">
+                <a16:creationId xmlns:a16="http://schemas.microsoft.com/office/drawing/2014/main" id="{BF024E74-A5FC-E1F3-DFE2-7B36BA1E30D7}"/>
+              </a:ext>
+            </a:extLst>
+          </p:cNvPr>
+          <p:cNvSpPr txBox="1"/>
+          <p:nvPr/>
+        </p:nvSpPr>
+        <p:spPr>
+          <a:xfrm>
+            <a:off x="8600671" y="2633193"/>
+            <a:ext cx="3161096" cy="369332"/>
+          </a:xfrm>
+          <a:prstGeom prst="rect">
+            <a:avLst/>
+          </a:prstGeom>
+          <a:noFill/>
+        </p:spPr>
+        <p:txBody>
+          <a:bodyPr wrap="square" rtlCol="0">
+            <a:spAutoFit/>
+          </a:bodyPr>
+          <a:lstStyle/>
+          <a:p>
+            <a:pPr algn="r"/>
+            <a:r>
+              <a:rPr lang="en-US" dirty="0"/>
+              <a:t>Research Question 2</a:t>
+            </a:r>
+            <a:endParaRPr lang="en-GB" dirty="0"/>
+          </a:p>
+        </p:txBody>
+      </p:sp>
+      <p:sp>
+        <p:nvSpPr>
+          <p:cNvPr id="17" name="Rectangle: Rounded Corners 16">
+            <a:extLst>
+              <a:ext uri="{FF2B5EF4-FFF2-40B4-BE49-F238E27FC236}">
+                <a16:creationId xmlns:a16="http://schemas.microsoft.com/office/drawing/2014/main" id="{D3971493-1200-BA08-93A2-9B8319CD5965}"/>
+              </a:ext>
+            </a:extLst>
+          </p:cNvPr>
+          <p:cNvSpPr/>
+          <p:nvPr/>
+        </p:nvSpPr>
+        <p:spPr>
+          <a:xfrm>
+            <a:off x="1189434" y="4261046"/>
+            <a:ext cx="6094520" cy="954485"/>
+          </a:xfrm>
+          <a:prstGeom prst="roundRect">
+            <a:avLst/>
+          </a:prstGeom>
+          <a:noFill/>
+        </p:spPr>
+        <p:style>
+          <a:lnRef idx="2">
+            <a:schemeClr val="accent1">
+              <a:shade val="15000"/>
+            </a:schemeClr>
+          </a:lnRef>
+          <a:fillRef idx="1">
+            <a:schemeClr val="accent1"/>
+          </a:fillRef>
+          <a:effectRef idx="0">
+            <a:schemeClr val="accent1"/>
+          </a:effectRef>
+          <a:fontRef idx="minor">
+            <a:schemeClr val="lt1"/>
+          </a:fontRef>
+        </p:style>
+        <p:txBody>
+          <a:bodyPr rtlCol="0" anchor="ctr">
+            <a:normAutofit/>
+          </a:bodyPr>
+          <a:lstStyle/>
+          <a:p>
+            <a:pPr algn="ctr"/>
+            <a:endParaRPr lang="en-GB"/>
+          </a:p>
+        </p:txBody>
+      </p:sp>
+      <p:sp>
+        <p:nvSpPr>
+          <p:cNvPr id="18" name="TextBox 17">
+            <a:extLst>
+              <a:ext uri="{FF2B5EF4-FFF2-40B4-BE49-F238E27FC236}">
+                <a16:creationId xmlns:a16="http://schemas.microsoft.com/office/drawing/2014/main" id="{901A030E-1065-70C1-854E-1535AA79FEBB}"/>
+              </a:ext>
+            </a:extLst>
+          </p:cNvPr>
+          <p:cNvSpPr txBox="1"/>
+          <p:nvPr/>
+        </p:nvSpPr>
+        <p:spPr>
+          <a:xfrm>
+            <a:off x="1189434" y="3903378"/>
+            <a:ext cx="3161096" cy="369332"/>
+          </a:xfrm>
+          <a:prstGeom prst="rect">
+            <a:avLst/>
+          </a:prstGeom>
+          <a:noFill/>
+        </p:spPr>
+        <p:txBody>
+          <a:bodyPr wrap="square" rtlCol="0">
+            <a:spAutoFit/>
+          </a:bodyPr>
+          <a:lstStyle/>
+          <a:p>
+            <a:r>
+              <a:rPr lang="en-US" dirty="0"/>
+              <a:t>Research Question 3</a:t>
+            </a:r>
+            <a:endParaRPr lang="en-GB" dirty="0"/>
+          </a:p>
+        </p:txBody>
+      </p:sp>
+      <p:sp>
+        <p:nvSpPr>
+          <p:cNvPr id="19" name="TextBox 18">
+            <a:extLst>
+              <a:ext uri="{FF2B5EF4-FFF2-40B4-BE49-F238E27FC236}">
+                <a16:creationId xmlns:a16="http://schemas.microsoft.com/office/drawing/2014/main" id="{BECE7A34-9052-6E03-7A97-16BF03014EE1}"/>
+              </a:ext>
+            </a:extLst>
+          </p:cNvPr>
+          <p:cNvSpPr txBox="1"/>
+          <p:nvPr/>
+        </p:nvSpPr>
+        <p:spPr>
+          <a:xfrm>
+            <a:off x="1189434" y="4261046"/>
+            <a:ext cx="6094520" cy="954484"/>
+          </a:xfrm>
+          <a:prstGeom prst="rect">
+            <a:avLst/>
+          </a:prstGeom>
+          <a:noFill/>
+        </p:spPr>
+        <p:txBody>
+          <a:bodyPr wrap="square">
+            <a:normAutofit/>
+          </a:bodyPr>
+          <a:lstStyle/>
+          <a:p>
+            <a:pPr algn="ctr"/>
+            <a:r>
+              <a:rPr lang="en-US" b="1" dirty="0"/>
+              <a:t>Can we design efficient aggregation algorithms for FL </a:t>
+            </a:r>
+            <a:r>
+              <a:rPr lang="en-US" dirty="0"/>
+              <a:t>that minimize the data exchange between clients and servers while not reducing the model accuracy?</a:t>
+            </a:r>
+          </a:p>
+          <a:p>
+            <a:endParaRPr lang="en-US" dirty="0"/>
+          </a:p>
+        </p:txBody>
+      </p:sp>
+      <p:sp>
+        <p:nvSpPr>
+          <p:cNvPr id="3" name="TextBox 2">
+            <a:extLst>
+              <a:ext uri="{FF2B5EF4-FFF2-40B4-BE49-F238E27FC236}">
+                <a16:creationId xmlns:a16="http://schemas.microsoft.com/office/drawing/2014/main" id="{798EF416-5B39-C9F1-1510-584667A4470E}"/>
+              </a:ext>
+            </a:extLst>
+          </p:cNvPr>
+          <p:cNvSpPr txBox="1"/>
+          <p:nvPr/>
+        </p:nvSpPr>
+        <p:spPr>
+          <a:xfrm>
+            <a:off x="5997200" y="5376185"/>
+            <a:ext cx="6094520" cy="928382"/>
+          </a:xfrm>
+          <a:prstGeom prst="rect">
+            <a:avLst/>
+          </a:prstGeom>
+          <a:noFill/>
+        </p:spPr>
+        <p:txBody>
+          <a:bodyPr wrap="square">
+            <a:normAutofit/>
+          </a:bodyPr>
+          <a:lstStyle/>
+          <a:p>
+            <a:pPr algn="ctr"/>
+            <a:r>
+              <a:rPr lang="en-US" dirty="0"/>
+              <a:t>When thinking about robust and resilient FL systems, can blockchain </a:t>
+            </a:r>
+          </a:p>
+          <a:p>
+            <a:endParaRPr lang="en-US" dirty="0"/>
+          </a:p>
+        </p:txBody>
+      </p:sp>
+      <p:sp>
+        <p:nvSpPr>
+          <p:cNvPr id="4" name="Rectangle: Rounded Corners 3">
+            <a:extLst>
+              <a:ext uri="{FF2B5EF4-FFF2-40B4-BE49-F238E27FC236}">
+                <a16:creationId xmlns:a16="http://schemas.microsoft.com/office/drawing/2014/main" id="{2316EB86-7F05-ADB4-3272-3412E8B74443}"/>
+              </a:ext>
+            </a:extLst>
+          </p:cNvPr>
+          <p:cNvSpPr/>
+          <p:nvPr/>
+        </p:nvSpPr>
+        <p:spPr>
+          <a:xfrm>
+            <a:off x="5997200" y="5338446"/>
+            <a:ext cx="6094520" cy="954485"/>
+          </a:xfrm>
+          <a:prstGeom prst="roundRect">
+            <a:avLst/>
+          </a:prstGeom>
+          <a:noFill/>
+        </p:spPr>
+        <p:style>
+          <a:lnRef idx="2">
+            <a:schemeClr val="accent1">
+              <a:shade val="15000"/>
+            </a:schemeClr>
+          </a:lnRef>
+          <a:fillRef idx="1">
+            <a:schemeClr val="accent1"/>
+          </a:fillRef>
+          <a:effectRef idx="0">
+            <a:schemeClr val="accent1"/>
+          </a:effectRef>
+          <a:fontRef idx="minor">
+            <a:schemeClr val="lt1"/>
+          </a:fontRef>
+        </p:style>
+        <p:txBody>
+          <a:bodyPr rtlCol="0" anchor="ctr">
+            <a:normAutofit/>
+          </a:bodyPr>
+          <a:lstStyle/>
+          <a:p>
+            <a:pPr algn="ctr"/>
+            <a:endParaRPr lang="en-GB"/>
+          </a:p>
+        </p:txBody>
+      </p:sp>
+    </p:spTree>
+    <p:extLst>
+      <p:ext uri="{BB962C8B-B14F-4D97-AF65-F5344CB8AC3E}">
+        <p14:creationId xmlns:p14="http://schemas.microsoft.com/office/powerpoint/2010/main" val="2844604785"/>
+      </p:ext>
+    </p:extLst>
+  </p:cSld>
+  <p:clrMapOvr>
+    <a:masterClrMapping/>
+  </p:clrMapOvr>
+</p:sld>
+</file>
+
+<file path=ppt/slides/slide6.xml><?xml version="1.0" encoding="utf-8"?>
+<p:sld xmlns:a="http://schemas.openxmlformats.org/drawingml/2006/main" xmlns:r="http://schemas.openxmlformats.org/officeDocument/2006/relationships" xmlns:p="http://schemas.openxmlformats.org/presentationml/2006/main">
+  <p:cSld>
+    <p:spTree>
+      <p:nvGrpSpPr>
+        <p:cNvPr id="1" name="">
+          <a:extLst>
+            <a:ext uri="{FF2B5EF4-FFF2-40B4-BE49-F238E27FC236}">
+              <a16:creationId xmlns:a16="http://schemas.microsoft.com/office/drawing/2014/main" id="{29336187-11AF-077D-B3F3-74C04FFF145F}"/>
+            </a:ext>
+          </a:extLst>
+        </p:cNvPr>
+        <p:cNvGrpSpPr/>
+        <p:nvPr/>
+      </p:nvGrpSpPr>
+      <p:grpSpPr>
+        <a:xfrm>
+          <a:off x="0" y="0"/>
+          <a:ext cx="0" cy="0"/>
+          <a:chOff x="0" y="0"/>
+          <a:chExt cx="0" cy="0"/>
+        </a:xfrm>
+      </p:grpSpPr>
+      <p:sp>
+        <p:nvSpPr>
+          <p:cNvPr id="2" name="Title 1">
+            <a:extLst>
+              <a:ext uri="{FF2B5EF4-FFF2-40B4-BE49-F238E27FC236}">
+                <a16:creationId xmlns:a16="http://schemas.microsoft.com/office/drawing/2014/main" id="{5EBC68A5-31C8-8E46-4543-933119126EA4}"/>
+              </a:ext>
+            </a:extLst>
+          </p:cNvPr>
+          <p:cNvSpPr>
+            <a:spLocks noGrp="1"/>
+          </p:cNvSpPr>
+          <p:nvPr>
+            <p:ph type="title"/>
+          </p:nvPr>
+        </p:nvSpPr>
+        <p:spPr/>
+        <p:txBody>
+          <a:bodyPr/>
+          <a:lstStyle/>
+          <a:p>
+            <a:pPr algn="ctr"/>
+            <a:r>
+              <a:rPr lang="en-US" dirty="0"/>
+              <a:t>Research Questions</a:t>
+            </a:r>
+            <a:endParaRPr lang="en-GB" dirty="0"/>
+          </a:p>
+        </p:txBody>
+      </p:sp>
+      <p:sp>
+        <p:nvSpPr>
+          <p:cNvPr id="8" name="TextBox 7">
+            <a:extLst>
+              <a:ext uri="{FF2B5EF4-FFF2-40B4-BE49-F238E27FC236}">
+                <a16:creationId xmlns:a16="http://schemas.microsoft.com/office/drawing/2014/main" id="{49616EDE-1929-BB49-E8B3-EA33C81C48CE}"/>
+              </a:ext>
+            </a:extLst>
+          </p:cNvPr>
+          <p:cNvSpPr txBox="1"/>
+          <p:nvPr/>
+        </p:nvSpPr>
+        <p:spPr>
+          <a:xfrm>
+            <a:off x="5862556" y="3067088"/>
+            <a:ext cx="6094520" cy="1167503"/>
+          </a:xfrm>
+          <a:prstGeom prst="rect">
+            <a:avLst/>
+          </a:prstGeom>
+          <a:noFill/>
+        </p:spPr>
+        <p:txBody>
+          <a:bodyPr wrap="square">
+            <a:normAutofit fontScale="85000" lnSpcReduction="10000"/>
+          </a:bodyPr>
+          <a:lstStyle/>
+          <a:p>
+            <a:pPr algn="ctr"/>
+            <a:r>
+              <a:rPr lang="en-US" dirty="0"/>
+              <a:t>With the ever-increasing use of IoT devices, </a:t>
+            </a:r>
+            <a:r>
+              <a:rPr lang="en-US" b="1" dirty="0"/>
+              <a:t>can FL algorithms or tools be designed to operate specifically on resources Edge devices to minimize computational and communications costs</a:t>
+            </a:r>
+            <a:r>
+              <a:rPr lang="en-US" dirty="0"/>
+              <a:t>. The models should be adaptable to non independently and identically distributed data (IID), and ideally be carried out on the device.</a:t>
+            </a:r>
+          </a:p>
+          <a:p>
+            <a:endParaRPr lang="en-US" dirty="0"/>
+          </a:p>
+        </p:txBody>
+      </p:sp>
+      <p:sp>
+        <p:nvSpPr>
+          <p:cNvPr id="10" name="TextBox 9">
+            <a:extLst>
+              <a:ext uri="{FF2B5EF4-FFF2-40B4-BE49-F238E27FC236}">
+                <a16:creationId xmlns:a16="http://schemas.microsoft.com/office/drawing/2014/main" id="{2E011869-EC12-4DF2-2BF1-0C6545DACE4E}"/>
+              </a:ext>
+            </a:extLst>
+          </p:cNvPr>
+          <p:cNvSpPr txBox="1"/>
+          <p:nvPr/>
+        </p:nvSpPr>
+        <p:spPr>
+          <a:xfrm>
+            <a:off x="1189434" y="2125202"/>
+            <a:ext cx="5468818" cy="875450"/>
+          </a:xfrm>
+          <a:prstGeom prst="rect">
+            <a:avLst/>
+          </a:prstGeom>
+          <a:noFill/>
+        </p:spPr>
+        <p:txBody>
+          <a:bodyPr wrap="square">
+            <a:normAutofit fontScale="85000" lnSpcReduction="20000"/>
+          </a:bodyPr>
+          <a:lstStyle/>
+          <a:p>
+            <a:pPr algn="ctr"/>
+            <a:r>
+              <a:rPr lang="en-US" dirty="0"/>
+              <a:t>In any large distributed network, there is a chance that some nodes can be lost, for a range of reason. </a:t>
+            </a:r>
+            <a:r>
+              <a:rPr lang="en-US" b="1" dirty="0"/>
+              <a:t>Can a FL architecture be designed to be resilient, allowing it to identify missing nodes, and adapt so that there is no loss in performance? </a:t>
+            </a:r>
+            <a:endParaRPr lang="en-GB" b="1" dirty="0"/>
+          </a:p>
+        </p:txBody>
+      </p:sp>
+      <p:sp>
+        <p:nvSpPr>
+          <p:cNvPr id="13" name="Rectangle: Rounded Corners 12">
+            <a:extLst>
+              <a:ext uri="{FF2B5EF4-FFF2-40B4-BE49-F238E27FC236}">
+                <a16:creationId xmlns:a16="http://schemas.microsoft.com/office/drawing/2014/main" id="{9D4EFA77-B219-B3C7-6A7C-6F80AE811C7A}"/>
+              </a:ext>
+            </a:extLst>
+          </p:cNvPr>
+          <p:cNvSpPr/>
+          <p:nvPr/>
+        </p:nvSpPr>
+        <p:spPr>
+          <a:xfrm>
+            <a:off x="5862556" y="3022626"/>
+            <a:ext cx="6094520" cy="1200329"/>
+          </a:xfrm>
+          <a:prstGeom prst="roundRect">
+            <a:avLst/>
+          </a:prstGeom>
+          <a:noFill/>
+        </p:spPr>
+        <p:style>
+          <a:lnRef idx="2">
+            <a:schemeClr val="accent1">
+              <a:shade val="15000"/>
+            </a:schemeClr>
+          </a:lnRef>
+          <a:fillRef idx="1">
+            <a:schemeClr val="accent1"/>
+          </a:fillRef>
+          <a:effectRef idx="0">
+            <a:schemeClr val="accent1"/>
+          </a:effectRef>
+          <a:fontRef idx="minor">
+            <a:schemeClr val="lt1"/>
+          </a:fontRef>
+        </p:style>
+        <p:txBody>
+          <a:bodyPr rtlCol="0" anchor="ctr">
+            <a:normAutofit/>
+          </a:bodyPr>
+          <a:lstStyle/>
+          <a:p>
+            <a:pPr algn="ctr"/>
+            <a:endParaRPr lang="en-GB"/>
+          </a:p>
+        </p:txBody>
+      </p:sp>
+      <p:sp>
+        <p:nvSpPr>
+          <p:cNvPr id="14" name="TextBox 13">
+            <a:extLst>
+              <a:ext uri="{FF2B5EF4-FFF2-40B4-BE49-F238E27FC236}">
+                <a16:creationId xmlns:a16="http://schemas.microsoft.com/office/drawing/2014/main" id="{2C444DD1-9238-12EF-908C-1794A1DF0440}"/>
+              </a:ext>
+            </a:extLst>
+          </p:cNvPr>
+          <p:cNvSpPr txBox="1"/>
+          <p:nvPr/>
+        </p:nvSpPr>
+        <p:spPr>
+          <a:xfrm>
+            <a:off x="1097280" y="1737847"/>
+            <a:ext cx="2109488" cy="369332"/>
+          </a:xfrm>
+          <a:prstGeom prst="rect">
+            <a:avLst/>
+          </a:prstGeom>
+          <a:noFill/>
+        </p:spPr>
+        <p:txBody>
+          <a:bodyPr wrap="none" rtlCol="0">
+            <a:spAutoFit/>
+          </a:bodyPr>
+          <a:lstStyle/>
+          <a:p>
+            <a:r>
+              <a:rPr lang="en-US" dirty="0"/>
+              <a:t>Research Question 1</a:t>
+            </a:r>
+            <a:endParaRPr lang="en-GB" dirty="0"/>
+          </a:p>
+        </p:txBody>
+      </p:sp>
+      <p:sp>
+        <p:nvSpPr>
+          <p:cNvPr id="15" name="Rectangle: Rounded Corners 14">
+            <a:extLst>
+              <a:ext uri="{FF2B5EF4-FFF2-40B4-BE49-F238E27FC236}">
+                <a16:creationId xmlns:a16="http://schemas.microsoft.com/office/drawing/2014/main" id="{4508A9F1-BA5D-F7C2-A8DF-679565A2D5FF}"/>
+              </a:ext>
+            </a:extLst>
+          </p:cNvPr>
+          <p:cNvSpPr/>
+          <p:nvPr/>
+        </p:nvSpPr>
+        <p:spPr>
+          <a:xfrm>
+            <a:off x="1189434" y="2114669"/>
+            <a:ext cx="5468818" cy="875451"/>
+          </a:xfrm>
+          <a:prstGeom prst="roundRect">
+            <a:avLst/>
+          </a:prstGeom>
+          <a:noFill/>
+        </p:spPr>
+        <p:style>
+          <a:lnRef idx="2">
+            <a:schemeClr val="accent1">
+              <a:shade val="15000"/>
+            </a:schemeClr>
+          </a:lnRef>
+          <a:fillRef idx="1">
+            <a:schemeClr val="accent1"/>
+          </a:fillRef>
+          <a:effectRef idx="0">
+            <a:schemeClr val="accent1"/>
+          </a:effectRef>
+          <a:fontRef idx="minor">
+            <a:schemeClr val="lt1"/>
+          </a:fontRef>
+        </p:style>
+        <p:txBody>
+          <a:bodyPr rtlCol="0" anchor="ctr"/>
+          <a:lstStyle/>
+          <a:p>
+            <a:pPr algn="ctr"/>
+            <a:endParaRPr lang="en-GB"/>
+          </a:p>
+        </p:txBody>
+      </p:sp>
+      <p:sp>
+        <p:nvSpPr>
+          <p:cNvPr id="16" name="TextBox 15">
+            <a:extLst>
+              <a:ext uri="{FF2B5EF4-FFF2-40B4-BE49-F238E27FC236}">
+                <a16:creationId xmlns:a16="http://schemas.microsoft.com/office/drawing/2014/main" id="{39FA9E42-CAFB-48E3-6C47-14712A0460E1}"/>
+              </a:ext>
+            </a:extLst>
+          </p:cNvPr>
+          <p:cNvSpPr txBox="1"/>
+          <p:nvPr/>
+        </p:nvSpPr>
+        <p:spPr>
+          <a:xfrm>
+            <a:off x="8600671" y="2633193"/>
+            <a:ext cx="3161096" cy="369332"/>
+          </a:xfrm>
+          <a:prstGeom prst="rect">
+            <a:avLst/>
+          </a:prstGeom>
+          <a:noFill/>
+        </p:spPr>
+        <p:txBody>
+          <a:bodyPr wrap="square" rtlCol="0">
+            <a:spAutoFit/>
+          </a:bodyPr>
+          <a:lstStyle/>
+          <a:p>
+            <a:pPr algn="r"/>
+            <a:r>
+              <a:rPr lang="en-US" dirty="0"/>
+              <a:t>Research Question 2</a:t>
+            </a:r>
+            <a:endParaRPr lang="en-GB" dirty="0"/>
+          </a:p>
+        </p:txBody>
+      </p:sp>
+      <p:sp>
+        <p:nvSpPr>
+          <p:cNvPr id="17" name="Rectangle: Rounded Corners 16">
+            <a:extLst>
+              <a:ext uri="{FF2B5EF4-FFF2-40B4-BE49-F238E27FC236}">
+                <a16:creationId xmlns:a16="http://schemas.microsoft.com/office/drawing/2014/main" id="{D21578CC-15CC-92EC-7229-046D5C3CEE6A}"/>
+              </a:ext>
+            </a:extLst>
+          </p:cNvPr>
+          <p:cNvSpPr/>
+          <p:nvPr/>
+        </p:nvSpPr>
+        <p:spPr>
+          <a:xfrm>
+            <a:off x="1189434" y="4261046"/>
+            <a:ext cx="6094520" cy="954485"/>
+          </a:xfrm>
+          <a:prstGeom prst="roundRect">
+            <a:avLst/>
+          </a:prstGeom>
+          <a:noFill/>
+        </p:spPr>
+        <p:style>
+          <a:lnRef idx="2">
+            <a:schemeClr val="accent1">
+              <a:shade val="15000"/>
+            </a:schemeClr>
+          </a:lnRef>
+          <a:fillRef idx="1">
+            <a:schemeClr val="accent1"/>
+          </a:fillRef>
+          <a:effectRef idx="0">
+            <a:schemeClr val="accent1"/>
+          </a:effectRef>
+          <a:fontRef idx="minor">
+            <a:schemeClr val="lt1"/>
+          </a:fontRef>
+        </p:style>
+        <p:txBody>
+          <a:bodyPr rtlCol="0" anchor="ctr">
+            <a:normAutofit/>
+          </a:bodyPr>
+          <a:lstStyle/>
+          <a:p>
+            <a:pPr algn="ctr"/>
+            <a:endParaRPr lang="en-GB"/>
+          </a:p>
+        </p:txBody>
+      </p:sp>
+      <p:sp>
+        <p:nvSpPr>
+          <p:cNvPr id="18" name="TextBox 17">
+            <a:extLst>
+              <a:ext uri="{FF2B5EF4-FFF2-40B4-BE49-F238E27FC236}">
+                <a16:creationId xmlns:a16="http://schemas.microsoft.com/office/drawing/2014/main" id="{2BB441D9-104D-3543-0995-9785C504B36F}"/>
+              </a:ext>
+            </a:extLst>
+          </p:cNvPr>
+          <p:cNvSpPr txBox="1"/>
+          <p:nvPr/>
+        </p:nvSpPr>
+        <p:spPr>
+          <a:xfrm>
+            <a:off x="1189434" y="3903378"/>
+            <a:ext cx="3161096" cy="369332"/>
+          </a:xfrm>
+          <a:prstGeom prst="rect">
+            <a:avLst/>
+          </a:prstGeom>
+          <a:noFill/>
+        </p:spPr>
+        <p:txBody>
+          <a:bodyPr wrap="square" rtlCol="0">
+            <a:spAutoFit/>
+          </a:bodyPr>
+          <a:lstStyle/>
+          <a:p>
+            <a:r>
+              <a:rPr lang="en-US" dirty="0"/>
+              <a:t>Research Question 3</a:t>
+            </a:r>
+            <a:endParaRPr lang="en-GB" dirty="0"/>
+          </a:p>
+        </p:txBody>
+      </p:sp>
+      <p:sp>
+        <p:nvSpPr>
+          <p:cNvPr id="19" name="TextBox 18">
+            <a:extLst>
+              <a:ext uri="{FF2B5EF4-FFF2-40B4-BE49-F238E27FC236}">
+                <a16:creationId xmlns:a16="http://schemas.microsoft.com/office/drawing/2014/main" id="{6AC0E29E-2C9A-6E0C-3F63-C28C07190676}"/>
+              </a:ext>
+            </a:extLst>
+          </p:cNvPr>
+          <p:cNvSpPr txBox="1"/>
+          <p:nvPr/>
+        </p:nvSpPr>
+        <p:spPr>
+          <a:xfrm>
+            <a:off x="1189434" y="4261046"/>
+            <a:ext cx="6094520" cy="954484"/>
+          </a:xfrm>
+          <a:prstGeom prst="rect">
+            <a:avLst/>
+          </a:prstGeom>
+          <a:noFill/>
+        </p:spPr>
+        <p:txBody>
+          <a:bodyPr wrap="square">
+            <a:normAutofit/>
+          </a:bodyPr>
+          <a:lstStyle/>
+          <a:p>
+            <a:pPr algn="ctr"/>
+            <a:r>
+              <a:rPr lang="en-US" b="1" dirty="0"/>
+              <a:t>Can we design efficient aggregation algorithms for FL </a:t>
+            </a:r>
+            <a:r>
+              <a:rPr lang="en-US" dirty="0"/>
+              <a:t>that minimize the data exchange between clients and servers while not reducing the model accuracy?</a:t>
+            </a:r>
+          </a:p>
+          <a:p>
+            <a:endParaRPr lang="en-US" dirty="0"/>
+          </a:p>
+        </p:txBody>
+      </p:sp>
+      <p:sp>
+        <p:nvSpPr>
+          <p:cNvPr id="3" name="TextBox 2">
+            <a:extLst>
+              <a:ext uri="{FF2B5EF4-FFF2-40B4-BE49-F238E27FC236}">
+                <a16:creationId xmlns:a16="http://schemas.microsoft.com/office/drawing/2014/main" id="{883692FF-0424-E482-2817-86677FBB9EAC}"/>
+              </a:ext>
+            </a:extLst>
+          </p:cNvPr>
+          <p:cNvSpPr txBox="1"/>
+          <p:nvPr/>
+        </p:nvSpPr>
+        <p:spPr>
+          <a:xfrm>
+            <a:off x="5997200" y="5376185"/>
+            <a:ext cx="6094520" cy="928382"/>
+          </a:xfrm>
+          <a:prstGeom prst="rect">
+            <a:avLst/>
+          </a:prstGeom>
+          <a:noFill/>
+        </p:spPr>
+        <p:txBody>
+          <a:bodyPr wrap="square">
+            <a:normAutofit/>
+          </a:bodyPr>
+          <a:lstStyle/>
+          <a:p>
+            <a:pPr algn="ctr"/>
+            <a:r>
+              <a:rPr lang="en-US" dirty="0"/>
+              <a:t>When thinking about robust and resilient FL systems, can blockchain </a:t>
+            </a:r>
+          </a:p>
+          <a:p>
+            <a:endParaRPr lang="en-US" dirty="0"/>
+          </a:p>
+        </p:txBody>
+      </p:sp>
+      <p:sp>
+        <p:nvSpPr>
+          <p:cNvPr id="4" name="Rectangle: Rounded Corners 3">
+            <a:extLst>
+              <a:ext uri="{FF2B5EF4-FFF2-40B4-BE49-F238E27FC236}">
+                <a16:creationId xmlns:a16="http://schemas.microsoft.com/office/drawing/2014/main" id="{34DED446-234A-C834-8B07-E6D1D3AA7F65}"/>
+              </a:ext>
+            </a:extLst>
+          </p:cNvPr>
+          <p:cNvSpPr/>
+          <p:nvPr/>
+        </p:nvSpPr>
+        <p:spPr>
+          <a:xfrm>
+            <a:off x="5997200" y="5338446"/>
+            <a:ext cx="6094520" cy="954485"/>
+          </a:xfrm>
+          <a:prstGeom prst="roundRect">
+            <a:avLst/>
+          </a:prstGeom>
+          <a:noFill/>
+        </p:spPr>
+        <p:style>
+          <a:lnRef idx="2">
+            <a:schemeClr val="accent1">
+              <a:shade val="15000"/>
+            </a:schemeClr>
+          </a:lnRef>
+          <a:fillRef idx="1">
+            <a:schemeClr val="accent1"/>
+          </a:fillRef>
+          <a:effectRef idx="0">
+            <a:schemeClr val="accent1"/>
+          </a:effectRef>
+          <a:fontRef idx="minor">
+            <a:schemeClr val="lt1"/>
+          </a:fontRef>
+        </p:style>
+        <p:txBody>
+          <a:bodyPr rtlCol="0" anchor="ctr">
+            <a:normAutofit/>
+          </a:bodyPr>
+          <a:lstStyle/>
+          <a:p>
+            <a:pPr algn="ctr"/>
+            <a:endParaRPr lang="en-GB"/>
+          </a:p>
+        </p:txBody>
+      </p:sp>
+    </p:spTree>
+    <p:extLst>
+      <p:ext uri="{BB962C8B-B14F-4D97-AF65-F5344CB8AC3E}">
+        <p14:creationId xmlns:p14="http://schemas.microsoft.com/office/powerpoint/2010/main" val="3782082519"/>
       </p:ext>
     </p:extLst>
   </p:cSld>

</xml_diff>

<commit_message>
Updated mind maps for RQ1 and 2, working on 3
</commit_message>
<xml_diff>
--- a/Presentations/Supervisor Meetings/2024/Upcoming Meeting.pptx
+++ b/Presentations/Supervisor Meetings/2024/Upcoming Meeting.pptx
@@ -7,10 +7,12 @@
   <p:sldIdLst>
     <p:sldId id="256" r:id="rId2"/>
     <p:sldId id="257" r:id="rId3"/>
-    <p:sldId id="262" r:id="rId4"/>
-    <p:sldId id="263" r:id="rId5"/>
-    <p:sldId id="264" r:id="rId6"/>
-    <p:sldId id="265" r:id="rId7"/>
+    <p:sldId id="266" r:id="rId4"/>
+    <p:sldId id="262" r:id="rId5"/>
+    <p:sldId id="267" r:id="rId6"/>
+    <p:sldId id="268" r:id="rId7"/>
+    <p:sldId id="264" r:id="rId8"/>
+    <p:sldId id="265" r:id="rId9"/>
   </p:sldIdLst>
   <p:sldSz cx="12192000" cy="6858000"/>
   <p:notesSz cx="6858000" cy="9144000"/>
@@ -120,7 +122,7 @@
 <file path=ppt/revisionInfo.xml><?xml version="1.0" encoding="utf-8"?>
 <p1510:revInfo xmlns:a="http://schemas.openxmlformats.org/drawingml/2006/main" xmlns:r="http://schemas.openxmlformats.org/officeDocument/2006/relationships" xmlns:p1510="http://schemas.microsoft.com/office/powerpoint/2015/10/main">
   <p1510:revLst>
-    <p1510:client id="{B7574C7C-3686-460F-9B9F-2A9122AA95F8}" v="34" dt="2024-02-17T12:44:38.054"/>
+    <p1510:client id="{B7574C7C-3686-460F-9B9F-2A9122AA95F8}" v="40" dt="2024-02-18T22:48:09.011"/>
   </p1510:revLst>
 </p1510:revInfo>
 </file>
@@ -1481,7 +1483,7 @@
   <pc:docChgLst>
     <pc:chgData name="Sean O Fithcheallaigh" userId="47659c31-a575-4792-8be3-61268c4ee0d6" providerId="ADAL" clId="{B7574C7C-3686-460F-9B9F-2A9122AA95F8}"/>
     <pc:docChg chg="undo custSel addSld delSld modSld modMainMaster">
-      <pc:chgData name="Sean O Fithcheallaigh" userId="47659c31-a575-4792-8be3-61268c4ee0d6" providerId="ADAL" clId="{B7574C7C-3686-460F-9B9F-2A9122AA95F8}" dt="2024-02-17T23:02:23.847" v="2225" actId="478"/>
+      <pc:chgData name="Sean O Fithcheallaigh" userId="47659c31-a575-4792-8be3-61268c4ee0d6" providerId="ADAL" clId="{B7574C7C-3686-460F-9B9F-2A9122AA95F8}" dt="2024-02-18T22:48:27.068" v="2366" actId="20577"/>
       <pc:docMkLst>
         <pc:docMk/>
       </pc:docMkLst>
@@ -1696,13 +1698,13 @@
         </pc:sldMkLst>
       </pc:sldChg>
       <pc:sldChg chg="addSp delSp modSp new mod chgLayout">
-        <pc:chgData name="Sean O Fithcheallaigh" userId="47659c31-a575-4792-8be3-61268c4ee0d6" providerId="ADAL" clId="{B7574C7C-3686-460F-9B9F-2A9122AA95F8}" dt="2024-02-17T13:15:29.275" v="2050" actId="478"/>
+        <pc:chgData name="Sean O Fithcheallaigh" userId="47659c31-a575-4792-8be3-61268c4ee0d6" providerId="ADAL" clId="{B7574C7C-3686-460F-9B9F-2A9122AA95F8}" dt="2024-02-18T20:49:53.613" v="2327" actId="1076"/>
         <pc:sldMkLst>
           <pc:docMk/>
           <pc:sldMk cId="2974212779" sldId="262"/>
         </pc:sldMkLst>
         <pc:spChg chg="mod ord">
-          <ac:chgData name="Sean O Fithcheallaigh" userId="47659c31-a575-4792-8be3-61268c4ee0d6" providerId="ADAL" clId="{B7574C7C-3686-460F-9B9F-2A9122AA95F8}" dt="2024-02-16T15:26:36.337" v="1800" actId="122"/>
+          <ac:chgData name="Sean O Fithcheallaigh" userId="47659c31-a575-4792-8be3-61268c4ee0d6" providerId="ADAL" clId="{B7574C7C-3686-460F-9B9F-2A9122AA95F8}" dt="2024-02-18T20:41:30.007" v="2312" actId="14100"/>
           <ac:spMkLst>
             <pc:docMk/>
             <pc:sldMk cId="2974212779" sldId="262"/>
@@ -1766,7 +1768,7 @@
           </ac:spMkLst>
         </pc:spChg>
         <pc:spChg chg="add mod">
-          <ac:chgData name="Sean O Fithcheallaigh" userId="47659c31-a575-4792-8be3-61268c4ee0d6" providerId="ADAL" clId="{B7574C7C-3686-460F-9B9F-2A9122AA95F8}" dt="2024-02-17T12:09:00.941" v="1932" actId="27636"/>
+          <ac:chgData name="Sean O Fithcheallaigh" userId="47659c31-a575-4792-8be3-61268c4ee0d6" providerId="ADAL" clId="{B7574C7C-3686-460F-9B9F-2A9122AA95F8}" dt="2024-02-18T19:17:53.214" v="2274" actId="1076"/>
           <ac:spMkLst>
             <pc:docMk/>
             <pc:sldMk cId="2974212779" sldId="262"/>
@@ -1789,8 +1791,8 @@
             <ac:spMk id="13" creationId="{5C025563-8660-1FD1-DCD9-043A3F3BBD94}"/>
           </ac:spMkLst>
         </pc:spChg>
-        <pc:spChg chg="add mod">
-          <ac:chgData name="Sean O Fithcheallaigh" userId="47659c31-a575-4792-8be3-61268c4ee0d6" providerId="ADAL" clId="{B7574C7C-3686-460F-9B9F-2A9122AA95F8}" dt="2024-02-16T15:25:51.110" v="1791" actId="1076"/>
+        <pc:spChg chg="add del mod">
+          <ac:chgData name="Sean O Fithcheallaigh" userId="47659c31-a575-4792-8be3-61268c4ee0d6" providerId="ADAL" clId="{B7574C7C-3686-460F-9B9F-2A9122AA95F8}" dt="2024-02-18T16:19:23.567" v="2238" actId="478"/>
           <ac:spMkLst>
             <pc:docMk/>
             <pc:sldMk cId="2974212779" sldId="262"/>
@@ -1798,7 +1800,7 @@
           </ac:spMkLst>
         </pc:spChg>
         <pc:spChg chg="add mod">
-          <ac:chgData name="Sean O Fithcheallaigh" userId="47659c31-a575-4792-8be3-61268c4ee0d6" providerId="ADAL" clId="{B7574C7C-3686-460F-9B9F-2A9122AA95F8}" dt="2024-02-17T12:09:06.466" v="1933" actId="14100"/>
+          <ac:chgData name="Sean O Fithcheallaigh" userId="47659c31-a575-4792-8be3-61268c4ee0d6" providerId="ADAL" clId="{B7574C7C-3686-460F-9B9F-2A9122AA95F8}" dt="2024-02-18T19:17:49.008" v="2273" actId="1076"/>
           <ac:spMkLst>
             <pc:docMk/>
             <pc:sldMk cId="2974212779" sldId="262"/>
@@ -1845,13 +1847,53 @@
             <ac:graphicFrameMk id="4" creationId="{214AC544-048D-9AC6-C15B-95DB87E65341}"/>
           </ac:graphicFrameMkLst>
         </pc:graphicFrameChg>
+        <pc:picChg chg="add del mod">
+          <ac:chgData name="Sean O Fithcheallaigh" userId="47659c31-a575-4792-8be3-61268c4ee0d6" providerId="ADAL" clId="{B7574C7C-3686-460F-9B9F-2A9122AA95F8}" dt="2024-02-18T16:29:52.594" v="2245" actId="478"/>
+          <ac:picMkLst>
+            <pc:docMk/>
+            <pc:sldMk cId="2974212779" sldId="262"/>
+            <ac:picMk id="4" creationId="{78E2A836-BB30-4A56-2D0C-090F483D8876}"/>
+          </ac:picMkLst>
+        </pc:picChg>
+        <pc:picChg chg="add del mod">
+          <ac:chgData name="Sean O Fithcheallaigh" userId="47659c31-a575-4792-8be3-61268c4ee0d6" providerId="ADAL" clId="{B7574C7C-3686-460F-9B9F-2A9122AA95F8}" dt="2024-02-18T16:30:09.955" v="2249" actId="478"/>
+          <ac:picMkLst>
+            <pc:docMk/>
+            <pc:sldMk cId="2974212779" sldId="262"/>
+            <ac:picMk id="6" creationId="{F0F96907-03E4-221E-32B8-3C8C770636C7}"/>
+          </ac:picMkLst>
+        </pc:picChg>
+        <pc:picChg chg="add del mod">
+          <ac:chgData name="Sean O Fithcheallaigh" userId="47659c31-a575-4792-8be3-61268c4ee0d6" providerId="ADAL" clId="{B7574C7C-3686-460F-9B9F-2A9122AA95F8}" dt="2024-02-18T20:49:13.848" v="2316" actId="478"/>
+          <ac:picMkLst>
+            <pc:docMk/>
+            <pc:sldMk cId="2974212779" sldId="262"/>
+            <ac:picMk id="8" creationId="{EBB4193B-BC40-8F38-0423-92474BD5FFC2}"/>
+          </ac:picMkLst>
+        </pc:picChg>
+        <pc:picChg chg="add mod ord">
+          <ac:chgData name="Sean O Fithcheallaigh" userId="47659c31-a575-4792-8be3-61268c4ee0d6" providerId="ADAL" clId="{B7574C7C-3686-460F-9B9F-2A9122AA95F8}" dt="2024-02-18T20:49:53.613" v="2327" actId="1076"/>
+          <ac:picMkLst>
+            <pc:docMk/>
+            <pc:sldMk cId="2974212779" sldId="262"/>
+            <ac:picMk id="11" creationId="{3184CB76-7485-B103-EC60-6AC34C95110F}"/>
+          </ac:picMkLst>
+        </pc:picChg>
       </pc:sldChg>
-      <pc:sldChg chg="delSp modSp add mod">
-        <pc:chgData name="Sean O Fithcheallaigh" userId="47659c31-a575-4792-8be3-61268c4ee0d6" providerId="ADAL" clId="{B7574C7C-3686-460F-9B9F-2A9122AA95F8}" dt="2024-02-17T23:02:23.847" v="2225" actId="478"/>
+      <pc:sldChg chg="delSp modSp add del mod">
+        <pc:chgData name="Sean O Fithcheallaigh" userId="47659c31-a575-4792-8be3-61268c4ee0d6" providerId="ADAL" clId="{B7574C7C-3686-460F-9B9F-2A9122AA95F8}" dt="2024-02-18T22:47:32.309" v="2350" actId="47"/>
         <pc:sldMkLst>
           <pc:docMk/>
           <pc:sldMk cId="2342086455" sldId="263"/>
         </pc:sldMkLst>
+        <pc:spChg chg="mod">
+          <ac:chgData name="Sean O Fithcheallaigh" userId="47659c31-a575-4792-8be3-61268c4ee0d6" providerId="ADAL" clId="{B7574C7C-3686-460F-9B9F-2A9122AA95F8}" dt="2024-02-18T20:41:41.742" v="2313" actId="1076"/>
+          <ac:spMkLst>
+            <pc:docMk/>
+            <pc:sldMk cId="2342086455" sldId="263"/>
+            <ac:spMk id="2" creationId="{5B79BE80-421F-E0A2-E347-1FB3E87F24E8}"/>
+          </ac:spMkLst>
+        </pc:spChg>
         <pc:spChg chg="del">
           <ac:chgData name="Sean O Fithcheallaigh" userId="47659c31-a575-4792-8be3-61268c4ee0d6" providerId="ADAL" clId="{B7574C7C-3686-460F-9B9F-2A9122AA95F8}" dt="2024-02-17T23:02:23.847" v="2225" actId="478"/>
           <ac:spMkLst>
@@ -1868,8 +1910,8 @@
             <ac:spMk id="4" creationId="{2E49B197-D6B9-413F-11AC-DD26215C40C2}"/>
           </ac:spMkLst>
         </pc:spChg>
-        <pc:spChg chg="mod">
-          <ac:chgData name="Sean O Fithcheallaigh" userId="47659c31-a575-4792-8be3-61268c4ee0d6" providerId="ADAL" clId="{B7574C7C-3686-460F-9B9F-2A9122AA95F8}" dt="2024-02-17T23:00:23.348" v="2220" actId="20577"/>
+        <pc:spChg chg="del mod">
+          <ac:chgData name="Sean O Fithcheallaigh" userId="47659c31-a575-4792-8be3-61268c4ee0d6" providerId="ADAL" clId="{B7574C7C-3686-460F-9B9F-2A9122AA95F8}" dt="2024-02-18T22:43:06.398" v="2331" actId="21"/>
           <ac:spMkLst>
             <pc:docMk/>
             <pc:sldMk cId="2342086455" sldId="263"/>
@@ -1884,6 +1926,14 @@
             <ac:spMk id="10" creationId="{40CF2482-4A72-927A-E174-2D0AD48759E7}"/>
           </ac:spMkLst>
         </pc:spChg>
+        <pc:spChg chg="del mod">
+          <ac:chgData name="Sean O Fithcheallaigh" userId="47659c31-a575-4792-8be3-61268c4ee0d6" providerId="ADAL" clId="{B7574C7C-3686-460F-9B9F-2A9122AA95F8}" dt="2024-02-18T22:42:58.878" v="2330" actId="21"/>
+          <ac:spMkLst>
+            <pc:docMk/>
+            <pc:sldMk cId="2342086455" sldId="263"/>
+            <ac:spMk id="13" creationId="{C4D43637-DC10-B3A5-5029-8D1C5ADAC38A}"/>
+          </ac:spMkLst>
+        </pc:spChg>
         <pc:spChg chg="del">
           <ac:chgData name="Sean O Fithcheallaigh" userId="47659c31-a575-4792-8be3-61268c4ee0d6" providerId="ADAL" clId="{B7574C7C-3686-460F-9B9F-2A9122AA95F8}" dt="2024-02-17T22:53:47.449" v="2053" actId="478"/>
           <ac:spMkLst>
@@ -1901,6 +1951,14 @@
           </ac:spMkLst>
         </pc:spChg>
         <pc:spChg chg="del">
+          <ac:chgData name="Sean O Fithcheallaigh" userId="47659c31-a575-4792-8be3-61268c4ee0d6" providerId="ADAL" clId="{B7574C7C-3686-460F-9B9F-2A9122AA95F8}" dt="2024-02-18T20:41:50.876" v="2315" actId="478"/>
+          <ac:spMkLst>
+            <pc:docMk/>
+            <pc:sldMk cId="2342086455" sldId="263"/>
+            <ac:spMk id="16" creationId="{B8B448B7-BD48-5613-6948-EFF3941D1E25}"/>
+          </ac:spMkLst>
+        </pc:spChg>
+        <pc:spChg chg="del">
           <ac:chgData name="Sean O Fithcheallaigh" userId="47659c31-a575-4792-8be3-61268c4ee0d6" providerId="ADAL" clId="{B7574C7C-3686-460F-9B9F-2A9122AA95F8}" dt="2024-02-17T23:02:18.332" v="2223" actId="478"/>
           <ac:spMkLst>
             <pc:docMk/>
@@ -1925,12 +1983,84 @@
           </ac:spMkLst>
         </pc:spChg>
       </pc:sldChg>
-      <pc:sldChg chg="add">
-        <pc:chgData name="Sean O Fithcheallaigh" userId="47659c31-a575-4792-8be3-61268c4ee0d6" providerId="ADAL" clId="{B7574C7C-3686-460F-9B9F-2A9122AA95F8}" dt="2024-02-17T12:30:54.602" v="2029" actId="2890"/>
+      <pc:sldChg chg="delSp add mod">
+        <pc:chgData name="Sean O Fithcheallaigh" userId="47659c31-a575-4792-8be3-61268c4ee0d6" providerId="ADAL" clId="{B7574C7C-3686-460F-9B9F-2A9122AA95F8}" dt="2024-02-18T22:48:06.552" v="2358" actId="21"/>
         <pc:sldMkLst>
           <pc:docMk/>
           <pc:sldMk cId="2844604785" sldId="264"/>
         </pc:sldMkLst>
+        <pc:spChg chg="del">
+          <ac:chgData name="Sean O Fithcheallaigh" userId="47659c31-a575-4792-8be3-61268c4ee0d6" providerId="ADAL" clId="{B7574C7C-3686-460F-9B9F-2A9122AA95F8}" dt="2024-02-18T22:47:46.593" v="2354" actId="478"/>
+          <ac:spMkLst>
+            <pc:docMk/>
+            <pc:sldMk cId="2844604785" sldId="264"/>
+            <ac:spMk id="3" creationId="{798EF416-5B39-C9F1-1510-584667A4470E}"/>
+          </ac:spMkLst>
+        </pc:spChg>
+        <pc:spChg chg="del">
+          <ac:chgData name="Sean O Fithcheallaigh" userId="47659c31-a575-4792-8be3-61268c4ee0d6" providerId="ADAL" clId="{B7574C7C-3686-460F-9B9F-2A9122AA95F8}" dt="2024-02-18T22:47:43.869" v="2353" actId="478"/>
+          <ac:spMkLst>
+            <pc:docMk/>
+            <pc:sldMk cId="2844604785" sldId="264"/>
+            <ac:spMk id="4" creationId="{2316EB86-7F05-ADB4-3272-3412E8B74443}"/>
+          </ac:spMkLst>
+        </pc:spChg>
+        <pc:spChg chg="del">
+          <ac:chgData name="Sean O Fithcheallaigh" userId="47659c31-a575-4792-8be3-61268c4ee0d6" providerId="ADAL" clId="{B7574C7C-3686-460F-9B9F-2A9122AA95F8}" dt="2024-02-18T22:47:38.466" v="2351" actId="478"/>
+          <ac:spMkLst>
+            <pc:docMk/>
+            <pc:sldMk cId="2844604785" sldId="264"/>
+            <ac:spMk id="8" creationId="{FA70DBE6-F2CC-FDE2-2144-5B6F2D7D2FD5}"/>
+          </ac:spMkLst>
+        </pc:spChg>
+        <pc:spChg chg="del">
+          <ac:chgData name="Sean O Fithcheallaigh" userId="47659c31-a575-4792-8be3-61268c4ee0d6" providerId="ADAL" clId="{B7574C7C-3686-460F-9B9F-2A9122AA95F8}" dt="2024-02-18T22:47:38.466" v="2351" actId="478"/>
+          <ac:spMkLst>
+            <pc:docMk/>
+            <pc:sldMk cId="2844604785" sldId="264"/>
+            <ac:spMk id="10" creationId="{6E99B88D-6F92-B1DC-8047-0B3100A9A188}"/>
+          </ac:spMkLst>
+        </pc:spChg>
+        <pc:spChg chg="del">
+          <ac:chgData name="Sean O Fithcheallaigh" userId="47659c31-a575-4792-8be3-61268c4ee0d6" providerId="ADAL" clId="{B7574C7C-3686-460F-9B9F-2A9122AA95F8}" dt="2024-02-18T22:47:38.466" v="2351" actId="478"/>
+          <ac:spMkLst>
+            <pc:docMk/>
+            <pc:sldMk cId="2844604785" sldId="264"/>
+            <ac:spMk id="13" creationId="{A4B880AF-35B5-94F0-1879-5389614D86B2}"/>
+          </ac:spMkLst>
+        </pc:spChg>
+        <pc:spChg chg="del">
+          <ac:chgData name="Sean O Fithcheallaigh" userId="47659c31-a575-4792-8be3-61268c4ee0d6" providerId="ADAL" clId="{B7574C7C-3686-460F-9B9F-2A9122AA95F8}" dt="2024-02-18T22:47:41.017" v="2352" actId="478"/>
+          <ac:spMkLst>
+            <pc:docMk/>
+            <pc:sldMk cId="2844604785" sldId="264"/>
+            <ac:spMk id="14" creationId="{E582B5D7-66CD-0F41-2C6E-776FDD04B7E7}"/>
+          </ac:spMkLst>
+        </pc:spChg>
+        <pc:spChg chg="del">
+          <ac:chgData name="Sean O Fithcheallaigh" userId="47659c31-a575-4792-8be3-61268c4ee0d6" providerId="ADAL" clId="{B7574C7C-3686-460F-9B9F-2A9122AA95F8}" dt="2024-02-18T22:47:38.466" v="2351" actId="478"/>
+          <ac:spMkLst>
+            <pc:docMk/>
+            <pc:sldMk cId="2844604785" sldId="264"/>
+            <ac:spMk id="15" creationId="{7E3C0550-7240-1B08-C482-CC122976F15D}"/>
+          </ac:spMkLst>
+        </pc:spChg>
+        <pc:spChg chg="del">
+          <ac:chgData name="Sean O Fithcheallaigh" userId="47659c31-a575-4792-8be3-61268c4ee0d6" providerId="ADAL" clId="{B7574C7C-3686-460F-9B9F-2A9122AA95F8}" dt="2024-02-18T22:47:38.466" v="2351" actId="478"/>
+          <ac:spMkLst>
+            <pc:docMk/>
+            <pc:sldMk cId="2844604785" sldId="264"/>
+            <ac:spMk id="16" creationId="{BF024E74-A5FC-E1F3-DFE2-7B36BA1E30D7}"/>
+          </ac:spMkLst>
+        </pc:spChg>
+        <pc:spChg chg="del">
+          <ac:chgData name="Sean O Fithcheallaigh" userId="47659c31-a575-4792-8be3-61268c4ee0d6" providerId="ADAL" clId="{B7574C7C-3686-460F-9B9F-2A9122AA95F8}" dt="2024-02-18T22:48:06.552" v="2358" actId="21"/>
+          <ac:spMkLst>
+            <pc:docMk/>
+            <pc:sldMk cId="2844604785" sldId="264"/>
+            <ac:spMk id="19" creationId="{BECE7A34-9052-6E03-7A97-16BF03014EE1}"/>
+          </ac:spMkLst>
+        </pc:spChg>
       </pc:sldChg>
       <pc:sldChg chg="add">
         <pc:chgData name="Sean O Fithcheallaigh" userId="47659c31-a575-4792-8be3-61268c4ee0d6" providerId="ADAL" clId="{B7574C7C-3686-460F-9B9F-2A9122AA95F8}" dt="2024-02-17T12:30:56.947" v="2030" actId="2890"/>
@@ -1938,6 +2068,131 @@
           <pc:docMk/>
           <pc:sldMk cId="3782082519" sldId="265"/>
         </pc:sldMkLst>
+      </pc:sldChg>
+      <pc:sldChg chg="addSp delSp modSp new mod modClrScheme chgLayout">
+        <pc:chgData name="Sean O Fithcheallaigh" userId="47659c31-a575-4792-8be3-61268c4ee0d6" providerId="ADAL" clId="{B7574C7C-3686-460F-9B9F-2A9122AA95F8}" dt="2024-02-18T19:19:17.093" v="2304" actId="20577"/>
+        <pc:sldMkLst>
+          <pc:docMk/>
+          <pc:sldMk cId="3569103075" sldId="266"/>
+        </pc:sldMkLst>
+        <pc:spChg chg="del mod ord">
+          <ac:chgData name="Sean O Fithcheallaigh" userId="47659c31-a575-4792-8be3-61268c4ee0d6" providerId="ADAL" clId="{B7574C7C-3686-460F-9B9F-2A9122AA95F8}" dt="2024-02-18T19:19:08.900" v="2276" actId="700"/>
+          <ac:spMkLst>
+            <pc:docMk/>
+            <pc:sldMk cId="3569103075" sldId="266"/>
+            <ac:spMk id="2" creationId="{58A0204D-35E3-6FD5-EA9E-669E4C135158}"/>
+          </ac:spMkLst>
+        </pc:spChg>
+        <pc:spChg chg="del mod ord">
+          <ac:chgData name="Sean O Fithcheallaigh" userId="47659c31-a575-4792-8be3-61268c4ee0d6" providerId="ADAL" clId="{B7574C7C-3686-460F-9B9F-2A9122AA95F8}" dt="2024-02-18T19:19:08.900" v="2276" actId="700"/>
+          <ac:spMkLst>
+            <pc:docMk/>
+            <pc:sldMk cId="3569103075" sldId="266"/>
+            <ac:spMk id="3" creationId="{4ACFB99E-B9F5-54A3-8557-98F72C48E0BE}"/>
+          </ac:spMkLst>
+        </pc:spChg>
+        <pc:spChg chg="add mod ord">
+          <ac:chgData name="Sean O Fithcheallaigh" userId="47659c31-a575-4792-8be3-61268c4ee0d6" providerId="ADAL" clId="{B7574C7C-3686-460F-9B9F-2A9122AA95F8}" dt="2024-02-18T19:19:17.093" v="2304" actId="20577"/>
+          <ac:spMkLst>
+            <pc:docMk/>
+            <pc:sldMk cId="3569103075" sldId="266"/>
+            <ac:spMk id="4" creationId="{508FEA84-3B56-F047-1C08-7BE2118BD8D1}"/>
+          </ac:spMkLst>
+        </pc:spChg>
+        <pc:spChg chg="add mod ord">
+          <ac:chgData name="Sean O Fithcheallaigh" userId="47659c31-a575-4792-8be3-61268c4ee0d6" providerId="ADAL" clId="{B7574C7C-3686-460F-9B9F-2A9122AA95F8}" dt="2024-02-18T19:19:08.900" v="2276" actId="700"/>
+          <ac:spMkLst>
+            <pc:docMk/>
+            <pc:sldMk cId="3569103075" sldId="266"/>
+            <ac:spMk id="5" creationId="{C4C0E46C-8317-9684-2C90-0F282F80E8C6}"/>
+          </ac:spMkLst>
+        </pc:spChg>
+      </pc:sldChg>
+      <pc:sldChg chg="addSp delSp modSp add mod">
+        <pc:chgData name="Sean O Fithcheallaigh" userId="47659c31-a575-4792-8be3-61268c4ee0d6" providerId="ADAL" clId="{B7574C7C-3686-460F-9B9F-2A9122AA95F8}" dt="2024-02-18T22:47:16.484" v="2349" actId="1076"/>
+        <pc:sldMkLst>
+          <pc:docMk/>
+          <pc:sldMk cId="788743055" sldId="267"/>
+        </pc:sldMkLst>
+        <pc:spChg chg="mod">
+          <ac:chgData name="Sean O Fithcheallaigh" userId="47659c31-a575-4792-8be3-61268c4ee0d6" providerId="ADAL" clId="{B7574C7C-3686-460F-9B9F-2A9122AA95F8}" dt="2024-02-18T22:44:31.320" v="2342" actId="20577"/>
+          <ac:spMkLst>
+            <pc:docMk/>
+            <pc:sldMk cId="788743055" sldId="267"/>
+            <ac:spMk id="2" creationId="{31E878F4-4676-0EB5-3DD7-1EBC366A2B7F}"/>
+          </ac:spMkLst>
+        </pc:spChg>
+        <pc:spChg chg="add mod">
+          <ac:chgData name="Sean O Fithcheallaigh" userId="47659c31-a575-4792-8be3-61268c4ee0d6" providerId="ADAL" clId="{B7574C7C-3686-460F-9B9F-2A9122AA95F8}" dt="2024-02-18T22:43:33.586" v="2340" actId="14100"/>
+          <ac:spMkLst>
+            <pc:docMk/>
+            <pc:sldMk cId="788743055" sldId="267"/>
+            <ac:spMk id="8" creationId="{4122F22F-CC6A-21A3-E65B-6D9079943A2F}"/>
+          </ac:spMkLst>
+        </pc:spChg>
+        <pc:spChg chg="del">
+          <ac:chgData name="Sean O Fithcheallaigh" userId="47659c31-a575-4792-8be3-61268c4ee0d6" providerId="ADAL" clId="{B7574C7C-3686-460F-9B9F-2A9122AA95F8}" dt="2024-02-18T22:43:15.694" v="2334" actId="478"/>
+          <ac:spMkLst>
+            <pc:docMk/>
+            <pc:sldMk cId="788743055" sldId="267"/>
+            <ac:spMk id="10" creationId="{EBD7B968-9147-3196-3B41-5DCD0408049E}"/>
+          </ac:spMkLst>
+        </pc:spChg>
+        <pc:picChg chg="add mod">
+          <ac:chgData name="Sean O Fithcheallaigh" userId="47659c31-a575-4792-8be3-61268c4ee0d6" providerId="ADAL" clId="{B7574C7C-3686-460F-9B9F-2A9122AA95F8}" dt="2024-02-18T22:47:16.484" v="2349" actId="1076"/>
+          <ac:picMkLst>
+            <pc:docMk/>
+            <pc:sldMk cId="788743055" sldId="267"/>
+            <ac:picMk id="4" creationId="{5B56D578-CB51-F8CE-5FB9-835BB51C03E6}"/>
+          </ac:picMkLst>
+        </pc:picChg>
+        <pc:picChg chg="del">
+          <ac:chgData name="Sean O Fithcheallaigh" userId="47659c31-a575-4792-8be3-61268c4ee0d6" providerId="ADAL" clId="{B7574C7C-3686-460F-9B9F-2A9122AA95F8}" dt="2024-02-18T22:42:49.899" v="2329" actId="478"/>
+          <ac:picMkLst>
+            <pc:docMk/>
+            <pc:sldMk cId="788743055" sldId="267"/>
+            <ac:picMk id="11" creationId="{67D64EEE-BB37-E2DC-9FC5-A3328D7FC911}"/>
+          </ac:picMkLst>
+        </pc:picChg>
+      </pc:sldChg>
+      <pc:sldChg chg="addSp delSp modSp add mod">
+        <pc:chgData name="Sean O Fithcheallaigh" userId="47659c31-a575-4792-8be3-61268c4ee0d6" providerId="ADAL" clId="{B7574C7C-3686-460F-9B9F-2A9122AA95F8}" dt="2024-02-18T22:48:27.068" v="2366" actId="20577"/>
+        <pc:sldMkLst>
+          <pc:docMk/>
+          <pc:sldMk cId="3408599131" sldId="268"/>
+        </pc:sldMkLst>
+        <pc:spChg chg="mod">
+          <ac:chgData name="Sean O Fithcheallaigh" userId="47659c31-a575-4792-8be3-61268c4ee0d6" providerId="ADAL" clId="{B7574C7C-3686-460F-9B9F-2A9122AA95F8}" dt="2024-02-18T22:48:27.068" v="2366" actId="20577"/>
+          <ac:spMkLst>
+            <pc:docMk/>
+            <pc:sldMk cId="3408599131" sldId="268"/>
+            <ac:spMk id="2" creationId="{1FD7FD30-CABE-80F9-096F-63AAA66F52B5}"/>
+          </ac:spMkLst>
+        </pc:spChg>
+        <pc:spChg chg="del">
+          <ac:chgData name="Sean O Fithcheallaigh" userId="47659c31-a575-4792-8be3-61268c4ee0d6" providerId="ADAL" clId="{B7574C7C-3686-460F-9B9F-2A9122AA95F8}" dt="2024-02-18T22:47:58.766" v="2357" actId="478"/>
+          <ac:spMkLst>
+            <pc:docMk/>
+            <pc:sldMk cId="3408599131" sldId="268"/>
+            <ac:spMk id="8" creationId="{ECDC8963-F3CA-1767-4B50-D3AA031E3DD1}"/>
+          </ac:spMkLst>
+        </pc:spChg>
+        <pc:spChg chg="add mod">
+          <ac:chgData name="Sean O Fithcheallaigh" userId="47659c31-a575-4792-8be3-61268c4ee0d6" providerId="ADAL" clId="{B7574C7C-3686-460F-9B9F-2A9122AA95F8}" dt="2024-02-18T22:48:22.535" v="2364" actId="14100"/>
+          <ac:spMkLst>
+            <pc:docMk/>
+            <pc:sldMk cId="3408599131" sldId="268"/>
+            <ac:spMk id="19" creationId="{BECE7A34-9052-6E03-7A97-16BF03014EE1}"/>
+          </ac:spMkLst>
+        </pc:spChg>
+        <pc:picChg chg="del">
+          <ac:chgData name="Sean O Fithcheallaigh" userId="47659c31-a575-4792-8be3-61268c4ee0d6" providerId="ADAL" clId="{B7574C7C-3686-460F-9B9F-2A9122AA95F8}" dt="2024-02-18T22:47:54.990" v="2356" actId="478"/>
+          <ac:picMkLst>
+            <pc:docMk/>
+            <pc:sldMk cId="3408599131" sldId="268"/>
+            <ac:picMk id="4" creationId="{12015CF4-D7D8-79EE-6E57-27DB24F8A48D}"/>
+          </ac:picMkLst>
+        </pc:picChg>
       </pc:sldChg>
       <pc:sldMasterChg chg="modSldLayout">
         <pc:chgData name="Sean O Fithcheallaigh" userId="47659c31-a575-4792-8be3-61268c4ee0d6" providerId="ADAL" clId="{B7574C7C-3686-460F-9B9F-2A9122AA95F8}" dt="2024-02-13T19:56:02.820" v="272"/>
@@ -2242,7 +2497,7 @@
           <a:p>
             <a:fld id="{0CD94E99-FA29-4EFF-88BE-3447E30E8C4D}" type="datetimeFigureOut">
               <a:rPr lang="en-GB" smtClean="0"/>
-              <a:t>17/02/2024</a:t>
+              <a:t>18/02/2024</a:t>
             </a:fld>
             <a:endParaRPr lang="en-GB"/>
           </a:p>
@@ -2450,7 +2705,7 @@
           <a:p>
             <a:fld id="{0CD94E99-FA29-4EFF-88BE-3447E30E8C4D}" type="datetimeFigureOut">
               <a:rPr lang="en-GB" smtClean="0"/>
-              <a:t>17/02/2024</a:t>
+              <a:t>18/02/2024</a:t>
             </a:fld>
             <a:endParaRPr lang="en-GB"/>
           </a:p>
@@ -2708,7 +2963,7 @@
           <a:p>
             <a:fld id="{0CD94E99-FA29-4EFF-88BE-3447E30E8C4D}" type="datetimeFigureOut">
               <a:rPr lang="en-GB" smtClean="0"/>
-              <a:t>17/02/2024</a:t>
+              <a:t>18/02/2024</a:t>
             </a:fld>
             <a:endParaRPr lang="en-GB"/>
           </a:p>
@@ -2886,7 +3141,7 @@
           <a:p>
             <a:fld id="{0CD94E99-FA29-4EFF-88BE-3447E30E8C4D}" type="datetimeFigureOut">
               <a:rPr lang="en-GB" smtClean="0"/>
-              <a:t>17/02/2024</a:t>
+              <a:t>18/02/2024</a:t>
             </a:fld>
             <a:endParaRPr lang="en-GB"/>
           </a:p>
@@ -3223,7 +3478,7 @@
           <a:p>
             <a:fld id="{0CD94E99-FA29-4EFF-88BE-3447E30E8C4D}" type="datetimeFigureOut">
               <a:rPr lang="en-GB" smtClean="0"/>
-              <a:t>17/02/2024</a:t>
+              <a:t>18/02/2024</a:t>
             </a:fld>
             <a:endParaRPr lang="en-GB"/>
           </a:p>
@@ -3503,7 +3758,7 @@
           <a:p>
             <a:fld id="{0CD94E99-FA29-4EFF-88BE-3447E30E8C4D}" type="datetimeFigureOut">
               <a:rPr lang="en-GB" smtClean="0"/>
-              <a:t>17/02/2024</a:t>
+              <a:t>18/02/2024</a:t>
             </a:fld>
             <a:endParaRPr lang="en-GB"/>
           </a:p>
@@ -3882,7 +4137,7 @@
           <a:p>
             <a:fld id="{0CD94E99-FA29-4EFF-88BE-3447E30E8C4D}" type="datetimeFigureOut">
               <a:rPr lang="en-GB" smtClean="0"/>
-              <a:t>17/02/2024</a:t>
+              <a:t>18/02/2024</a:t>
             </a:fld>
             <a:endParaRPr lang="en-GB"/>
           </a:p>
@@ -4000,7 +4255,7 @@
           <a:p>
             <a:fld id="{0CD94E99-FA29-4EFF-88BE-3447E30E8C4D}" type="datetimeFigureOut">
               <a:rPr lang="en-GB" smtClean="0"/>
-              <a:t>17/02/2024</a:t>
+              <a:t>18/02/2024</a:t>
             </a:fld>
             <a:endParaRPr lang="en-GB"/>
           </a:p>
@@ -4173,7 +4428,7 @@
           <a:p>
             <a:fld id="{0CD94E99-FA29-4EFF-88BE-3447E30E8C4D}" type="datetimeFigureOut">
               <a:rPr lang="en-GB" smtClean="0"/>
-              <a:t>17/02/2024</a:t>
+              <a:t>18/02/2024</a:t>
             </a:fld>
             <a:endParaRPr lang="en-GB"/>
           </a:p>
@@ -4529,7 +4784,7 @@
           <a:p>
             <a:fld id="{0CD94E99-FA29-4EFF-88BE-3447E30E8C4D}" type="datetimeFigureOut">
               <a:rPr lang="en-GB" smtClean="0"/>
-              <a:t>17/02/2024</a:t>
+              <a:t>18/02/2024</a:t>
             </a:fld>
             <a:endParaRPr lang="en-GB"/>
           </a:p>
@@ -4908,7 +5163,7 @@
           <a:p>
             <a:fld id="{0CD94E99-FA29-4EFF-88BE-3447E30E8C4D}" type="datetimeFigureOut">
               <a:rPr lang="en-GB" smtClean="0"/>
-              <a:t>17/02/2024</a:t>
+              <a:t>18/02/2024</a:t>
             </a:fld>
             <a:endParaRPr lang="en-GB"/>
           </a:p>
@@ -5197,7 +5452,7 @@
           <a:p>
             <a:fld id="{0CD94E99-FA29-4EFF-88BE-3447E30E8C4D}" type="datetimeFigureOut">
               <a:rPr lang="en-GB" smtClean="0"/>
-              <a:t>17/02/2024</a:t>
+              <a:t>18/02/2024</a:t>
             </a:fld>
             <a:endParaRPr lang="en-GB"/>
           </a:p>
@@ -6341,6 +6596,90 @@
       </p:grpSpPr>
       <p:sp>
         <p:nvSpPr>
+          <p:cNvPr id="4" name="Title 3">
+            <a:extLst>
+              <a:ext uri="{FF2B5EF4-FFF2-40B4-BE49-F238E27FC236}">
+                <a16:creationId xmlns:a16="http://schemas.microsoft.com/office/drawing/2014/main" id="{508FEA84-3B56-F047-1C08-7BE2118BD8D1}"/>
+              </a:ext>
+            </a:extLst>
+          </p:cNvPr>
+          <p:cNvSpPr>
+            <a:spLocks noGrp="1"/>
+          </p:cNvSpPr>
+          <p:nvPr>
+            <p:ph type="ctrTitle"/>
+          </p:nvPr>
+        </p:nvSpPr>
+        <p:spPr/>
+        <p:txBody>
+          <a:bodyPr/>
+          <a:lstStyle/>
+          <a:p>
+            <a:r>
+              <a:rPr lang="en-US" dirty="0"/>
+              <a:t>Exploring Research Questions</a:t>
+            </a:r>
+            <a:endParaRPr lang="en-GB" dirty="0"/>
+          </a:p>
+        </p:txBody>
+      </p:sp>
+      <p:sp>
+        <p:nvSpPr>
+          <p:cNvPr id="5" name="Subtitle 4">
+            <a:extLst>
+              <a:ext uri="{FF2B5EF4-FFF2-40B4-BE49-F238E27FC236}">
+                <a16:creationId xmlns:a16="http://schemas.microsoft.com/office/drawing/2014/main" id="{C4C0E46C-8317-9684-2C90-0F282F80E8C6}"/>
+              </a:ext>
+            </a:extLst>
+          </p:cNvPr>
+          <p:cNvSpPr>
+            <a:spLocks noGrp="1"/>
+          </p:cNvSpPr>
+          <p:nvPr>
+            <p:ph type="subTitle" idx="1"/>
+          </p:nvPr>
+        </p:nvSpPr>
+        <p:spPr/>
+        <p:txBody>
+          <a:bodyPr/>
+          <a:lstStyle/>
+          <a:p>
+            <a:endParaRPr lang="en-GB"/>
+          </a:p>
+        </p:txBody>
+      </p:sp>
+    </p:spTree>
+    <p:extLst>
+      <p:ext uri="{BB962C8B-B14F-4D97-AF65-F5344CB8AC3E}">
+        <p14:creationId xmlns:p14="http://schemas.microsoft.com/office/powerpoint/2010/main" val="3569103075"/>
+      </p:ext>
+    </p:extLst>
+  </p:cSld>
+  <p:clrMapOvr>
+    <a:masterClrMapping/>
+  </p:clrMapOvr>
+</p:sld>
+</file>
+
+<file path=ppt/slides/slide4.xml><?xml version="1.0" encoding="utf-8"?>
+<p:sld xmlns:a="http://schemas.openxmlformats.org/drawingml/2006/main" xmlns:r="http://schemas.openxmlformats.org/officeDocument/2006/relationships" xmlns:p="http://schemas.openxmlformats.org/presentationml/2006/main">
+  <p:cSld>
+    <p:spTree>
+      <p:nvGrpSpPr>
+        <p:cNvPr id="1" name=""/>
+        <p:cNvGrpSpPr/>
+        <p:nvPr/>
+      </p:nvGrpSpPr>
+      <p:grpSpPr>
+        <a:xfrm>
+          <a:off x="0" y="0"/>
+          <a:ext cx="0" cy="0"/>
+          <a:chOff x="0" y="0"/>
+          <a:chExt cx="0" cy="0"/>
+        </a:xfrm>
+      </p:grpSpPr>
+      <p:sp>
+        <p:nvSpPr>
           <p:cNvPr id="2" name="Title 1">
             <a:extLst>
               <a:ext uri="{FF2B5EF4-FFF2-40B4-BE49-F238E27FC236}">
@@ -6355,15 +6694,22 @@
             <p:ph type="title"/>
           </p:nvPr>
         </p:nvSpPr>
-        <p:spPr/>
-        <p:txBody>
-          <a:bodyPr/>
+        <p:spPr>
+          <a:xfrm>
+            <a:off x="1202924" y="408541"/>
+            <a:ext cx="3262544" cy="1112812"/>
+          </a:xfrm>
+        </p:spPr>
+        <p:txBody>
+          <a:bodyPr>
+            <a:normAutofit fontScale="90000"/>
+          </a:bodyPr>
           <a:lstStyle/>
           <a:p>
             <a:pPr algn="ctr"/>
             <a:r>
               <a:rPr lang="en-US" dirty="0"/>
-              <a:t>Research Questions</a:t>
+              <a:t>Research Question 1</a:t>
             </a:r>
             <a:endParaRPr lang="en-GB" dirty="0"/>
           </a:p>
@@ -6383,8 +6729,8 @@
         </p:nvSpPr>
         <p:spPr>
           <a:xfrm>
-            <a:off x="1189434" y="2125202"/>
-            <a:ext cx="5468818" cy="875450"/>
+            <a:off x="4782693" y="463166"/>
+            <a:ext cx="5805997" cy="1058187"/>
           </a:xfrm>
           <a:prstGeom prst="rect">
             <a:avLst/>
@@ -6393,7 +6739,7 @@
         </p:spPr>
         <p:txBody>
           <a:bodyPr wrap="square">
-            <a:normAutofit fontScale="85000" lnSpcReduction="20000"/>
+            <a:normAutofit fontScale="92500" lnSpcReduction="10000"/>
           </a:bodyPr>
           <a:lstStyle/>
           <a:p>
@@ -6407,42 +6753,6 @@
               <a:t>Can a FL architecture be designed to be resilient, allowing it to identify missing nodes, and adapt so that there is no loss in performance? </a:t>
             </a:r>
             <a:endParaRPr lang="en-GB" b="1" dirty="0"/>
-          </a:p>
-        </p:txBody>
-      </p:sp>
-      <p:sp>
-        <p:nvSpPr>
-          <p:cNvPr id="14" name="TextBox 13">
-            <a:extLst>
-              <a:ext uri="{FF2B5EF4-FFF2-40B4-BE49-F238E27FC236}">
-                <a16:creationId xmlns:a16="http://schemas.microsoft.com/office/drawing/2014/main" id="{D9D0AB5B-65B7-2487-EF79-97B298F3FB34}"/>
-              </a:ext>
-            </a:extLst>
-          </p:cNvPr>
-          <p:cNvSpPr txBox="1"/>
-          <p:nvPr/>
-        </p:nvSpPr>
-        <p:spPr>
-          <a:xfrm>
-            <a:off x="1097280" y="1737847"/>
-            <a:ext cx="2109488" cy="369332"/>
-          </a:xfrm>
-          <a:prstGeom prst="rect">
-            <a:avLst/>
-          </a:prstGeom>
-          <a:noFill/>
-        </p:spPr>
-        <p:txBody>
-          <a:bodyPr wrap="none" rtlCol="0">
-            <a:spAutoFit/>
-          </a:bodyPr>
-          <a:lstStyle/>
-          <a:p>
-            <a:r>
-              <a:rPr lang="en-US" dirty="0"/>
-              <a:t>Research Question 1</a:t>
-            </a:r>
-            <a:endParaRPr lang="en-GB" dirty="0"/>
           </a:p>
         </p:txBody>
       </p:sp>
@@ -6460,8 +6770,8 @@
         </p:nvSpPr>
         <p:spPr>
           <a:xfrm>
-            <a:off x="1189434" y="2114669"/>
-            <a:ext cx="5468818" cy="875451"/>
+            <a:off x="4811695" y="408541"/>
+            <a:ext cx="5805997" cy="1112812"/>
           </a:xfrm>
           <a:prstGeom prst="roundRect">
             <a:avLst/>
@@ -6493,6 +6803,42 @@
           </a:p>
         </p:txBody>
       </p:sp>
+      <p:pic>
+        <p:nvPicPr>
+          <p:cNvPr id="11" name="Picture 10" descr="A diagram of a diagram&#10;&#10;Description automatically generated with medium confidence">
+            <a:extLst>
+              <a:ext uri="{FF2B5EF4-FFF2-40B4-BE49-F238E27FC236}">
+                <a16:creationId xmlns:a16="http://schemas.microsoft.com/office/drawing/2014/main" id="{3184CB76-7485-B103-EC60-6AC34C95110F}"/>
+              </a:ext>
+            </a:extLst>
+          </p:cNvPr>
+          <p:cNvPicPr>
+            <a:picLocks noChangeAspect="1"/>
+          </p:cNvPicPr>
+          <p:nvPr/>
+        </p:nvPicPr>
+        <p:blipFill>
+          <a:blip r:embed="rId2">
+            <a:extLst>
+              <a:ext uri="{28A0092B-C50C-407E-A947-70E740481C1C}">
+                <a14:useLocalDpi xmlns:a14="http://schemas.microsoft.com/office/drawing/2010/main" val="0"/>
+              </a:ext>
+            </a:extLst>
+          </a:blip>
+          <a:stretch>
+            <a:fillRect/>
+          </a:stretch>
+        </p:blipFill>
+        <p:spPr>
+          <a:xfrm>
+            <a:off x="1318334" y="1748605"/>
+            <a:ext cx="9555331" cy="4539697"/>
+          </a:xfrm>
+          <a:prstGeom prst="rect">
+            <a:avLst/>
+          </a:prstGeom>
+        </p:spPr>
+      </p:pic>
     </p:spTree>
     <p:extLst>
       <p:ext uri="{BB962C8B-B14F-4D97-AF65-F5344CB8AC3E}">
@@ -6506,7 +6852,7 @@
 </p:sld>
 </file>
 
-<file path=ppt/slides/slide4.xml><?xml version="1.0" encoding="utf-8"?>
+<file path=ppt/slides/slide5.xml><?xml version="1.0" encoding="utf-8"?>
 <p:sld xmlns:a="http://schemas.openxmlformats.org/drawingml/2006/main" xmlns:r="http://schemas.openxmlformats.org/officeDocument/2006/relationships" xmlns:p="http://schemas.openxmlformats.org/presentationml/2006/main">
   <p:cSld>
     <p:spTree>
@@ -6514,7 +6860,7 @@
         <p:cNvPr id="1" name="">
           <a:extLst>
             <a:ext uri="{FF2B5EF4-FFF2-40B4-BE49-F238E27FC236}">
-              <a16:creationId xmlns:a16="http://schemas.microsoft.com/office/drawing/2014/main" id="{C103487E-61DD-12BD-72AB-DDB959FE2FC0}"/>
+              <a16:creationId xmlns:a16="http://schemas.microsoft.com/office/drawing/2014/main" id="{A75DFD47-E96D-8B48-0C28-FA7AC6E8305C}"/>
             </a:ext>
           </a:extLst>
         </p:cNvPr>
@@ -6534,7 +6880,7 @@
           <p:cNvPr id="2" name="Title 1">
             <a:extLst>
               <a:ext uri="{FF2B5EF4-FFF2-40B4-BE49-F238E27FC236}">
-                <a16:creationId xmlns:a16="http://schemas.microsoft.com/office/drawing/2014/main" id="{5B79BE80-421F-E0A2-E347-1FB3E87F24E8}"/>
+                <a16:creationId xmlns:a16="http://schemas.microsoft.com/office/drawing/2014/main" id="{31E878F4-4676-0EB5-3DD7-1EBC366A2B7F}"/>
               </a:ext>
             </a:extLst>
           </p:cNvPr>
@@ -6545,15 +6891,22 @@
             <p:ph type="title"/>
           </p:nvPr>
         </p:nvSpPr>
-        <p:spPr/>
-        <p:txBody>
-          <a:bodyPr/>
+        <p:spPr>
+          <a:xfrm>
+            <a:off x="1202924" y="408541"/>
+            <a:ext cx="3262544" cy="1112812"/>
+          </a:xfrm>
+        </p:spPr>
+        <p:txBody>
+          <a:bodyPr>
+            <a:normAutofit fontScale="90000"/>
+          </a:bodyPr>
           <a:lstStyle/>
           <a:p>
             <a:pPr algn="ctr"/>
             <a:r>
               <a:rPr lang="en-US" dirty="0"/>
-              <a:t>Research Questions</a:t>
+              <a:t>Research Question 2</a:t>
             </a:r>
             <a:endParaRPr lang="en-GB" dirty="0"/>
           </a:p>
@@ -6561,57 +6914,10 @@
       </p:sp>
       <p:sp>
         <p:nvSpPr>
-          <p:cNvPr id="8" name="TextBox 7">
+          <p:cNvPr id="15" name="Rectangle: Rounded Corners 14">
             <a:extLst>
               <a:ext uri="{FF2B5EF4-FFF2-40B4-BE49-F238E27FC236}">
-                <a16:creationId xmlns:a16="http://schemas.microsoft.com/office/drawing/2014/main" id="{4122F22F-CC6A-21A3-E65B-6D9079943A2F}"/>
-              </a:ext>
-            </a:extLst>
-          </p:cNvPr>
-          <p:cNvSpPr txBox="1"/>
-          <p:nvPr/>
-        </p:nvSpPr>
-        <p:spPr>
-          <a:xfrm>
-            <a:off x="5862556" y="3067088"/>
-            <a:ext cx="6094520" cy="1167503"/>
-          </a:xfrm>
-          <a:prstGeom prst="rect">
-            <a:avLst/>
-          </a:prstGeom>
-          <a:noFill/>
-        </p:spPr>
-        <p:txBody>
-          <a:bodyPr wrap="square">
-            <a:normAutofit lnSpcReduction="10000"/>
-          </a:bodyPr>
-          <a:lstStyle/>
-          <a:p>
-            <a:pPr algn="ctr"/>
-            <a:r>
-              <a:rPr lang="en-US" dirty="0"/>
-              <a:t>With the ever-increasing use of IoT devices, </a:t>
-            </a:r>
-            <a:r>
-              <a:rPr lang="en-US" b="1" dirty="0"/>
-              <a:t>can FL algorithms or tools be designed to operate specifically on Edge devices to minimize computational and costs</a:t>
-            </a:r>
-            <a:r>
-              <a:rPr lang="en-US" dirty="0"/>
-              <a:t>. The models should be adaptable to a range of data sources and types.</a:t>
-            </a:r>
-          </a:p>
-          <a:p>
-            <a:endParaRPr lang="en-US" dirty="0"/>
-          </a:p>
-        </p:txBody>
-      </p:sp>
-      <p:sp>
-        <p:nvSpPr>
-          <p:cNvPr id="13" name="Rectangle: Rounded Corners 12">
-            <a:extLst>
-              <a:ext uri="{FF2B5EF4-FFF2-40B4-BE49-F238E27FC236}">
-                <a16:creationId xmlns:a16="http://schemas.microsoft.com/office/drawing/2014/main" id="{C4D43637-DC10-B3A5-5029-8D1C5ADAC38A}"/>
+                <a16:creationId xmlns:a16="http://schemas.microsoft.com/office/drawing/2014/main" id="{67D2BD6C-5B3A-C5A0-94AC-D0ECC15EEFBC}"/>
               </a:ext>
             </a:extLst>
           </p:cNvPr>
@@ -6620,8 +6926,8 @@
         </p:nvSpPr>
         <p:spPr>
           <a:xfrm>
-            <a:off x="5862556" y="3022626"/>
-            <a:ext cx="6094520" cy="1200329"/>
+            <a:off x="4811695" y="408541"/>
+            <a:ext cx="5805997" cy="1112812"/>
           </a:xfrm>
           <a:prstGeom prst="roundRect">
             <a:avLst/>
@@ -6645,9 +6951,7 @@
           </a:fontRef>
         </p:style>
         <p:txBody>
-          <a:bodyPr rtlCol="0" anchor="ctr">
-            <a:normAutofit/>
-          </a:bodyPr>
+          <a:bodyPr rtlCol="0" anchor="ctr"/>
           <a:lstStyle/>
           <a:p>
             <a:pPr algn="ctr"/>
@@ -6657,10 +6961,10 @@
       </p:sp>
       <p:sp>
         <p:nvSpPr>
-          <p:cNvPr id="16" name="TextBox 15">
+          <p:cNvPr id="8" name="TextBox 7">
             <a:extLst>
               <a:ext uri="{FF2B5EF4-FFF2-40B4-BE49-F238E27FC236}">
-                <a16:creationId xmlns:a16="http://schemas.microsoft.com/office/drawing/2014/main" id="{B8B448B7-BD48-5613-6948-EFF3941D1E25}"/>
+                <a16:creationId xmlns:a16="http://schemas.microsoft.com/office/drawing/2014/main" id="{4122F22F-CC6A-21A3-E65B-6D9079943A2F}"/>
               </a:ext>
             </a:extLst>
           </p:cNvPr>
@@ -6669,8 +6973,8 @@
         </p:nvSpPr>
         <p:spPr>
           <a:xfrm>
-            <a:off x="8600671" y="2633193"/>
-            <a:ext cx="3161096" cy="369332"/>
+            <a:off x="4873840" y="506027"/>
+            <a:ext cx="5592933" cy="987980"/>
           </a:xfrm>
           <a:prstGeom prst="rect">
             <a:avLst/>
@@ -6678,24 +6982,70 @@
           <a:noFill/>
         </p:spPr>
         <p:txBody>
-          <a:bodyPr wrap="square" rtlCol="0">
-            <a:spAutoFit/>
+          <a:bodyPr wrap="square">
+            <a:normAutofit fontScale="85000" lnSpcReduction="10000"/>
           </a:bodyPr>
           <a:lstStyle/>
           <a:p>
-            <a:pPr algn="r"/>
+            <a:pPr algn="ctr"/>
             <a:r>
               <a:rPr lang="en-US" dirty="0"/>
-              <a:t>Research Question 2</a:t>
-            </a:r>
-            <a:endParaRPr lang="en-GB" dirty="0"/>
-          </a:p>
-        </p:txBody>
-      </p:sp>
+              <a:t>With the ever-increasing use of IoT devices, </a:t>
+            </a:r>
+            <a:r>
+              <a:rPr lang="en-US" b="1" dirty="0"/>
+              <a:t>can FL algorithms or tools be designed to operate specifically on Edge devices to minimize computational and costs</a:t>
+            </a:r>
+            <a:r>
+              <a:rPr lang="en-US" dirty="0"/>
+              <a:t>. The models should be adaptable to a range of data sources and types.</a:t>
+            </a:r>
+          </a:p>
+          <a:p>
+            <a:endParaRPr lang="en-US" dirty="0"/>
+          </a:p>
+        </p:txBody>
+      </p:sp>
+      <p:pic>
+        <p:nvPicPr>
+          <p:cNvPr id="4" name="Picture 3" descr="A diagram with text on it&#10;&#10;Description automatically generated">
+            <a:extLst>
+              <a:ext uri="{FF2B5EF4-FFF2-40B4-BE49-F238E27FC236}">
+                <a16:creationId xmlns:a16="http://schemas.microsoft.com/office/drawing/2014/main" id="{5B56D578-CB51-F8CE-5FB9-835BB51C03E6}"/>
+              </a:ext>
+            </a:extLst>
+          </p:cNvPr>
+          <p:cNvPicPr>
+            <a:picLocks noChangeAspect="1"/>
+          </p:cNvPicPr>
+          <p:nvPr/>
+        </p:nvPicPr>
+        <p:blipFill>
+          <a:blip r:embed="rId2">
+            <a:extLst>
+              <a:ext uri="{28A0092B-C50C-407E-A947-70E740481C1C}">
+                <a14:useLocalDpi xmlns:a14="http://schemas.microsoft.com/office/drawing/2010/main" val="0"/>
+              </a:ext>
+            </a:extLst>
+          </a:blip>
+          <a:stretch>
+            <a:fillRect/>
+          </a:stretch>
+        </p:blipFill>
+        <p:spPr>
+          <a:xfrm>
+            <a:off x="1052004" y="1769785"/>
+            <a:ext cx="10087992" cy="4427425"/>
+          </a:xfrm>
+          <a:prstGeom prst="rect">
+            <a:avLst/>
+          </a:prstGeom>
+        </p:spPr>
+      </p:pic>
     </p:spTree>
     <p:extLst>
       <p:ext uri="{BB962C8B-B14F-4D97-AF65-F5344CB8AC3E}">
-        <p14:creationId xmlns:p14="http://schemas.microsoft.com/office/powerpoint/2010/main" val="2342086455"/>
+        <p14:creationId xmlns:p14="http://schemas.microsoft.com/office/powerpoint/2010/main" val="788743055"/>
       </p:ext>
     </p:extLst>
   </p:cSld>
@@ -6705,7 +7055,170 @@
 </p:sld>
 </file>
 
-<file path=ppt/slides/slide5.xml><?xml version="1.0" encoding="utf-8"?>
+<file path=ppt/slides/slide6.xml><?xml version="1.0" encoding="utf-8"?>
+<p:sld xmlns:a="http://schemas.openxmlformats.org/drawingml/2006/main" xmlns:r="http://schemas.openxmlformats.org/officeDocument/2006/relationships" xmlns:p="http://schemas.openxmlformats.org/presentationml/2006/main">
+  <p:cSld>
+    <p:spTree>
+      <p:nvGrpSpPr>
+        <p:cNvPr id="1" name="">
+          <a:extLst>
+            <a:ext uri="{FF2B5EF4-FFF2-40B4-BE49-F238E27FC236}">
+              <a16:creationId xmlns:a16="http://schemas.microsoft.com/office/drawing/2014/main" id="{25AB105C-AF0D-278A-E4B2-1A113401BAFB}"/>
+            </a:ext>
+          </a:extLst>
+        </p:cNvPr>
+        <p:cNvGrpSpPr/>
+        <p:nvPr/>
+      </p:nvGrpSpPr>
+      <p:grpSpPr>
+        <a:xfrm>
+          <a:off x="0" y="0"/>
+          <a:ext cx="0" cy="0"/>
+          <a:chOff x="0" y="0"/>
+          <a:chExt cx="0" cy="0"/>
+        </a:xfrm>
+      </p:grpSpPr>
+      <p:sp>
+        <p:nvSpPr>
+          <p:cNvPr id="2" name="Title 1">
+            <a:extLst>
+              <a:ext uri="{FF2B5EF4-FFF2-40B4-BE49-F238E27FC236}">
+                <a16:creationId xmlns:a16="http://schemas.microsoft.com/office/drawing/2014/main" id="{1FD7FD30-CABE-80F9-096F-63AAA66F52B5}"/>
+              </a:ext>
+            </a:extLst>
+          </p:cNvPr>
+          <p:cNvSpPr>
+            <a:spLocks noGrp="1"/>
+          </p:cNvSpPr>
+          <p:nvPr>
+            <p:ph type="title"/>
+          </p:nvPr>
+        </p:nvSpPr>
+        <p:spPr>
+          <a:xfrm>
+            <a:off x="1202924" y="408541"/>
+            <a:ext cx="3262544" cy="1112812"/>
+          </a:xfrm>
+        </p:spPr>
+        <p:txBody>
+          <a:bodyPr>
+            <a:normAutofit fontScale="90000"/>
+          </a:bodyPr>
+          <a:lstStyle/>
+          <a:p>
+            <a:pPr algn="ctr"/>
+            <a:r>
+              <a:rPr lang="en-US" dirty="0"/>
+              <a:t>Research Question 3</a:t>
+            </a:r>
+            <a:endParaRPr lang="en-GB" dirty="0"/>
+          </a:p>
+        </p:txBody>
+      </p:sp>
+      <p:sp>
+        <p:nvSpPr>
+          <p:cNvPr id="15" name="Rectangle: Rounded Corners 14">
+            <a:extLst>
+              <a:ext uri="{FF2B5EF4-FFF2-40B4-BE49-F238E27FC236}">
+                <a16:creationId xmlns:a16="http://schemas.microsoft.com/office/drawing/2014/main" id="{4FC66C9B-35CF-0185-FDAA-B671BF099103}"/>
+              </a:ext>
+            </a:extLst>
+          </p:cNvPr>
+          <p:cNvSpPr/>
+          <p:nvPr/>
+        </p:nvSpPr>
+        <p:spPr>
+          <a:xfrm>
+            <a:off x="4811695" y="408541"/>
+            <a:ext cx="5805997" cy="1112812"/>
+          </a:xfrm>
+          <a:prstGeom prst="roundRect">
+            <a:avLst/>
+          </a:prstGeom>
+          <a:noFill/>
+        </p:spPr>
+        <p:style>
+          <a:lnRef idx="2">
+            <a:schemeClr val="accent1">
+              <a:shade val="15000"/>
+            </a:schemeClr>
+          </a:lnRef>
+          <a:fillRef idx="1">
+            <a:schemeClr val="accent1"/>
+          </a:fillRef>
+          <a:effectRef idx="0">
+            <a:schemeClr val="accent1"/>
+          </a:effectRef>
+          <a:fontRef idx="minor">
+            <a:schemeClr val="lt1"/>
+          </a:fontRef>
+        </p:style>
+        <p:txBody>
+          <a:bodyPr rtlCol="0" anchor="ctr"/>
+          <a:lstStyle/>
+          <a:p>
+            <a:pPr algn="ctr"/>
+            <a:endParaRPr lang="en-GB"/>
+          </a:p>
+        </p:txBody>
+      </p:sp>
+      <p:sp>
+        <p:nvSpPr>
+          <p:cNvPr id="19" name="TextBox 18">
+            <a:extLst>
+              <a:ext uri="{FF2B5EF4-FFF2-40B4-BE49-F238E27FC236}">
+                <a16:creationId xmlns:a16="http://schemas.microsoft.com/office/drawing/2014/main" id="{BECE7A34-9052-6E03-7A97-16BF03014EE1}"/>
+              </a:ext>
+            </a:extLst>
+          </p:cNvPr>
+          <p:cNvSpPr txBox="1"/>
+          <p:nvPr/>
+        </p:nvSpPr>
+        <p:spPr>
+          <a:xfrm>
+            <a:off x="4955955" y="488271"/>
+            <a:ext cx="5466429" cy="1033081"/>
+          </a:xfrm>
+          <a:prstGeom prst="rect">
+            <a:avLst/>
+          </a:prstGeom>
+          <a:noFill/>
+        </p:spPr>
+        <p:txBody>
+          <a:bodyPr wrap="square">
+            <a:normAutofit/>
+          </a:bodyPr>
+          <a:lstStyle/>
+          <a:p>
+            <a:pPr algn="ctr"/>
+            <a:r>
+              <a:rPr lang="en-US" b="1" dirty="0"/>
+              <a:t>Can we design efficient aggregation algorithms for FL </a:t>
+            </a:r>
+            <a:r>
+              <a:rPr lang="en-US" dirty="0"/>
+              <a:t>that minimize the data exchange between clients and servers while not reducing the model accuracy?</a:t>
+            </a:r>
+          </a:p>
+          <a:p>
+            <a:endParaRPr lang="en-US" dirty="0"/>
+          </a:p>
+        </p:txBody>
+      </p:sp>
+    </p:spTree>
+    <p:extLst>
+      <p:ext uri="{BB962C8B-B14F-4D97-AF65-F5344CB8AC3E}">
+        <p14:creationId xmlns:p14="http://schemas.microsoft.com/office/powerpoint/2010/main" val="3408599131"/>
+      </p:ext>
+    </p:extLst>
+  </p:cSld>
+  <p:clrMapOvr>
+    <a:masterClrMapping/>
+  </p:clrMapOvr>
+</p:sld>
+</file>
+
+<file path=ppt/slides/slide7.xml><?xml version="1.0" encoding="utf-8"?>
 <p:sld xmlns:a="http://schemas.openxmlformats.org/drawingml/2006/main" xmlns:r="http://schemas.openxmlformats.org/officeDocument/2006/relationships" xmlns:p="http://schemas.openxmlformats.org/presentationml/2006/main">
   <p:cSld>
     <p:spTree>
@@ -6753,263 +7266,6 @@
             <a:r>
               <a:rPr lang="en-US" dirty="0"/>
               <a:t>Research Questions</a:t>
-            </a:r>
-            <a:endParaRPr lang="en-GB" dirty="0"/>
-          </a:p>
-        </p:txBody>
-      </p:sp>
-      <p:sp>
-        <p:nvSpPr>
-          <p:cNvPr id="8" name="TextBox 7">
-            <a:extLst>
-              <a:ext uri="{FF2B5EF4-FFF2-40B4-BE49-F238E27FC236}">
-                <a16:creationId xmlns:a16="http://schemas.microsoft.com/office/drawing/2014/main" id="{FA70DBE6-F2CC-FDE2-2144-5B6F2D7D2FD5}"/>
-              </a:ext>
-            </a:extLst>
-          </p:cNvPr>
-          <p:cNvSpPr txBox="1"/>
-          <p:nvPr/>
-        </p:nvSpPr>
-        <p:spPr>
-          <a:xfrm>
-            <a:off x="5862556" y="3067088"/>
-            <a:ext cx="6094520" cy="1167503"/>
-          </a:xfrm>
-          <a:prstGeom prst="rect">
-            <a:avLst/>
-          </a:prstGeom>
-          <a:noFill/>
-        </p:spPr>
-        <p:txBody>
-          <a:bodyPr wrap="square">
-            <a:normAutofit fontScale="85000" lnSpcReduction="10000"/>
-          </a:bodyPr>
-          <a:lstStyle/>
-          <a:p>
-            <a:pPr algn="ctr"/>
-            <a:r>
-              <a:rPr lang="en-US" dirty="0"/>
-              <a:t>With the ever-increasing use of IoT devices, </a:t>
-            </a:r>
-            <a:r>
-              <a:rPr lang="en-US" b="1" dirty="0"/>
-              <a:t>can FL algorithms or tools be designed to operate specifically on resources Edge devices to minimize computational and communications costs</a:t>
-            </a:r>
-            <a:r>
-              <a:rPr lang="en-US" dirty="0"/>
-              <a:t>. The models should be adaptable to non independently and identically distributed data (IID), and ideally be carried out on the device.</a:t>
-            </a:r>
-          </a:p>
-          <a:p>
-            <a:endParaRPr lang="en-US" dirty="0"/>
-          </a:p>
-        </p:txBody>
-      </p:sp>
-      <p:sp>
-        <p:nvSpPr>
-          <p:cNvPr id="10" name="TextBox 9">
-            <a:extLst>
-              <a:ext uri="{FF2B5EF4-FFF2-40B4-BE49-F238E27FC236}">
-                <a16:creationId xmlns:a16="http://schemas.microsoft.com/office/drawing/2014/main" id="{6E99B88D-6F92-B1DC-8047-0B3100A9A188}"/>
-              </a:ext>
-            </a:extLst>
-          </p:cNvPr>
-          <p:cNvSpPr txBox="1"/>
-          <p:nvPr/>
-        </p:nvSpPr>
-        <p:spPr>
-          <a:xfrm>
-            <a:off x="1189434" y="2125202"/>
-            <a:ext cx="5468818" cy="875450"/>
-          </a:xfrm>
-          <a:prstGeom prst="rect">
-            <a:avLst/>
-          </a:prstGeom>
-          <a:noFill/>
-        </p:spPr>
-        <p:txBody>
-          <a:bodyPr wrap="square">
-            <a:normAutofit fontScale="85000" lnSpcReduction="20000"/>
-          </a:bodyPr>
-          <a:lstStyle/>
-          <a:p>
-            <a:pPr algn="ctr"/>
-            <a:r>
-              <a:rPr lang="en-US" dirty="0"/>
-              <a:t>In any large distributed network, there is a chance that some nodes can be lost, for a range of reason. </a:t>
-            </a:r>
-            <a:r>
-              <a:rPr lang="en-US" b="1" dirty="0"/>
-              <a:t>Can a FL architecture be designed to be resilient, allowing it to identify missing nodes, and adapt so that there is no loss in performance? </a:t>
-            </a:r>
-            <a:endParaRPr lang="en-GB" b="1" dirty="0"/>
-          </a:p>
-        </p:txBody>
-      </p:sp>
-      <p:sp>
-        <p:nvSpPr>
-          <p:cNvPr id="13" name="Rectangle: Rounded Corners 12">
-            <a:extLst>
-              <a:ext uri="{FF2B5EF4-FFF2-40B4-BE49-F238E27FC236}">
-                <a16:creationId xmlns:a16="http://schemas.microsoft.com/office/drawing/2014/main" id="{A4B880AF-35B5-94F0-1879-5389614D86B2}"/>
-              </a:ext>
-            </a:extLst>
-          </p:cNvPr>
-          <p:cNvSpPr/>
-          <p:nvPr/>
-        </p:nvSpPr>
-        <p:spPr>
-          <a:xfrm>
-            <a:off x="5862556" y="3022626"/>
-            <a:ext cx="6094520" cy="1200329"/>
-          </a:xfrm>
-          <a:prstGeom prst="roundRect">
-            <a:avLst/>
-          </a:prstGeom>
-          <a:noFill/>
-        </p:spPr>
-        <p:style>
-          <a:lnRef idx="2">
-            <a:schemeClr val="accent1">
-              <a:shade val="15000"/>
-            </a:schemeClr>
-          </a:lnRef>
-          <a:fillRef idx="1">
-            <a:schemeClr val="accent1"/>
-          </a:fillRef>
-          <a:effectRef idx="0">
-            <a:schemeClr val="accent1"/>
-          </a:effectRef>
-          <a:fontRef idx="minor">
-            <a:schemeClr val="lt1"/>
-          </a:fontRef>
-        </p:style>
-        <p:txBody>
-          <a:bodyPr rtlCol="0" anchor="ctr">
-            <a:normAutofit/>
-          </a:bodyPr>
-          <a:lstStyle/>
-          <a:p>
-            <a:pPr algn="ctr"/>
-            <a:endParaRPr lang="en-GB"/>
-          </a:p>
-        </p:txBody>
-      </p:sp>
-      <p:sp>
-        <p:nvSpPr>
-          <p:cNvPr id="14" name="TextBox 13">
-            <a:extLst>
-              <a:ext uri="{FF2B5EF4-FFF2-40B4-BE49-F238E27FC236}">
-                <a16:creationId xmlns:a16="http://schemas.microsoft.com/office/drawing/2014/main" id="{E582B5D7-66CD-0F41-2C6E-776FDD04B7E7}"/>
-              </a:ext>
-            </a:extLst>
-          </p:cNvPr>
-          <p:cNvSpPr txBox="1"/>
-          <p:nvPr/>
-        </p:nvSpPr>
-        <p:spPr>
-          <a:xfrm>
-            <a:off x="1097280" y="1737847"/>
-            <a:ext cx="2109488" cy="369332"/>
-          </a:xfrm>
-          <a:prstGeom prst="rect">
-            <a:avLst/>
-          </a:prstGeom>
-          <a:noFill/>
-        </p:spPr>
-        <p:txBody>
-          <a:bodyPr wrap="none" rtlCol="0">
-            <a:spAutoFit/>
-          </a:bodyPr>
-          <a:lstStyle/>
-          <a:p>
-            <a:r>
-              <a:rPr lang="en-US" dirty="0"/>
-              <a:t>Research Question 1</a:t>
-            </a:r>
-            <a:endParaRPr lang="en-GB" dirty="0"/>
-          </a:p>
-        </p:txBody>
-      </p:sp>
-      <p:sp>
-        <p:nvSpPr>
-          <p:cNvPr id="15" name="Rectangle: Rounded Corners 14">
-            <a:extLst>
-              <a:ext uri="{FF2B5EF4-FFF2-40B4-BE49-F238E27FC236}">
-                <a16:creationId xmlns:a16="http://schemas.microsoft.com/office/drawing/2014/main" id="{7E3C0550-7240-1B08-C482-CC122976F15D}"/>
-              </a:ext>
-            </a:extLst>
-          </p:cNvPr>
-          <p:cNvSpPr/>
-          <p:nvPr/>
-        </p:nvSpPr>
-        <p:spPr>
-          <a:xfrm>
-            <a:off x="1189434" y="2114669"/>
-            <a:ext cx="5468818" cy="875451"/>
-          </a:xfrm>
-          <a:prstGeom prst="roundRect">
-            <a:avLst/>
-          </a:prstGeom>
-          <a:noFill/>
-        </p:spPr>
-        <p:style>
-          <a:lnRef idx="2">
-            <a:schemeClr val="accent1">
-              <a:shade val="15000"/>
-            </a:schemeClr>
-          </a:lnRef>
-          <a:fillRef idx="1">
-            <a:schemeClr val="accent1"/>
-          </a:fillRef>
-          <a:effectRef idx="0">
-            <a:schemeClr val="accent1"/>
-          </a:effectRef>
-          <a:fontRef idx="minor">
-            <a:schemeClr val="lt1"/>
-          </a:fontRef>
-        </p:style>
-        <p:txBody>
-          <a:bodyPr rtlCol="0" anchor="ctr"/>
-          <a:lstStyle/>
-          <a:p>
-            <a:pPr algn="ctr"/>
-            <a:endParaRPr lang="en-GB"/>
-          </a:p>
-        </p:txBody>
-      </p:sp>
-      <p:sp>
-        <p:nvSpPr>
-          <p:cNvPr id="16" name="TextBox 15">
-            <a:extLst>
-              <a:ext uri="{FF2B5EF4-FFF2-40B4-BE49-F238E27FC236}">
-                <a16:creationId xmlns:a16="http://schemas.microsoft.com/office/drawing/2014/main" id="{BF024E74-A5FC-E1F3-DFE2-7B36BA1E30D7}"/>
-              </a:ext>
-            </a:extLst>
-          </p:cNvPr>
-          <p:cNvSpPr txBox="1"/>
-          <p:nvPr/>
-        </p:nvSpPr>
-        <p:spPr>
-          <a:xfrm>
-            <a:off x="8600671" y="2633193"/>
-            <a:ext cx="3161096" cy="369332"/>
-          </a:xfrm>
-          <a:prstGeom prst="rect">
-            <a:avLst/>
-          </a:prstGeom>
-          <a:noFill/>
-        </p:spPr>
-        <p:txBody>
-          <a:bodyPr wrap="square" rtlCol="0">
-            <a:spAutoFit/>
-          </a:bodyPr>
-          <a:lstStyle/>
-          <a:p>
-            <a:pPr algn="r"/>
-            <a:r>
-              <a:rPr lang="en-US" dirty="0"/>
-              <a:t>Research Question 2</a:t>
             </a:r>
             <a:endParaRPr lang="en-GB" dirty="0"/>
           </a:p>
@@ -7100,137 +7356,6 @@
           </a:p>
         </p:txBody>
       </p:sp>
-      <p:sp>
-        <p:nvSpPr>
-          <p:cNvPr id="19" name="TextBox 18">
-            <a:extLst>
-              <a:ext uri="{FF2B5EF4-FFF2-40B4-BE49-F238E27FC236}">
-                <a16:creationId xmlns:a16="http://schemas.microsoft.com/office/drawing/2014/main" id="{BECE7A34-9052-6E03-7A97-16BF03014EE1}"/>
-              </a:ext>
-            </a:extLst>
-          </p:cNvPr>
-          <p:cNvSpPr txBox="1"/>
-          <p:nvPr/>
-        </p:nvSpPr>
-        <p:spPr>
-          <a:xfrm>
-            <a:off x="1189434" y="4261046"/>
-            <a:ext cx="6094520" cy="954484"/>
-          </a:xfrm>
-          <a:prstGeom prst="rect">
-            <a:avLst/>
-          </a:prstGeom>
-          <a:noFill/>
-        </p:spPr>
-        <p:txBody>
-          <a:bodyPr wrap="square">
-            <a:normAutofit/>
-          </a:bodyPr>
-          <a:lstStyle/>
-          <a:p>
-            <a:pPr algn="ctr"/>
-            <a:r>
-              <a:rPr lang="en-US" b="1" dirty="0"/>
-              <a:t>Can we design efficient aggregation algorithms for FL </a:t>
-            </a:r>
-            <a:r>
-              <a:rPr lang="en-US" dirty="0"/>
-              <a:t>that minimize the data exchange between clients and servers while not reducing the model accuracy?</a:t>
-            </a:r>
-          </a:p>
-          <a:p>
-            <a:endParaRPr lang="en-US" dirty="0"/>
-          </a:p>
-        </p:txBody>
-      </p:sp>
-      <p:sp>
-        <p:nvSpPr>
-          <p:cNvPr id="3" name="TextBox 2">
-            <a:extLst>
-              <a:ext uri="{FF2B5EF4-FFF2-40B4-BE49-F238E27FC236}">
-                <a16:creationId xmlns:a16="http://schemas.microsoft.com/office/drawing/2014/main" id="{798EF416-5B39-C9F1-1510-584667A4470E}"/>
-              </a:ext>
-            </a:extLst>
-          </p:cNvPr>
-          <p:cNvSpPr txBox="1"/>
-          <p:nvPr/>
-        </p:nvSpPr>
-        <p:spPr>
-          <a:xfrm>
-            <a:off x="5997200" y="5376185"/>
-            <a:ext cx="6094520" cy="928382"/>
-          </a:xfrm>
-          <a:prstGeom prst="rect">
-            <a:avLst/>
-          </a:prstGeom>
-          <a:noFill/>
-        </p:spPr>
-        <p:txBody>
-          <a:bodyPr wrap="square">
-            <a:normAutofit/>
-          </a:bodyPr>
-          <a:lstStyle/>
-          <a:p>
-            <a:pPr algn="ctr"/>
-            <a:r>
-              <a:rPr lang="en-US" dirty="0"/>
-              <a:t>When thinking about robust and resilient FL systems, can blockchain </a:t>
-            </a:r>
-          </a:p>
-          <a:p>
-            <a:endParaRPr lang="en-US" dirty="0"/>
-          </a:p>
-        </p:txBody>
-      </p:sp>
-      <p:sp>
-        <p:nvSpPr>
-          <p:cNvPr id="4" name="Rectangle: Rounded Corners 3">
-            <a:extLst>
-              <a:ext uri="{FF2B5EF4-FFF2-40B4-BE49-F238E27FC236}">
-                <a16:creationId xmlns:a16="http://schemas.microsoft.com/office/drawing/2014/main" id="{2316EB86-7F05-ADB4-3272-3412E8B74443}"/>
-              </a:ext>
-            </a:extLst>
-          </p:cNvPr>
-          <p:cNvSpPr/>
-          <p:nvPr/>
-        </p:nvSpPr>
-        <p:spPr>
-          <a:xfrm>
-            <a:off x="5997200" y="5338446"/>
-            <a:ext cx="6094520" cy="954485"/>
-          </a:xfrm>
-          <a:prstGeom prst="roundRect">
-            <a:avLst/>
-          </a:prstGeom>
-          <a:noFill/>
-        </p:spPr>
-        <p:style>
-          <a:lnRef idx="2">
-            <a:schemeClr val="accent1">
-              <a:shade val="15000"/>
-            </a:schemeClr>
-          </a:lnRef>
-          <a:fillRef idx="1">
-            <a:schemeClr val="accent1"/>
-          </a:fillRef>
-          <a:effectRef idx="0">
-            <a:schemeClr val="accent1"/>
-          </a:effectRef>
-          <a:fontRef idx="minor">
-            <a:schemeClr val="lt1"/>
-          </a:fontRef>
-        </p:style>
-        <p:txBody>
-          <a:bodyPr rtlCol="0" anchor="ctr">
-            <a:normAutofit/>
-          </a:bodyPr>
-          <a:lstStyle/>
-          <a:p>
-            <a:pPr algn="ctr"/>
-            <a:endParaRPr lang="en-GB"/>
-          </a:p>
-        </p:txBody>
-      </p:sp>
     </p:spTree>
     <p:extLst>
       <p:ext uri="{BB962C8B-B14F-4D97-AF65-F5344CB8AC3E}">
@@ -7244,7 +7369,7 @@
 </p:sld>
 </file>
 
-<file path=ppt/slides/slide6.xml><?xml version="1.0" encoding="utf-8"?>
+<file path=ppt/slides/slide8.xml><?xml version="1.0" encoding="utf-8"?>
 <p:sld xmlns:a="http://schemas.openxmlformats.org/drawingml/2006/main" xmlns:r="http://schemas.openxmlformats.org/officeDocument/2006/relationships" xmlns:p="http://schemas.openxmlformats.org/presentationml/2006/main">
   <p:cSld>
     <p:spTree>

</xml_diff>

<commit_message>
Not sure what I changed, but git thinks I changed something
</commit_message>
<xml_diff>
--- a/Presentations/Supervisor Meetings/2024/Upcoming Meeting.pptx
+++ b/Presentations/Supervisor Meetings/2024/Upcoming Meeting.pptx
@@ -11,9 +11,8 @@
     <p:sldId id="262" r:id="rId5"/>
     <p:sldId id="267" r:id="rId6"/>
     <p:sldId id="268" r:id="rId7"/>
-    <p:sldId id="264" r:id="rId8"/>
-    <p:sldId id="265" r:id="rId9"/>
-    <p:sldId id="269" r:id="rId10"/>
+    <p:sldId id="265" r:id="rId8"/>
+    <p:sldId id="269" r:id="rId9"/>
   </p:sldIdLst>
   <p:sldSz cx="12192000" cy="6858000"/>
   <p:notesSz cx="6858000" cy="9144000"/>
@@ -1484,7 +1483,7 @@
   <pc:docChgLst>
     <pc:chgData name="Sean O Fithcheallaigh" userId="47659c31-a575-4792-8be3-61268c4ee0d6" providerId="ADAL" clId="{B7574C7C-3686-460F-9B9F-2A9122AA95F8}"/>
     <pc:docChg chg="undo custSel addSld delSld modSld modMainMaster">
-      <pc:chgData name="Sean O Fithcheallaigh" userId="47659c31-a575-4792-8be3-61268c4ee0d6" providerId="ADAL" clId="{B7574C7C-3686-460F-9B9F-2A9122AA95F8}" dt="2024-02-19T18:35:27.491" v="2542" actId="1076"/>
+      <pc:chgData name="Sean O Fithcheallaigh" userId="47659c31-a575-4792-8be3-61268c4ee0d6" providerId="ADAL" clId="{B7574C7C-3686-460F-9B9F-2A9122AA95F8}" dt="2024-02-21T13:47:52.806" v="2548" actId="478"/>
       <pc:docMkLst>
         <pc:docMk/>
       </pc:docMkLst>
@@ -1699,7 +1698,7 @@
         </pc:sldMkLst>
       </pc:sldChg>
       <pc:sldChg chg="addSp delSp modSp new mod chgLayout">
-        <pc:chgData name="Sean O Fithcheallaigh" userId="47659c31-a575-4792-8be3-61268c4ee0d6" providerId="ADAL" clId="{B7574C7C-3686-460F-9B9F-2A9122AA95F8}" dt="2024-02-19T18:24:35.664" v="2529" actId="1076"/>
+        <pc:chgData name="Sean O Fithcheallaigh" userId="47659c31-a575-4792-8be3-61268c4ee0d6" providerId="ADAL" clId="{B7574C7C-3686-460F-9B9F-2A9122AA95F8}" dt="2024-02-19T20:23:47.515" v="2543" actId="1076"/>
         <pc:sldMkLst>
           <pc:docMk/>
           <pc:sldMk cId="2974212779" sldId="262"/>
@@ -1849,7 +1848,7 @@
           </ac:graphicFrameMkLst>
         </pc:graphicFrameChg>
         <pc:picChg chg="add mod">
-          <ac:chgData name="Sean O Fithcheallaigh" userId="47659c31-a575-4792-8be3-61268c4ee0d6" providerId="ADAL" clId="{B7574C7C-3686-460F-9B9F-2A9122AA95F8}" dt="2024-02-19T18:24:35.664" v="2529" actId="1076"/>
+          <ac:chgData name="Sean O Fithcheallaigh" userId="47659c31-a575-4792-8be3-61268c4ee0d6" providerId="ADAL" clId="{B7574C7C-3686-460F-9B9F-2A9122AA95F8}" dt="2024-02-19T20:23:47.515" v="2543" actId="1076"/>
           <ac:picMkLst>
             <pc:docMk/>
             <pc:sldMk cId="2974212779" sldId="262"/>
@@ -1992,8 +1991,8 @@
           </ac:spMkLst>
         </pc:spChg>
       </pc:sldChg>
-      <pc:sldChg chg="delSp add mod">
-        <pc:chgData name="Sean O Fithcheallaigh" userId="47659c31-a575-4792-8be3-61268c4ee0d6" providerId="ADAL" clId="{B7574C7C-3686-460F-9B9F-2A9122AA95F8}" dt="2024-02-18T22:48:06.552" v="2358" actId="21"/>
+      <pc:sldChg chg="delSp add del mod">
+        <pc:chgData name="Sean O Fithcheallaigh" userId="47659c31-a575-4792-8be3-61268c4ee0d6" providerId="ADAL" clId="{B7574C7C-3686-460F-9B9F-2A9122AA95F8}" dt="2024-02-21T13:47:23.304" v="2544" actId="47"/>
         <pc:sldMkLst>
           <pc:docMk/>
           <pc:sldMk cId="2844604785" sldId="264"/>
@@ -2071,12 +2070,84 @@
           </ac:spMkLst>
         </pc:spChg>
       </pc:sldChg>
-      <pc:sldChg chg="add">
-        <pc:chgData name="Sean O Fithcheallaigh" userId="47659c31-a575-4792-8be3-61268c4ee0d6" providerId="ADAL" clId="{B7574C7C-3686-460F-9B9F-2A9122AA95F8}" dt="2024-02-17T12:30:56.947" v="2030" actId="2890"/>
+      <pc:sldChg chg="delSp add mod">
+        <pc:chgData name="Sean O Fithcheallaigh" userId="47659c31-a575-4792-8be3-61268c4ee0d6" providerId="ADAL" clId="{B7574C7C-3686-460F-9B9F-2A9122AA95F8}" dt="2024-02-21T13:47:52.806" v="2548" actId="478"/>
         <pc:sldMkLst>
           <pc:docMk/>
           <pc:sldMk cId="3782082519" sldId="265"/>
         </pc:sldMkLst>
+        <pc:spChg chg="del">
+          <ac:chgData name="Sean O Fithcheallaigh" userId="47659c31-a575-4792-8be3-61268c4ee0d6" providerId="ADAL" clId="{B7574C7C-3686-460F-9B9F-2A9122AA95F8}" dt="2024-02-21T13:47:50.211" v="2547" actId="478"/>
+          <ac:spMkLst>
+            <pc:docMk/>
+            <pc:sldMk cId="3782082519" sldId="265"/>
+            <ac:spMk id="8" creationId="{49616EDE-1929-BB49-E8B3-EA33C81C48CE}"/>
+          </ac:spMkLst>
+        </pc:spChg>
+        <pc:spChg chg="del">
+          <ac:chgData name="Sean O Fithcheallaigh" userId="47659c31-a575-4792-8be3-61268c4ee0d6" providerId="ADAL" clId="{B7574C7C-3686-460F-9B9F-2A9122AA95F8}" dt="2024-02-21T13:47:52.806" v="2548" actId="478"/>
+          <ac:spMkLst>
+            <pc:docMk/>
+            <pc:sldMk cId="3782082519" sldId="265"/>
+            <ac:spMk id="10" creationId="{2E011869-EC12-4DF2-2BF1-0C6545DACE4E}"/>
+          </ac:spMkLst>
+        </pc:spChg>
+        <pc:spChg chg="del">
+          <ac:chgData name="Sean O Fithcheallaigh" userId="47659c31-a575-4792-8be3-61268c4ee0d6" providerId="ADAL" clId="{B7574C7C-3686-460F-9B9F-2A9122AA95F8}" dt="2024-02-21T13:47:44.255" v="2545" actId="478"/>
+          <ac:spMkLst>
+            <pc:docMk/>
+            <pc:sldMk cId="3782082519" sldId="265"/>
+            <ac:spMk id="13" creationId="{9D4EFA77-B219-B3C7-6A7C-6F80AE811C7A}"/>
+          </ac:spMkLst>
+        </pc:spChg>
+        <pc:spChg chg="del">
+          <ac:chgData name="Sean O Fithcheallaigh" userId="47659c31-a575-4792-8be3-61268c4ee0d6" providerId="ADAL" clId="{B7574C7C-3686-460F-9B9F-2A9122AA95F8}" dt="2024-02-21T13:47:44.255" v="2545" actId="478"/>
+          <ac:spMkLst>
+            <pc:docMk/>
+            <pc:sldMk cId="3782082519" sldId="265"/>
+            <ac:spMk id="14" creationId="{2C444DD1-9238-12EF-908C-1794A1DF0440}"/>
+          </ac:spMkLst>
+        </pc:spChg>
+        <pc:spChg chg="del">
+          <ac:chgData name="Sean O Fithcheallaigh" userId="47659c31-a575-4792-8be3-61268c4ee0d6" providerId="ADAL" clId="{B7574C7C-3686-460F-9B9F-2A9122AA95F8}" dt="2024-02-21T13:47:44.255" v="2545" actId="478"/>
+          <ac:spMkLst>
+            <pc:docMk/>
+            <pc:sldMk cId="3782082519" sldId="265"/>
+            <ac:spMk id="15" creationId="{4508A9F1-BA5D-F7C2-A8DF-679565A2D5FF}"/>
+          </ac:spMkLst>
+        </pc:spChg>
+        <pc:spChg chg="del">
+          <ac:chgData name="Sean O Fithcheallaigh" userId="47659c31-a575-4792-8be3-61268c4ee0d6" providerId="ADAL" clId="{B7574C7C-3686-460F-9B9F-2A9122AA95F8}" dt="2024-02-21T13:47:44.255" v="2545" actId="478"/>
+          <ac:spMkLst>
+            <pc:docMk/>
+            <pc:sldMk cId="3782082519" sldId="265"/>
+            <ac:spMk id="16" creationId="{39FA9E42-CAFB-48E3-6C47-14712A0460E1}"/>
+          </ac:spMkLst>
+        </pc:spChg>
+        <pc:spChg chg="del">
+          <ac:chgData name="Sean O Fithcheallaigh" userId="47659c31-a575-4792-8be3-61268c4ee0d6" providerId="ADAL" clId="{B7574C7C-3686-460F-9B9F-2A9122AA95F8}" dt="2024-02-21T13:47:44.255" v="2545" actId="478"/>
+          <ac:spMkLst>
+            <pc:docMk/>
+            <pc:sldMk cId="3782082519" sldId="265"/>
+            <ac:spMk id="17" creationId="{D21578CC-15CC-92EC-7229-046D5C3CEE6A}"/>
+          </ac:spMkLst>
+        </pc:spChg>
+        <pc:spChg chg="del">
+          <ac:chgData name="Sean O Fithcheallaigh" userId="47659c31-a575-4792-8be3-61268c4ee0d6" providerId="ADAL" clId="{B7574C7C-3686-460F-9B9F-2A9122AA95F8}" dt="2024-02-21T13:47:44.255" v="2545" actId="478"/>
+          <ac:spMkLst>
+            <pc:docMk/>
+            <pc:sldMk cId="3782082519" sldId="265"/>
+            <ac:spMk id="18" creationId="{2BB441D9-104D-3543-0995-9785C504B36F}"/>
+          </ac:spMkLst>
+        </pc:spChg>
+        <pc:spChg chg="del">
+          <ac:chgData name="Sean O Fithcheallaigh" userId="47659c31-a575-4792-8be3-61268c4ee0d6" providerId="ADAL" clId="{B7574C7C-3686-460F-9B9F-2A9122AA95F8}" dt="2024-02-21T13:47:47.494" v="2546" actId="478"/>
+          <ac:spMkLst>
+            <pc:docMk/>
+            <pc:sldMk cId="3782082519" sldId="265"/>
+            <ac:spMk id="19" creationId="{6AC0E29E-2C9A-6E0C-3F63-C28C07190676}"/>
+          </ac:spMkLst>
+        </pc:spChg>
       </pc:sldChg>
       <pc:sldChg chg="addSp delSp modSp new mod modClrScheme chgLayout">
         <pc:chgData name="Sean O Fithcheallaigh" userId="47659c31-a575-4792-8be3-61268c4ee0d6" providerId="ADAL" clId="{B7574C7C-3686-460F-9B9F-2A9122AA95F8}" dt="2024-02-18T19:19:17.093" v="2304" actId="20577"/>
@@ -2600,7 +2671,7 @@
           <a:p>
             <a:fld id="{0CD94E99-FA29-4EFF-88BE-3447E30E8C4D}" type="datetimeFigureOut">
               <a:rPr lang="en-GB" smtClean="0"/>
-              <a:t>19/02/2024</a:t>
+              <a:t>21/02/2024</a:t>
             </a:fld>
             <a:endParaRPr lang="en-GB"/>
           </a:p>
@@ -2808,7 +2879,7 @@
           <a:p>
             <a:fld id="{0CD94E99-FA29-4EFF-88BE-3447E30E8C4D}" type="datetimeFigureOut">
               <a:rPr lang="en-GB" smtClean="0"/>
-              <a:t>19/02/2024</a:t>
+              <a:t>21/02/2024</a:t>
             </a:fld>
             <a:endParaRPr lang="en-GB"/>
           </a:p>
@@ -3066,7 +3137,7 @@
           <a:p>
             <a:fld id="{0CD94E99-FA29-4EFF-88BE-3447E30E8C4D}" type="datetimeFigureOut">
               <a:rPr lang="en-GB" smtClean="0"/>
-              <a:t>19/02/2024</a:t>
+              <a:t>21/02/2024</a:t>
             </a:fld>
             <a:endParaRPr lang="en-GB"/>
           </a:p>
@@ -3244,7 +3315,7 @@
           <a:p>
             <a:fld id="{0CD94E99-FA29-4EFF-88BE-3447E30E8C4D}" type="datetimeFigureOut">
               <a:rPr lang="en-GB" smtClean="0"/>
-              <a:t>19/02/2024</a:t>
+              <a:t>21/02/2024</a:t>
             </a:fld>
             <a:endParaRPr lang="en-GB"/>
           </a:p>
@@ -3581,7 +3652,7 @@
           <a:p>
             <a:fld id="{0CD94E99-FA29-4EFF-88BE-3447E30E8C4D}" type="datetimeFigureOut">
               <a:rPr lang="en-GB" smtClean="0"/>
-              <a:t>19/02/2024</a:t>
+              <a:t>21/02/2024</a:t>
             </a:fld>
             <a:endParaRPr lang="en-GB"/>
           </a:p>
@@ -3861,7 +3932,7 @@
           <a:p>
             <a:fld id="{0CD94E99-FA29-4EFF-88BE-3447E30E8C4D}" type="datetimeFigureOut">
               <a:rPr lang="en-GB" smtClean="0"/>
-              <a:t>19/02/2024</a:t>
+              <a:t>21/02/2024</a:t>
             </a:fld>
             <a:endParaRPr lang="en-GB"/>
           </a:p>
@@ -4240,7 +4311,7 @@
           <a:p>
             <a:fld id="{0CD94E99-FA29-4EFF-88BE-3447E30E8C4D}" type="datetimeFigureOut">
               <a:rPr lang="en-GB" smtClean="0"/>
-              <a:t>19/02/2024</a:t>
+              <a:t>21/02/2024</a:t>
             </a:fld>
             <a:endParaRPr lang="en-GB"/>
           </a:p>
@@ -4358,7 +4429,7 @@
           <a:p>
             <a:fld id="{0CD94E99-FA29-4EFF-88BE-3447E30E8C4D}" type="datetimeFigureOut">
               <a:rPr lang="en-GB" smtClean="0"/>
-              <a:t>19/02/2024</a:t>
+              <a:t>21/02/2024</a:t>
             </a:fld>
             <a:endParaRPr lang="en-GB"/>
           </a:p>
@@ -4531,7 +4602,7 @@
           <a:p>
             <a:fld id="{0CD94E99-FA29-4EFF-88BE-3447E30E8C4D}" type="datetimeFigureOut">
               <a:rPr lang="en-GB" smtClean="0"/>
-              <a:t>19/02/2024</a:t>
+              <a:t>21/02/2024</a:t>
             </a:fld>
             <a:endParaRPr lang="en-GB"/>
           </a:p>
@@ -4887,7 +4958,7 @@
           <a:p>
             <a:fld id="{0CD94E99-FA29-4EFF-88BE-3447E30E8C4D}" type="datetimeFigureOut">
               <a:rPr lang="en-GB" smtClean="0"/>
-              <a:t>19/02/2024</a:t>
+              <a:t>21/02/2024</a:t>
             </a:fld>
             <a:endParaRPr lang="en-GB"/>
           </a:p>
@@ -5266,7 +5337,7 @@
           <a:p>
             <a:fld id="{0CD94E99-FA29-4EFF-88BE-3447E30E8C4D}" type="datetimeFigureOut">
               <a:rPr lang="en-GB" smtClean="0"/>
-              <a:t>19/02/2024</a:t>
+              <a:t>21/02/2024</a:t>
             </a:fld>
             <a:endParaRPr lang="en-GB"/>
           </a:p>
@@ -5555,7 +5626,7 @@
           <a:p>
             <a:fld id="{0CD94E99-FA29-4EFF-88BE-3447E30E8C4D}" type="datetimeFigureOut">
               <a:rPr lang="en-GB" smtClean="0"/>
-              <a:t>19/02/2024</a:t>
+              <a:t>21/02/2024</a:t>
             </a:fld>
             <a:endParaRPr lang="en-GB"/>
           </a:p>
@@ -6934,7 +7005,7 @@
         </p:blipFill>
         <p:spPr>
           <a:xfrm>
-            <a:off x="1464815" y="1733752"/>
+            <a:off x="1464815" y="1815945"/>
             <a:ext cx="9439922" cy="4484957"/>
           </a:xfrm>
           <a:prstGeom prst="rect">
@@ -7365,157 +7436,6 @@
         <p:cNvPr id="1" name="">
           <a:extLst>
             <a:ext uri="{FF2B5EF4-FFF2-40B4-BE49-F238E27FC236}">
-              <a16:creationId xmlns:a16="http://schemas.microsoft.com/office/drawing/2014/main" id="{DAF4E386-B234-6A24-1032-34AFF508B01A}"/>
-            </a:ext>
-          </a:extLst>
-        </p:cNvPr>
-        <p:cNvGrpSpPr/>
-        <p:nvPr/>
-      </p:nvGrpSpPr>
-      <p:grpSpPr>
-        <a:xfrm>
-          <a:off x="0" y="0"/>
-          <a:ext cx="0" cy="0"/>
-          <a:chOff x="0" y="0"/>
-          <a:chExt cx="0" cy="0"/>
-        </a:xfrm>
-      </p:grpSpPr>
-      <p:sp>
-        <p:nvSpPr>
-          <p:cNvPr id="2" name="Title 1">
-            <a:extLst>
-              <a:ext uri="{FF2B5EF4-FFF2-40B4-BE49-F238E27FC236}">
-                <a16:creationId xmlns:a16="http://schemas.microsoft.com/office/drawing/2014/main" id="{519BD0A0-F247-AD31-6C24-4139506AF50E}"/>
-              </a:ext>
-            </a:extLst>
-          </p:cNvPr>
-          <p:cNvSpPr>
-            <a:spLocks noGrp="1"/>
-          </p:cNvSpPr>
-          <p:nvPr>
-            <p:ph type="title"/>
-          </p:nvPr>
-        </p:nvSpPr>
-        <p:spPr/>
-        <p:txBody>
-          <a:bodyPr/>
-          <a:lstStyle/>
-          <a:p>
-            <a:pPr algn="ctr"/>
-            <a:r>
-              <a:rPr lang="en-US" dirty="0"/>
-              <a:t>Research Questions</a:t>
-            </a:r>
-            <a:endParaRPr lang="en-GB" dirty="0"/>
-          </a:p>
-        </p:txBody>
-      </p:sp>
-      <p:sp>
-        <p:nvSpPr>
-          <p:cNvPr id="17" name="Rectangle: Rounded Corners 16">
-            <a:extLst>
-              <a:ext uri="{FF2B5EF4-FFF2-40B4-BE49-F238E27FC236}">
-                <a16:creationId xmlns:a16="http://schemas.microsoft.com/office/drawing/2014/main" id="{D3971493-1200-BA08-93A2-9B8319CD5965}"/>
-              </a:ext>
-            </a:extLst>
-          </p:cNvPr>
-          <p:cNvSpPr/>
-          <p:nvPr/>
-        </p:nvSpPr>
-        <p:spPr>
-          <a:xfrm>
-            <a:off x="1189434" y="4261046"/>
-            <a:ext cx="6094520" cy="954485"/>
-          </a:xfrm>
-          <a:prstGeom prst="roundRect">
-            <a:avLst/>
-          </a:prstGeom>
-          <a:noFill/>
-        </p:spPr>
-        <p:style>
-          <a:lnRef idx="2">
-            <a:schemeClr val="accent1">
-              <a:shade val="15000"/>
-            </a:schemeClr>
-          </a:lnRef>
-          <a:fillRef idx="1">
-            <a:schemeClr val="accent1"/>
-          </a:fillRef>
-          <a:effectRef idx="0">
-            <a:schemeClr val="accent1"/>
-          </a:effectRef>
-          <a:fontRef idx="minor">
-            <a:schemeClr val="lt1"/>
-          </a:fontRef>
-        </p:style>
-        <p:txBody>
-          <a:bodyPr rtlCol="0" anchor="ctr">
-            <a:normAutofit/>
-          </a:bodyPr>
-          <a:lstStyle/>
-          <a:p>
-            <a:pPr algn="ctr"/>
-            <a:endParaRPr lang="en-GB"/>
-          </a:p>
-        </p:txBody>
-      </p:sp>
-      <p:sp>
-        <p:nvSpPr>
-          <p:cNvPr id="18" name="TextBox 17">
-            <a:extLst>
-              <a:ext uri="{FF2B5EF4-FFF2-40B4-BE49-F238E27FC236}">
-                <a16:creationId xmlns:a16="http://schemas.microsoft.com/office/drawing/2014/main" id="{901A030E-1065-70C1-854E-1535AA79FEBB}"/>
-              </a:ext>
-            </a:extLst>
-          </p:cNvPr>
-          <p:cNvSpPr txBox="1"/>
-          <p:nvPr/>
-        </p:nvSpPr>
-        <p:spPr>
-          <a:xfrm>
-            <a:off x="1189434" y="3903378"/>
-            <a:ext cx="3161096" cy="369332"/>
-          </a:xfrm>
-          <a:prstGeom prst="rect">
-            <a:avLst/>
-          </a:prstGeom>
-          <a:noFill/>
-        </p:spPr>
-        <p:txBody>
-          <a:bodyPr wrap="square" rtlCol="0">
-            <a:spAutoFit/>
-          </a:bodyPr>
-          <a:lstStyle/>
-          <a:p>
-            <a:r>
-              <a:rPr lang="en-US" dirty="0"/>
-              <a:t>Research Question 3</a:t>
-            </a:r>
-            <a:endParaRPr lang="en-GB" dirty="0"/>
-          </a:p>
-        </p:txBody>
-      </p:sp>
-    </p:spTree>
-    <p:extLst>
-      <p:ext uri="{BB962C8B-B14F-4D97-AF65-F5344CB8AC3E}">
-        <p14:creationId xmlns:p14="http://schemas.microsoft.com/office/powerpoint/2010/main" val="2844604785"/>
-      </p:ext>
-    </p:extLst>
-  </p:cSld>
-  <p:clrMapOvr>
-    <a:masterClrMapping/>
-  </p:clrMapOvr>
-</p:sld>
-</file>
-
-<file path=ppt/slides/slide8.xml><?xml version="1.0" encoding="utf-8"?>
-<p:sld xmlns:a="http://schemas.openxmlformats.org/drawingml/2006/main" xmlns:r="http://schemas.openxmlformats.org/officeDocument/2006/relationships" xmlns:p="http://schemas.openxmlformats.org/presentationml/2006/main">
-  <p:cSld>
-    <p:spTree>
-      <p:nvGrpSpPr>
-        <p:cNvPr id="1" name="">
-          <a:extLst>
-            <a:ext uri="{FF2B5EF4-FFF2-40B4-BE49-F238E27FC236}">
               <a16:creationId xmlns:a16="http://schemas.microsoft.com/office/drawing/2014/main" id="{29336187-11AF-077D-B3F3-74C04FFF145F}"/>
             </a:ext>
           </a:extLst>
@@ -7558,391 +7478,6 @@
               <a:t>Research Questions</a:t>
             </a:r>
             <a:endParaRPr lang="en-GB" dirty="0"/>
-          </a:p>
-        </p:txBody>
-      </p:sp>
-      <p:sp>
-        <p:nvSpPr>
-          <p:cNvPr id="8" name="TextBox 7">
-            <a:extLst>
-              <a:ext uri="{FF2B5EF4-FFF2-40B4-BE49-F238E27FC236}">
-                <a16:creationId xmlns:a16="http://schemas.microsoft.com/office/drawing/2014/main" id="{49616EDE-1929-BB49-E8B3-EA33C81C48CE}"/>
-              </a:ext>
-            </a:extLst>
-          </p:cNvPr>
-          <p:cNvSpPr txBox="1"/>
-          <p:nvPr/>
-        </p:nvSpPr>
-        <p:spPr>
-          <a:xfrm>
-            <a:off x="5862556" y="3067088"/>
-            <a:ext cx="6094520" cy="1167503"/>
-          </a:xfrm>
-          <a:prstGeom prst="rect">
-            <a:avLst/>
-          </a:prstGeom>
-          <a:noFill/>
-        </p:spPr>
-        <p:txBody>
-          <a:bodyPr wrap="square">
-            <a:normAutofit fontScale="85000" lnSpcReduction="10000"/>
-          </a:bodyPr>
-          <a:lstStyle/>
-          <a:p>
-            <a:pPr algn="ctr"/>
-            <a:r>
-              <a:rPr lang="en-US" dirty="0"/>
-              <a:t>With the ever-increasing use of IoT devices, </a:t>
-            </a:r>
-            <a:r>
-              <a:rPr lang="en-US" b="1" dirty="0"/>
-              <a:t>can FL algorithms or tools be designed to operate specifically on resources Edge devices to minimize computational and communications costs</a:t>
-            </a:r>
-            <a:r>
-              <a:rPr lang="en-US" dirty="0"/>
-              <a:t>. The models should be adaptable to non independently and identically distributed data (IID), and ideally be carried out on the device.</a:t>
-            </a:r>
-          </a:p>
-          <a:p>
-            <a:endParaRPr lang="en-US" dirty="0"/>
-          </a:p>
-        </p:txBody>
-      </p:sp>
-      <p:sp>
-        <p:nvSpPr>
-          <p:cNvPr id="10" name="TextBox 9">
-            <a:extLst>
-              <a:ext uri="{FF2B5EF4-FFF2-40B4-BE49-F238E27FC236}">
-                <a16:creationId xmlns:a16="http://schemas.microsoft.com/office/drawing/2014/main" id="{2E011869-EC12-4DF2-2BF1-0C6545DACE4E}"/>
-              </a:ext>
-            </a:extLst>
-          </p:cNvPr>
-          <p:cNvSpPr txBox="1"/>
-          <p:nvPr/>
-        </p:nvSpPr>
-        <p:spPr>
-          <a:xfrm>
-            <a:off x="1189434" y="2125202"/>
-            <a:ext cx="5468818" cy="875450"/>
-          </a:xfrm>
-          <a:prstGeom prst="rect">
-            <a:avLst/>
-          </a:prstGeom>
-          <a:noFill/>
-        </p:spPr>
-        <p:txBody>
-          <a:bodyPr wrap="square">
-            <a:normAutofit fontScale="85000" lnSpcReduction="20000"/>
-          </a:bodyPr>
-          <a:lstStyle/>
-          <a:p>
-            <a:pPr algn="ctr"/>
-            <a:r>
-              <a:rPr lang="en-US" dirty="0"/>
-              <a:t>In any large distributed network, there is a chance that some nodes can be lost, for a range of reason. </a:t>
-            </a:r>
-            <a:r>
-              <a:rPr lang="en-US" b="1" dirty="0"/>
-              <a:t>Can a FL architecture be designed to be resilient, allowing it to identify missing nodes, and adapt so that there is no loss in performance? </a:t>
-            </a:r>
-            <a:endParaRPr lang="en-GB" b="1" dirty="0"/>
-          </a:p>
-        </p:txBody>
-      </p:sp>
-      <p:sp>
-        <p:nvSpPr>
-          <p:cNvPr id="13" name="Rectangle: Rounded Corners 12">
-            <a:extLst>
-              <a:ext uri="{FF2B5EF4-FFF2-40B4-BE49-F238E27FC236}">
-                <a16:creationId xmlns:a16="http://schemas.microsoft.com/office/drawing/2014/main" id="{9D4EFA77-B219-B3C7-6A7C-6F80AE811C7A}"/>
-              </a:ext>
-            </a:extLst>
-          </p:cNvPr>
-          <p:cNvSpPr/>
-          <p:nvPr/>
-        </p:nvSpPr>
-        <p:spPr>
-          <a:xfrm>
-            <a:off x="5862556" y="3022626"/>
-            <a:ext cx="6094520" cy="1200329"/>
-          </a:xfrm>
-          <a:prstGeom prst="roundRect">
-            <a:avLst/>
-          </a:prstGeom>
-          <a:noFill/>
-        </p:spPr>
-        <p:style>
-          <a:lnRef idx="2">
-            <a:schemeClr val="accent1">
-              <a:shade val="15000"/>
-            </a:schemeClr>
-          </a:lnRef>
-          <a:fillRef idx="1">
-            <a:schemeClr val="accent1"/>
-          </a:fillRef>
-          <a:effectRef idx="0">
-            <a:schemeClr val="accent1"/>
-          </a:effectRef>
-          <a:fontRef idx="minor">
-            <a:schemeClr val="lt1"/>
-          </a:fontRef>
-        </p:style>
-        <p:txBody>
-          <a:bodyPr rtlCol="0" anchor="ctr">
-            <a:normAutofit/>
-          </a:bodyPr>
-          <a:lstStyle/>
-          <a:p>
-            <a:pPr algn="ctr"/>
-            <a:endParaRPr lang="en-GB"/>
-          </a:p>
-        </p:txBody>
-      </p:sp>
-      <p:sp>
-        <p:nvSpPr>
-          <p:cNvPr id="14" name="TextBox 13">
-            <a:extLst>
-              <a:ext uri="{FF2B5EF4-FFF2-40B4-BE49-F238E27FC236}">
-                <a16:creationId xmlns:a16="http://schemas.microsoft.com/office/drawing/2014/main" id="{2C444DD1-9238-12EF-908C-1794A1DF0440}"/>
-              </a:ext>
-            </a:extLst>
-          </p:cNvPr>
-          <p:cNvSpPr txBox="1"/>
-          <p:nvPr/>
-        </p:nvSpPr>
-        <p:spPr>
-          <a:xfrm>
-            <a:off x="1097280" y="1737847"/>
-            <a:ext cx="2109488" cy="369332"/>
-          </a:xfrm>
-          <a:prstGeom prst="rect">
-            <a:avLst/>
-          </a:prstGeom>
-          <a:noFill/>
-        </p:spPr>
-        <p:txBody>
-          <a:bodyPr wrap="none" rtlCol="0">
-            <a:spAutoFit/>
-          </a:bodyPr>
-          <a:lstStyle/>
-          <a:p>
-            <a:r>
-              <a:rPr lang="en-US" dirty="0"/>
-              <a:t>Research Question 1</a:t>
-            </a:r>
-            <a:endParaRPr lang="en-GB" dirty="0"/>
-          </a:p>
-        </p:txBody>
-      </p:sp>
-      <p:sp>
-        <p:nvSpPr>
-          <p:cNvPr id="15" name="Rectangle: Rounded Corners 14">
-            <a:extLst>
-              <a:ext uri="{FF2B5EF4-FFF2-40B4-BE49-F238E27FC236}">
-                <a16:creationId xmlns:a16="http://schemas.microsoft.com/office/drawing/2014/main" id="{4508A9F1-BA5D-F7C2-A8DF-679565A2D5FF}"/>
-              </a:ext>
-            </a:extLst>
-          </p:cNvPr>
-          <p:cNvSpPr/>
-          <p:nvPr/>
-        </p:nvSpPr>
-        <p:spPr>
-          <a:xfrm>
-            <a:off x="1189434" y="2114669"/>
-            <a:ext cx="5468818" cy="875451"/>
-          </a:xfrm>
-          <a:prstGeom prst="roundRect">
-            <a:avLst/>
-          </a:prstGeom>
-          <a:noFill/>
-        </p:spPr>
-        <p:style>
-          <a:lnRef idx="2">
-            <a:schemeClr val="accent1">
-              <a:shade val="15000"/>
-            </a:schemeClr>
-          </a:lnRef>
-          <a:fillRef idx="1">
-            <a:schemeClr val="accent1"/>
-          </a:fillRef>
-          <a:effectRef idx="0">
-            <a:schemeClr val="accent1"/>
-          </a:effectRef>
-          <a:fontRef idx="minor">
-            <a:schemeClr val="lt1"/>
-          </a:fontRef>
-        </p:style>
-        <p:txBody>
-          <a:bodyPr rtlCol="0" anchor="ctr"/>
-          <a:lstStyle/>
-          <a:p>
-            <a:pPr algn="ctr"/>
-            <a:endParaRPr lang="en-GB"/>
-          </a:p>
-        </p:txBody>
-      </p:sp>
-      <p:sp>
-        <p:nvSpPr>
-          <p:cNvPr id="16" name="TextBox 15">
-            <a:extLst>
-              <a:ext uri="{FF2B5EF4-FFF2-40B4-BE49-F238E27FC236}">
-                <a16:creationId xmlns:a16="http://schemas.microsoft.com/office/drawing/2014/main" id="{39FA9E42-CAFB-48E3-6C47-14712A0460E1}"/>
-              </a:ext>
-            </a:extLst>
-          </p:cNvPr>
-          <p:cNvSpPr txBox="1"/>
-          <p:nvPr/>
-        </p:nvSpPr>
-        <p:spPr>
-          <a:xfrm>
-            <a:off x="8600671" y="2633193"/>
-            <a:ext cx="3161096" cy="369332"/>
-          </a:xfrm>
-          <a:prstGeom prst="rect">
-            <a:avLst/>
-          </a:prstGeom>
-          <a:noFill/>
-        </p:spPr>
-        <p:txBody>
-          <a:bodyPr wrap="square" rtlCol="0">
-            <a:spAutoFit/>
-          </a:bodyPr>
-          <a:lstStyle/>
-          <a:p>
-            <a:pPr algn="r"/>
-            <a:r>
-              <a:rPr lang="en-US" dirty="0"/>
-              <a:t>Research Question 2</a:t>
-            </a:r>
-            <a:endParaRPr lang="en-GB" dirty="0"/>
-          </a:p>
-        </p:txBody>
-      </p:sp>
-      <p:sp>
-        <p:nvSpPr>
-          <p:cNvPr id="17" name="Rectangle: Rounded Corners 16">
-            <a:extLst>
-              <a:ext uri="{FF2B5EF4-FFF2-40B4-BE49-F238E27FC236}">
-                <a16:creationId xmlns:a16="http://schemas.microsoft.com/office/drawing/2014/main" id="{D21578CC-15CC-92EC-7229-046D5C3CEE6A}"/>
-              </a:ext>
-            </a:extLst>
-          </p:cNvPr>
-          <p:cNvSpPr/>
-          <p:nvPr/>
-        </p:nvSpPr>
-        <p:spPr>
-          <a:xfrm>
-            <a:off x="1189434" y="4261046"/>
-            <a:ext cx="6094520" cy="954485"/>
-          </a:xfrm>
-          <a:prstGeom prst="roundRect">
-            <a:avLst/>
-          </a:prstGeom>
-          <a:noFill/>
-        </p:spPr>
-        <p:style>
-          <a:lnRef idx="2">
-            <a:schemeClr val="accent1">
-              <a:shade val="15000"/>
-            </a:schemeClr>
-          </a:lnRef>
-          <a:fillRef idx="1">
-            <a:schemeClr val="accent1"/>
-          </a:fillRef>
-          <a:effectRef idx="0">
-            <a:schemeClr val="accent1"/>
-          </a:effectRef>
-          <a:fontRef idx="minor">
-            <a:schemeClr val="lt1"/>
-          </a:fontRef>
-        </p:style>
-        <p:txBody>
-          <a:bodyPr rtlCol="0" anchor="ctr">
-            <a:normAutofit/>
-          </a:bodyPr>
-          <a:lstStyle/>
-          <a:p>
-            <a:pPr algn="ctr"/>
-            <a:endParaRPr lang="en-GB"/>
-          </a:p>
-        </p:txBody>
-      </p:sp>
-      <p:sp>
-        <p:nvSpPr>
-          <p:cNvPr id="18" name="TextBox 17">
-            <a:extLst>
-              <a:ext uri="{FF2B5EF4-FFF2-40B4-BE49-F238E27FC236}">
-                <a16:creationId xmlns:a16="http://schemas.microsoft.com/office/drawing/2014/main" id="{2BB441D9-104D-3543-0995-9785C504B36F}"/>
-              </a:ext>
-            </a:extLst>
-          </p:cNvPr>
-          <p:cNvSpPr txBox="1"/>
-          <p:nvPr/>
-        </p:nvSpPr>
-        <p:spPr>
-          <a:xfrm>
-            <a:off x="1189434" y="3903378"/>
-            <a:ext cx="3161096" cy="369332"/>
-          </a:xfrm>
-          <a:prstGeom prst="rect">
-            <a:avLst/>
-          </a:prstGeom>
-          <a:noFill/>
-        </p:spPr>
-        <p:txBody>
-          <a:bodyPr wrap="square" rtlCol="0">
-            <a:spAutoFit/>
-          </a:bodyPr>
-          <a:lstStyle/>
-          <a:p>
-            <a:r>
-              <a:rPr lang="en-US" dirty="0"/>
-              <a:t>Research Question 3</a:t>
-            </a:r>
-            <a:endParaRPr lang="en-GB" dirty="0"/>
-          </a:p>
-        </p:txBody>
-      </p:sp>
-      <p:sp>
-        <p:nvSpPr>
-          <p:cNvPr id="19" name="TextBox 18">
-            <a:extLst>
-              <a:ext uri="{FF2B5EF4-FFF2-40B4-BE49-F238E27FC236}">
-                <a16:creationId xmlns:a16="http://schemas.microsoft.com/office/drawing/2014/main" id="{6AC0E29E-2C9A-6E0C-3F63-C28C07190676}"/>
-              </a:ext>
-            </a:extLst>
-          </p:cNvPr>
-          <p:cNvSpPr txBox="1"/>
-          <p:nvPr/>
-        </p:nvSpPr>
-        <p:spPr>
-          <a:xfrm>
-            <a:off x="1189434" y="4261046"/>
-            <a:ext cx="6094520" cy="954484"/>
-          </a:xfrm>
-          <a:prstGeom prst="rect">
-            <a:avLst/>
-          </a:prstGeom>
-          <a:noFill/>
-        </p:spPr>
-        <p:txBody>
-          <a:bodyPr wrap="square">
-            <a:normAutofit/>
-          </a:bodyPr>
-          <a:lstStyle/>
-          <a:p>
-            <a:pPr algn="ctr"/>
-            <a:r>
-              <a:rPr lang="en-US" b="1" dirty="0"/>
-              <a:t>Can we design efficient aggregation algorithms for FL </a:t>
-            </a:r>
-            <a:r>
-              <a:rPr lang="en-US" dirty="0"/>
-              <a:t>that minimize the data exchange between clients and servers while not reducing the model accuracy?</a:t>
-            </a:r>
-          </a:p>
-          <a:p>
-            <a:endParaRPr lang="en-US" dirty="0"/>
           </a:p>
         </p:txBody>
       </p:sp>
@@ -8047,7 +7582,7 @@
 </p:sld>
 </file>
 
-<file path=ppt/slides/slide9.xml><?xml version="1.0" encoding="utf-8"?>
+<file path=ppt/slides/slide8.xml><?xml version="1.0" encoding="utf-8"?>
 <p:sld xmlns:a="http://schemas.openxmlformats.org/drawingml/2006/main" xmlns:r="http://schemas.openxmlformats.org/officeDocument/2006/relationships" xmlns:p="http://schemas.openxmlformats.org/presentationml/2006/main">
   <p:cSld>
     <p:spTree>

</xml_diff>

<commit_message>
Added LF system diagram, and changed some slide formatting
</commit_message>
<xml_diff>
--- a/Presentations/Supervisor Meetings/2024/Upcoming Meeting.pptx
+++ b/Presentations/Supervisor Meetings/2024/Upcoming Meeting.pptx
@@ -122,7 +122,7 @@
 <file path=ppt/revisionInfo.xml><?xml version="1.0" encoding="utf-8"?>
 <p1510:revInfo xmlns:a="http://schemas.openxmlformats.org/drawingml/2006/main" xmlns:r="http://schemas.openxmlformats.org/officeDocument/2006/relationships" xmlns:p1510="http://schemas.microsoft.com/office/powerpoint/2015/10/main">
   <p1510:revLst>
-    <p1510:client id="{B7574C7C-3686-460F-9B9F-2A9122AA95F8}" v="46" dt="2024-02-19T18:35:19.781"/>
+    <p1510:client id="{B7574C7C-3686-460F-9B9F-2A9122AA95F8}" v="70" dt="2024-02-25T21:07:13.962"/>
   </p1510:revLst>
 </p1510:revInfo>
 </file>
@@ -1483,31 +1483,87 @@
   <pc:docChgLst>
     <pc:chgData name="Sean O Fithcheallaigh" userId="47659c31-a575-4792-8be3-61268c4ee0d6" providerId="ADAL" clId="{B7574C7C-3686-460F-9B9F-2A9122AA95F8}"/>
     <pc:docChg chg="undo custSel addSld delSld modSld modMainMaster">
-      <pc:chgData name="Sean O Fithcheallaigh" userId="47659c31-a575-4792-8be3-61268c4ee0d6" providerId="ADAL" clId="{B7574C7C-3686-460F-9B9F-2A9122AA95F8}" dt="2024-02-21T13:47:52.806" v="2548" actId="478"/>
+      <pc:chgData name="Sean O Fithcheallaigh" userId="47659c31-a575-4792-8be3-61268c4ee0d6" providerId="ADAL" clId="{B7574C7C-3686-460F-9B9F-2A9122AA95F8}" dt="2024-02-25T21:07:37.360" v="2800" actId="20577"/>
       <pc:docMkLst>
         <pc:docMk/>
       </pc:docMkLst>
-      <pc:sldChg chg="modSp mod">
-        <pc:chgData name="Sean O Fithcheallaigh" userId="47659c31-a575-4792-8be3-61268c4ee0d6" providerId="ADAL" clId="{B7574C7C-3686-460F-9B9F-2A9122AA95F8}" dt="2024-02-12T19:34:42.577" v="7" actId="20577"/>
+      <pc:sldChg chg="addSp modSp mod setBg chgLayout">
+        <pc:chgData name="Sean O Fithcheallaigh" userId="47659c31-a575-4792-8be3-61268c4ee0d6" providerId="ADAL" clId="{B7574C7C-3686-460F-9B9F-2A9122AA95F8}" dt="2024-02-25T21:07:37.360" v="2800" actId="20577"/>
         <pc:sldMkLst>
           <pc:docMk/>
           <pc:sldMk cId="905190482" sldId="256"/>
         </pc:sldMkLst>
-        <pc:spChg chg="mod">
-          <ac:chgData name="Sean O Fithcheallaigh" userId="47659c31-a575-4792-8be3-61268c4ee0d6" providerId="ADAL" clId="{B7574C7C-3686-460F-9B9F-2A9122AA95F8}" dt="2024-02-12T19:34:42.577" v="7" actId="20577"/>
+        <pc:spChg chg="mod ord">
+          <ac:chgData name="Sean O Fithcheallaigh" userId="47659c31-a575-4792-8be3-61268c4ee0d6" providerId="ADAL" clId="{B7574C7C-3686-460F-9B9F-2A9122AA95F8}" dt="2024-02-25T21:04:12.995" v="2782" actId="26606"/>
+          <ac:spMkLst>
+            <pc:docMk/>
+            <pc:sldMk cId="905190482" sldId="256"/>
+            <ac:spMk id="2" creationId="{9D26D2D5-D30F-4BA4-BE2B-908BEB7AA9C6}"/>
+          </ac:spMkLst>
+        </pc:spChg>
+        <pc:spChg chg="mod ord">
+          <ac:chgData name="Sean O Fithcheallaigh" userId="47659c31-a575-4792-8be3-61268c4ee0d6" providerId="ADAL" clId="{B7574C7C-3686-460F-9B9F-2A9122AA95F8}" dt="2024-02-25T21:07:37.360" v="2800" actId="20577"/>
           <ac:spMkLst>
             <pc:docMk/>
             <pc:sldMk cId="905190482" sldId="256"/>
             <ac:spMk id="3" creationId="{678D1CD4-AABC-4B3E-A2CC-37ACEEC74568}"/>
           </ac:spMkLst>
         </pc:spChg>
+        <pc:spChg chg="add">
+          <ac:chgData name="Sean O Fithcheallaigh" userId="47659c31-a575-4792-8be3-61268c4ee0d6" providerId="ADAL" clId="{B7574C7C-3686-460F-9B9F-2A9122AA95F8}" dt="2024-02-25T21:04:12.995" v="2782" actId="26606"/>
+          <ac:spMkLst>
+            <pc:docMk/>
+            <pc:sldMk cId="905190482" sldId="256"/>
+            <ac:spMk id="13" creationId="{4030725F-96B1-4047-B74B-7CC19DB1CB42}"/>
+          </ac:spMkLst>
+        </pc:spChg>
+        <pc:spChg chg="add">
+          <ac:chgData name="Sean O Fithcheallaigh" userId="47659c31-a575-4792-8be3-61268c4ee0d6" providerId="ADAL" clId="{B7574C7C-3686-460F-9B9F-2A9122AA95F8}" dt="2024-02-25T21:04:12.995" v="2782" actId="26606"/>
+          <ac:spMkLst>
+            <pc:docMk/>
+            <pc:sldMk cId="905190482" sldId="256"/>
+            <ac:spMk id="17" creationId="{D03ABE8C-6A7E-4C35-B74C-CE45DA0B504B}"/>
+          </ac:spMkLst>
+        </pc:spChg>
+        <pc:spChg chg="add">
+          <ac:chgData name="Sean O Fithcheallaigh" userId="47659c31-a575-4792-8be3-61268c4ee0d6" providerId="ADAL" clId="{B7574C7C-3686-460F-9B9F-2A9122AA95F8}" dt="2024-02-25T21:04:12.995" v="2782" actId="26606"/>
+          <ac:spMkLst>
+            <pc:docMk/>
+            <pc:sldMk cId="905190482" sldId="256"/>
+            <ac:spMk id="19" creationId="{431B6D19-39C5-45BF-8B25-29192C5D1395}"/>
+          </ac:spMkLst>
+        </pc:spChg>
+        <pc:picChg chg="mod">
+          <ac:chgData name="Sean O Fithcheallaigh" userId="47659c31-a575-4792-8be3-61268c4ee0d6" providerId="ADAL" clId="{B7574C7C-3686-460F-9B9F-2A9122AA95F8}" dt="2024-02-25T21:04:12.995" v="2782" actId="26606"/>
+          <ac:picMkLst>
+            <pc:docMk/>
+            <pc:sldMk cId="905190482" sldId="256"/>
+            <ac:picMk id="7" creationId="{CE993EFB-9571-715A-5DF5-03848A409B21}"/>
+          </ac:picMkLst>
+        </pc:picChg>
+        <pc:cxnChg chg="add">
+          <ac:chgData name="Sean O Fithcheallaigh" userId="47659c31-a575-4792-8be3-61268c4ee0d6" providerId="ADAL" clId="{B7574C7C-3686-460F-9B9F-2A9122AA95F8}" dt="2024-02-25T21:04:12.995" v="2782" actId="26606"/>
+          <ac:cxnSpMkLst>
+            <pc:docMk/>
+            <pc:sldMk cId="905190482" sldId="256"/>
+            <ac:cxnSpMk id="15" creationId="{C14B5A7D-B352-42F9-83F6-4AF14C1BAE65}"/>
+          </ac:cxnSpMkLst>
+        </pc:cxnChg>
       </pc:sldChg>
-      <pc:sldChg chg="addSp delSp modSp mod">
-        <pc:chgData name="Sean O Fithcheallaigh" userId="47659c31-a575-4792-8be3-61268c4ee0d6" providerId="ADAL" clId="{B7574C7C-3686-460F-9B9F-2A9122AA95F8}" dt="2024-02-16T14:57:22.743" v="1212" actId="1076"/>
+      <pc:sldChg chg="addSp delSp modSp mod setBg">
+        <pc:chgData name="Sean O Fithcheallaigh" userId="47659c31-a575-4792-8be3-61268c4ee0d6" providerId="ADAL" clId="{B7574C7C-3686-460F-9B9F-2A9122AA95F8}" dt="2024-02-25T21:07:13.962" v="2790"/>
         <pc:sldMkLst>
           <pc:docMk/>
           <pc:sldMk cId="3126834720" sldId="257"/>
         </pc:sldMkLst>
+        <pc:spChg chg="mod">
+          <ac:chgData name="Sean O Fithcheallaigh" userId="47659c31-a575-4792-8be3-61268c4ee0d6" providerId="ADAL" clId="{B7574C7C-3686-460F-9B9F-2A9122AA95F8}" dt="2024-02-25T21:03:23.952" v="2779" actId="14100"/>
+          <ac:spMkLst>
+            <pc:docMk/>
+            <pc:sldMk cId="3126834720" sldId="257"/>
+            <ac:spMk id="2" creationId="{681D533A-3C45-4858-8E40-47B9F15C47FC}"/>
+          </ac:spMkLst>
+        </pc:spChg>
         <pc:spChg chg="add del mod ord">
           <ac:chgData name="Sean O Fithcheallaigh" userId="47659c31-a575-4792-8be3-61268c4ee0d6" providerId="ADAL" clId="{B7574C7C-3686-460F-9B9F-2A9122AA95F8}" dt="2024-02-12T19:55:42.077" v="39" actId="478"/>
           <ac:spMkLst>
@@ -1698,13 +1754,13 @@
         </pc:sldMkLst>
       </pc:sldChg>
       <pc:sldChg chg="addSp delSp modSp new mod chgLayout">
-        <pc:chgData name="Sean O Fithcheallaigh" userId="47659c31-a575-4792-8be3-61268c4ee0d6" providerId="ADAL" clId="{B7574C7C-3686-460F-9B9F-2A9122AA95F8}" dt="2024-02-19T20:23:47.515" v="2543" actId="1076"/>
+        <pc:chgData name="Sean O Fithcheallaigh" userId="47659c31-a575-4792-8be3-61268c4ee0d6" providerId="ADAL" clId="{B7574C7C-3686-460F-9B9F-2A9122AA95F8}" dt="2024-02-25T20:57:48.821" v="2688" actId="14100"/>
         <pc:sldMkLst>
           <pc:docMk/>
           <pc:sldMk cId="2974212779" sldId="262"/>
         </pc:sldMkLst>
-        <pc:spChg chg="mod ord">
-          <ac:chgData name="Sean O Fithcheallaigh" userId="47659c31-a575-4792-8be3-61268c4ee0d6" providerId="ADAL" clId="{B7574C7C-3686-460F-9B9F-2A9122AA95F8}" dt="2024-02-18T20:41:30.007" v="2312" actId="14100"/>
+        <pc:spChg chg="del mod ord">
+          <ac:chgData name="Sean O Fithcheallaigh" userId="47659c31-a575-4792-8be3-61268c4ee0d6" providerId="ADAL" clId="{B7574C7C-3686-460F-9B9F-2A9122AA95F8}" dt="2024-02-25T20:57:33.742" v="2682" actId="478"/>
           <ac:spMkLst>
             <pc:docMk/>
             <pc:sldMk cId="2974212779" sldId="262"/>
@@ -1727,6 +1783,14 @@
             <ac:spMk id="3" creationId="{51F93FA8-3939-B691-B925-DB5285307CE7}"/>
           </ac:spMkLst>
         </pc:spChg>
+        <pc:spChg chg="add mod">
+          <ac:chgData name="Sean O Fithcheallaigh" userId="47659c31-a575-4792-8be3-61268c4ee0d6" providerId="ADAL" clId="{B7574C7C-3686-460F-9B9F-2A9122AA95F8}" dt="2024-02-25T20:57:44.372" v="2687" actId="27636"/>
+          <ac:spMkLst>
+            <pc:docMk/>
+            <pc:sldMk cId="2974212779" sldId="262"/>
+            <ac:spMk id="3" creationId="{6E0278D4-A37C-DE0F-37CD-F271C3D0E448}"/>
+          </ac:spMkLst>
+        </pc:spChg>
         <pc:spChg chg="add del mod">
           <ac:chgData name="Sean O Fithcheallaigh" userId="47659c31-a575-4792-8be3-61268c4ee0d6" providerId="ADAL" clId="{B7574C7C-3686-460F-9B9F-2A9122AA95F8}" dt="2024-02-17T12:31:11.160" v="2038" actId="478"/>
           <ac:spMkLst>
@@ -1760,6 +1824,14 @@
           </ac:spMkLst>
         </pc:spChg>
         <pc:spChg chg="add del mod">
+          <ac:chgData name="Sean O Fithcheallaigh" userId="47659c31-a575-4792-8be3-61268c4ee0d6" providerId="ADAL" clId="{B7574C7C-3686-460F-9B9F-2A9122AA95F8}" dt="2024-02-25T20:57:37.715" v="2683" actId="478"/>
+          <ac:spMkLst>
+            <pc:docMk/>
+            <pc:sldMk cId="2974212779" sldId="262"/>
+            <ac:spMk id="6" creationId="{8D1E488F-BB03-F49C-8001-0454BC0AB8E8}"/>
+          </ac:spMkLst>
+        </pc:spChg>
+        <pc:spChg chg="add del mod">
           <ac:chgData name="Sean O Fithcheallaigh" userId="47659c31-a575-4792-8be3-61268c4ee0d6" providerId="ADAL" clId="{B7574C7C-3686-460F-9B9F-2A9122AA95F8}" dt="2024-02-17T12:31:04.058" v="2033" actId="478"/>
           <ac:spMkLst>
             <pc:docMk/>
@@ -1768,7 +1840,7 @@
           </ac:spMkLst>
         </pc:spChg>
         <pc:spChg chg="add mod">
-          <ac:chgData name="Sean O Fithcheallaigh" userId="47659c31-a575-4792-8be3-61268c4ee0d6" providerId="ADAL" clId="{B7574C7C-3686-460F-9B9F-2A9122AA95F8}" dt="2024-02-18T19:17:53.214" v="2274" actId="1076"/>
+          <ac:chgData name="Sean O Fithcheallaigh" userId="47659c31-a575-4792-8be3-61268c4ee0d6" providerId="ADAL" clId="{B7574C7C-3686-460F-9B9F-2A9122AA95F8}" dt="2024-02-25T20:54:22.073" v="2600" actId="1076"/>
           <ac:spMkLst>
             <pc:docMk/>
             <pc:sldMk cId="2974212779" sldId="262"/>
@@ -1800,7 +1872,7 @@
           </ac:spMkLst>
         </pc:spChg>
         <pc:spChg chg="add mod">
-          <ac:chgData name="Sean O Fithcheallaigh" userId="47659c31-a575-4792-8be3-61268c4ee0d6" providerId="ADAL" clId="{B7574C7C-3686-460F-9B9F-2A9122AA95F8}" dt="2024-02-18T19:17:49.008" v="2273" actId="1076"/>
+          <ac:chgData name="Sean O Fithcheallaigh" userId="47659c31-a575-4792-8be3-61268c4ee0d6" providerId="ADAL" clId="{B7574C7C-3686-460F-9B9F-2A9122AA95F8}" dt="2024-02-25T20:54:19.457" v="2599" actId="1076"/>
           <ac:spMkLst>
             <pc:docMk/>
             <pc:sldMk cId="2974212779" sldId="262"/>
@@ -1848,7 +1920,7 @@
           </ac:graphicFrameMkLst>
         </pc:graphicFrameChg>
         <pc:picChg chg="add mod">
-          <ac:chgData name="Sean O Fithcheallaigh" userId="47659c31-a575-4792-8be3-61268c4ee0d6" providerId="ADAL" clId="{B7574C7C-3686-460F-9B9F-2A9122AA95F8}" dt="2024-02-19T20:23:47.515" v="2543" actId="1076"/>
+          <ac:chgData name="Sean O Fithcheallaigh" userId="47659c31-a575-4792-8be3-61268c4ee0d6" providerId="ADAL" clId="{B7574C7C-3686-460F-9B9F-2A9122AA95F8}" dt="2024-02-25T20:57:48.821" v="2688" actId="14100"/>
           <ac:picMkLst>
             <pc:docMk/>
             <pc:sldMk cId="2974212779" sldId="262"/>
@@ -2070,12 +2142,44 @@
           </ac:spMkLst>
         </pc:spChg>
       </pc:sldChg>
-      <pc:sldChg chg="delSp add mod">
-        <pc:chgData name="Sean O Fithcheallaigh" userId="47659c31-a575-4792-8be3-61268c4ee0d6" providerId="ADAL" clId="{B7574C7C-3686-460F-9B9F-2A9122AA95F8}" dt="2024-02-21T13:47:52.806" v="2548" actId="478"/>
+      <pc:sldChg chg="addSp delSp modSp add mod setBg modClrScheme chgLayout">
+        <pc:chgData name="Sean O Fithcheallaigh" userId="47659c31-a575-4792-8be3-61268c4ee0d6" providerId="ADAL" clId="{B7574C7C-3686-460F-9B9F-2A9122AA95F8}" dt="2024-02-25T21:07:13.962" v="2790"/>
         <pc:sldMkLst>
           <pc:docMk/>
           <pc:sldMk cId="3782082519" sldId="265"/>
         </pc:sldMkLst>
+        <pc:spChg chg="mod ord">
+          <ac:chgData name="Sean O Fithcheallaigh" userId="47659c31-a575-4792-8be3-61268c4ee0d6" providerId="ADAL" clId="{B7574C7C-3686-460F-9B9F-2A9122AA95F8}" dt="2024-02-25T21:00:38.529" v="2769" actId="120"/>
+          <ac:spMkLst>
+            <pc:docMk/>
+            <pc:sldMk cId="3782082519" sldId="265"/>
+            <ac:spMk id="2" creationId="{5EBC68A5-31C8-8E46-4543-933119126EA4}"/>
+          </ac:spMkLst>
+        </pc:spChg>
+        <pc:spChg chg="del">
+          <ac:chgData name="Sean O Fithcheallaigh" userId="47659c31-a575-4792-8be3-61268c4ee0d6" providerId="ADAL" clId="{B7574C7C-3686-460F-9B9F-2A9122AA95F8}" dt="2024-02-25T20:44:17.541" v="2549" actId="478"/>
+          <ac:spMkLst>
+            <pc:docMk/>
+            <pc:sldMk cId="3782082519" sldId="265"/>
+            <ac:spMk id="3" creationId="{883692FF-0424-E482-2817-86677FBB9EAC}"/>
+          </ac:spMkLst>
+        </pc:spChg>
+        <pc:spChg chg="del">
+          <ac:chgData name="Sean O Fithcheallaigh" userId="47659c31-a575-4792-8be3-61268c4ee0d6" providerId="ADAL" clId="{B7574C7C-3686-460F-9B9F-2A9122AA95F8}" dt="2024-02-25T20:44:18.437" v="2550" actId="478"/>
+          <ac:spMkLst>
+            <pc:docMk/>
+            <pc:sldMk cId="3782082519" sldId="265"/>
+            <ac:spMk id="4" creationId="{34DED446-234A-C834-8B07-E6D1D3AA7F65}"/>
+          </ac:spMkLst>
+        </pc:spChg>
+        <pc:spChg chg="add del mod ord">
+          <ac:chgData name="Sean O Fithcheallaigh" userId="47659c31-a575-4792-8be3-61268c4ee0d6" providerId="ADAL" clId="{B7574C7C-3686-460F-9B9F-2A9122AA95F8}" dt="2024-02-25T20:59:44.517" v="2733" actId="478"/>
+          <ac:spMkLst>
+            <pc:docMk/>
+            <pc:sldMk cId="3782082519" sldId="265"/>
+            <ac:spMk id="7" creationId="{3D6E6109-CA4B-8A9E-6839-BDB56B386AE5}"/>
+          </ac:spMkLst>
+        </pc:spChg>
         <pc:spChg chg="del">
           <ac:chgData name="Sean O Fithcheallaigh" userId="47659c31-a575-4792-8be3-61268c4ee0d6" providerId="ADAL" clId="{B7574C7C-3686-460F-9B9F-2A9122AA95F8}" dt="2024-02-21T13:47:50.211" v="2547" actId="478"/>
           <ac:spMkLst>
@@ -2148,6 +2252,14 @@
             <ac:spMk id="19" creationId="{6AC0E29E-2C9A-6E0C-3F63-C28C07190676}"/>
           </ac:spMkLst>
         </pc:spChg>
+        <pc:picChg chg="add mod ord">
+          <ac:chgData name="Sean O Fithcheallaigh" userId="47659c31-a575-4792-8be3-61268c4ee0d6" providerId="ADAL" clId="{B7574C7C-3686-460F-9B9F-2A9122AA95F8}" dt="2024-02-25T21:00:54.553" v="2771" actId="14100"/>
+          <ac:picMkLst>
+            <pc:docMk/>
+            <pc:sldMk cId="3782082519" sldId="265"/>
+            <ac:picMk id="6" creationId="{3392B3E4-AC63-EB8B-96D5-17FDDBE2504E}"/>
+          </ac:picMkLst>
+        </pc:picChg>
       </pc:sldChg>
       <pc:sldChg chg="addSp delSp modSp new mod modClrScheme chgLayout">
         <pc:chgData name="Sean O Fithcheallaigh" userId="47659c31-a575-4792-8be3-61268c4ee0d6" providerId="ADAL" clId="{B7574C7C-3686-460F-9B9F-2A9122AA95F8}" dt="2024-02-18T19:19:17.093" v="2304" actId="20577"/>
@@ -2189,13 +2301,13 @@
         </pc:spChg>
       </pc:sldChg>
       <pc:sldChg chg="addSp delSp modSp add mod">
-        <pc:chgData name="Sean O Fithcheallaigh" userId="47659c31-a575-4792-8be3-61268c4ee0d6" providerId="ADAL" clId="{B7574C7C-3686-460F-9B9F-2A9122AA95F8}" dt="2024-02-19T18:34:30.813" v="2536" actId="1076"/>
+        <pc:chgData name="Sean O Fithcheallaigh" userId="47659c31-a575-4792-8be3-61268c4ee0d6" providerId="ADAL" clId="{B7574C7C-3686-460F-9B9F-2A9122AA95F8}" dt="2024-02-25T20:57:53.504" v="2689" actId="14100"/>
         <pc:sldMkLst>
           <pc:docMk/>
           <pc:sldMk cId="788743055" sldId="267"/>
         </pc:sldMkLst>
-        <pc:spChg chg="mod">
-          <ac:chgData name="Sean O Fithcheallaigh" userId="47659c31-a575-4792-8be3-61268c4ee0d6" providerId="ADAL" clId="{B7574C7C-3686-460F-9B9F-2A9122AA95F8}" dt="2024-02-18T22:44:31.320" v="2342" actId="20577"/>
+        <pc:spChg chg="del mod">
+          <ac:chgData name="Sean O Fithcheallaigh" userId="47659c31-a575-4792-8be3-61268c4ee0d6" providerId="ADAL" clId="{B7574C7C-3686-460F-9B9F-2A9122AA95F8}" dt="2024-02-25T20:55:12.344" v="2613" actId="478"/>
           <ac:spMkLst>
             <pc:docMk/>
             <pc:sldMk cId="788743055" sldId="267"/>
@@ -2203,7 +2315,23 @@
           </ac:spMkLst>
         </pc:spChg>
         <pc:spChg chg="add mod">
-          <ac:chgData name="Sean O Fithcheallaigh" userId="47659c31-a575-4792-8be3-61268c4ee0d6" providerId="ADAL" clId="{B7574C7C-3686-460F-9B9F-2A9122AA95F8}" dt="2024-02-18T22:43:33.586" v="2340" actId="14100"/>
+          <ac:chgData name="Sean O Fithcheallaigh" userId="47659c31-a575-4792-8be3-61268c4ee0d6" providerId="ADAL" clId="{B7574C7C-3686-460F-9B9F-2A9122AA95F8}" dt="2024-02-25T20:56:38.479" v="2633" actId="27636"/>
+          <ac:spMkLst>
+            <pc:docMk/>
+            <pc:sldMk cId="788743055" sldId="267"/>
+            <ac:spMk id="3" creationId="{F48022CB-9AA6-E5AB-13E3-835BF32A1988}"/>
+          </ac:spMkLst>
+        </pc:spChg>
+        <pc:spChg chg="add del mod">
+          <ac:chgData name="Sean O Fithcheallaigh" userId="47659c31-a575-4792-8be3-61268c4ee0d6" providerId="ADAL" clId="{B7574C7C-3686-460F-9B9F-2A9122AA95F8}" dt="2024-02-25T20:55:18.455" v="2615" actId="478"/>
+          <ac:spMkLst>
+            <pc:docMk/>
+            <pc:sldMk cId="788743055" sldId="267"/>
+            <ac:spMk id="6" creationId="{3FF19241-6E07-24DC-DB1A-B9D0D31C53E9}"/>
+          </ac:spMkLst>
+        </pc:spChg>
+        <pc:spChg chg="add mod">
+          <ac:chgData name="Sean O Fithcheallaigh" userId="47659c31-a575-4792-8be3-61268c4ee0d6" providerId="ADAL" clId="{B7574C7C-3686-460F-9B9F-2A9122AA95F8}" dt="2024-02-25T20:56:00.275" v="2626" actId="27636"/>
           <ac:spMkLst>
             <pc:docMk/>
             <pc:sldMk cId="788743055" sldId="267"/>
@@ -2216,6 +2344,14 @@
             <pc:docMk/>
             <pc:sldMk cId="788743055" sldId="267"/>
             <ac:spMk id="10" creationId="{EBD7B968-9147-3196-3B41-5DCD0408049E}"/>
+          </ac:spMkLst>
+        </pc:spChg>
+        <pc:spChg chg="mod">
+          <ac:chgData name="Sean O Fithcheallaigh" userId="47659c31-a575-4792-8be3-61268c4ee0d6" providerId="ADAL" clId="{B7574C7C-3686-460F-9B9F-2A9122AA95F8}" dt="2024-02-25T20:56:05.020" v="2627" actId="14100"/>
+          <ac:spMkLst>
+            <pc:docMk/>
+            <pc:sldMk cId="788743055" sldId="267"/>
+            <ac:spMk id="15" creationId="{67D2BD6C-5B3A-C5A0-94AC-D0ECC15EEFBC}"/>
           </ac:spMkLst>
         </pc:spChg>
         <pc:picChg chg="add del mod">
@@ -2227,7 +2363,7 @@
           </ac:picMkLst>
         </pc:picChg>
         <pc:picChg chg="add mod">
-          <ac:chgData name="Sean O Fithcheallaigh" userId="47659c31-a575-4792-8be3-61268c4ee0d6" providerId="ADAL" clId="{B7574C7C-3686-460F-9B9F-2A9122AA95F8}" dt="2024-02-19T18:34:30.813" v="2536" actId="1076"/>
+          <ac:chgData name="Sean O Fithcheallaigh" userId="47659c31-a575-4792-8be3-61268c4ee0d6" providerId="ADAL" clId="{B7574C7C-3686-460F-9B9F-2A9122AA95F8}" dt="2024-02-25T20:57:53.504" v="2689" actId="14100"/>
           <ac:picMkLst>
             <pc:docMk/>
             <pc:sldMk cId="788743055" sldId="267"/>
@@ -2244,19 +2380,35 @@
         </pc:picChg>
       </pc:sldChg>
       <pc:sldChg chg="addSp delSp modSp add mod">
-        <pc:chgData name="Sean O Fithcheallaigh" userId="47659c31-a575-4792-8be3-61268c4ee0d6" providerId="ADAL" clId="{B7574C7C-3686-460F-9B9F-2A9122AA95F8}" dt="2024-02-19T18:35:27.491" v="2542" actId="1076"/>
+        <pc:chgData name="Sean O Fithcheallaigh" userId="47659c31-a575-4792-8be3-61268c4ee0d6" providerId="ADAL" clId="{B7574C7C-3686-460F-9B9F-2A9122AA95F8}" dt="2024-02-25T20:59:28.994" v="2731" actId="14100"/>
         <pc:sldMkLst>
           <pc:docMk/>
           <pc:sldMk cId="3408599131" sldId="268"/>
         </pc:sldMkLst>
-        <pc:spChg chg="mod">
-          <ac:chgData name="Sean O Fithcheallaigh" userId="47659c31-a575-4792-8be3-61268c4ee0d6" providerId="ADAL" clId="{B7574C7C-3686-460F-9B9F-2A9122AA95F8}" dt="2024-02-18T22:48:27.068" v="2366" actId="20577"/>
+        <pc:spChg chg="del mod">
+          <ac:chgData name="Sean O Fithcheallaigh" userId="47659c31-a575-4792-8be3-61268c4ee0d6" providerId="ADAL" clId="{B7574C7C-3686-460F-9B9F-2A9122AA95F8}" dt="2024-02-25T20:58:31.355" v="2695" actId="478"/>
           <ac:spMkLst>
             <pc:docMk/>
             <pc:sldMk cId="3408599131" sldId="268"/>
             <ac:spMk id="2" creationId="{1FD7FD30-CABE-80F9-096F-63AAA66F52B5}"/>
           </ac:spMkLst>
         </pc:spChg>
+        <pc:spChg chg="add del mod">
+          <ac:chgData name="Sean O Fithcheallaigh" userId="47659c31-a575-4792-8be3-61268c4ee0d6" providerId="ADAL" clId="{B7574C7C-3686-460F-9B9F-2A9122AA95F8}" dt="2024-02-25T20:59:09.682" v="2724" actId="478"/>
+          <ac:spMkLst>
+            <pc:docMk/>
+            <pc:sldMk cId="3408599131" sldId="268"/>
+            <ac:spMk id="4" creationId="{CF819D37-CC28-C997-B316-4DDC2A705BBF}"/>
+          </ac:spMkLst>
+        </pc:spChg>
+        <pc:spChg chg="add del mod">
+          <ac:chgData name="Sean O Fithcheallaigh" userId="47659c31-a575-4792-8be3-61268c4ee0d6" providerId="ADAL" clId="{B7574C7C-3686-460F-9B9F-2A9122AA95F8}" dt="2024-02-25T20:59:11.685" v="2725" actId="478"/>
+          <ac:spMkLst>
+            <pc:docMk/>
+            <pc:sldMk cId="3408599131" sldId="268"/>
+            <ac:spMk id="7" creationId="{6593DADC-E7CF-42DE-0ADB-18193877E327}"/>
+          </ac:spMkLst>
+        </pc:spChg>
         <pc:spChg chg="del">
           <ac:chgData name="Sean O Fithcheallaigh" userId="47659c31-a575-4792-8be3-61268c4ee0d6" providerId="ADAL" clId="{B7574C7C-3686-460F-9B9F-2A9122AA95F8}" dt="2024-02-18T22:47:58.766" v="2357" actId="478"/>
           <ac:spMkLst>
@@ -2266,7 +2418,23 @@
           </ac:spMkLst>
         </pc:spChg>
         <pc:spChg chg="add mod">
-          <ac:chgData name="Sean O Fithcheallaigh" userId="47659c31-a575-4792-8be3-61268c4ee0d6" providerId="ADAL" clId="{B7574C7C-3686-460F-9B9F-2A9122AA95F8}" dt="2024-02-18T22:48:22.535" v="2364" actId="14100"/>
+          <ac:chgData name="Sean O Fithcheallaigh" userId="47659c31-a575-4792-8be3-61268c4ee0d6" providerId="ADAL" clId="{B7574C7C-3686-460F-9B9F-2A9122AA95F8}" dt="2024-02-25T20:59:22.551" v="2730" actId="27636"/>
+          <ac:spMkLst>
+            <pc:docMk/>
+            <pc:sldMk cId="3408599131" sldId="268"/>
+            <ac:spMk id="8" creationId="{F81BE618-FCDB-5266-C293-407EFD814C8B}"/>
+          </ac:spMkLst>
+        </pc:spChg>
+        <pc:spChg chg="mod">
+          <ac:chgData name="Sean O Fithcheallaigh" userId="47659c31-a575-4792-8be3-61268c4ee0d6" providerId="ADAL" clId="{B7574C7C-3686-460F-9B9F-2A9122AA95F8}" dt="2024-02-25T20:58:18.681" v="2693" actId="14100"/>
+          <ac:spMkLst>
+            <pc:docMk/>
+            <pc:sldMk cId="3408599131" sldId="268"/>
+            <ac:spMk id="15" creationId="{4FC66C9B-35CF-0185-FDAA-B671BF099103}"/>
+          </ac:spMkLst>
+        </pc:spChg>
+        <pc:spChg chg="add mod">
+          <ac:chgData name="Sean O Fithcheallaigh" userId="47659c31-a575-4792-8be3-61268c4ee0d6" providerId="ADAL" clId="{B7574C7C-3686-460F-9B9F-2A9122AA95F8}" dt="2024-02-25T20:58:11.230" v="2691" actId="1076"/>
           <ac:spMkLst>
             <pc:docMk/>
             <pc:sldMk cId="3408599131" sldId="268"/>
@@ -2290,7 +2458,7 @@
           </ac:picMkLst>
         </pc:picChg>
         <pc:picChg chg="add mod">
-          <ac:chgData name="Sean O Fithcheallaigh" userId="47659c31-a575-4792-8be3-61268c4ee0d6" providerId="ADAL" clId="{B7574C7C-3686-460F-9B9F-2A9122AA95F8}" dt="2024-02-19T18:35:27.491" v="2542" actId="1076"/>
+          <ac:chgData name="Sean O Fithcheallaigh" userId="47659c31-a575-4792-8be3-61268c4ee0d6" providerId="ADAL" clId="{B7574C7C-3686-460F-9B9F-2A9122AA95F8}" dt="2024-02-25T20:59:28.994" v="2731" actId="14100"/>
           <ac:picMkLst>
             <pc:docMk/>
             <pc:sldMk cId="3408599131" sldId="268"/>
@@ -2368,18 +2536,194 @@
           </ac:spMkLst>
         </pc:spChg>
       </pc:sldChg>
-      <pc:sldMasterChg chg="modSldLayout">
-        <pc:chgData name="Sean O Fithcheallaigh" userId="47659c31-a575-4792-8be3-61268c4ee0d6" providerId="ADAL" clId="{B7574C7C-3686-460F-9B9F-2A9122AA95F8}" dt="2024-02-13T19:56:02.820" v="272"/>
+      <pc:sldMasterChg chg="modSp mod setBg modSldLayout">
+        <pc:chgData name="Sean O Fithcheallaigh" userId="47659c31-a575-4792-8be3-61268c4ee0d6" providerId="ADAL" clId="{B7574C7C-3686-460F-9B9F-2A9122AA95F8}" dt="2024-02-25T21:07:13.962" v="2790"/>
         <pc:sldMasterMkLst>
           <pc:docMk/>
           <pc:sldMasterMk cId="2989193502" sldId="2147483884"/>
         </pc:sldMasterMkLst>
+        <pc:spChg chg="mod">
+          <ac:chgData name="Sean O Fithcheallaigh" userId="47659c31-a575-4792-8be3-61268c4ee0d6" providerId="ADAL" clId="{B7574C7C-3686-460F-9B9F-2A9122AA95F8}" dt="2024-02-25T20:53:35.268" v="2590" actId="14100"/>
+          <ac:spMkLst>
+            <pc:docMk/>
+            <pc:sldMasterMk cId="2989193502" sldId="2147483884"/>
+            <ac:spMk id="2" creationId="{00000000-0000-0000-0000-000000000000}"/>
+          </ac:spMkLst>
+        </pc:spChg>
+        <pc:spChg chg="mod">
+          <ac:chgData name="Sean O Fithcheallaigh" userId="47659c31-a575-4792-8be3-61268c4ee0d6" providerId="ADAL" clId="{B7574C7C-3686-460F-9B9F-2A9122AA95F8}" dt="2024-02-25T20:53:29.924" v="2589" actId="14100"/>
+          <ac:spMkLst>
+            <pc:docMk/>
+            <pc:sldMasterMk cId="2989193502" sldId="2147483884"/>
+            <ac:spMk id="3" creationId="{00000000-0000-0000-0000-000000000000}"/>
+          </ac:spMkLst>
+        </pc:spChg>
+        <pc:cxnChg chg="mod">
+          <ac:chgData name="Sean O Fithcheallaigh" userId="47659c31-a575-4792-8be3-61268c4ee0d6" providerId="ADAL" clId="{B7574C7C-3686-460F-9B9F-2A9122AA95F8}" dt="2024-02-25T20:53:24.878" v="2588" actId="1076"/>
+          <ac:cxnSpMkLst>
+            <pc:docMk/>
+            <pc:sldMasterMk cId="2989193502" sldId="2147483884"/>
+            <ac:cxnSpMk id="10" creationId="{00000000-0000-0000-0000-000000000000}"/>
+          </ac:cxnSpMkLst>
+        </pc:cxnChg>
         <pc:sldLayoutChg chg="setBg">
-          <pc:chgData name="Sean O Fithcheallaigh" userId="47659c31-a575-4792-8be3-61268c4ee0d6" providerId="ADAL" clId="{B7574C7C-3686-460F-9B9F-2A9122AA95F8}" dt="2024-02-13T19:56:02.820" v="272"/>
+          <pc:chgData name="Sean O Fithcheallaigh" userId="47659c31-a575-4792-8be3-61268c4ee0d6" providerId="ADAL" clId="{B7574C7C-3686-460F-9B9F-2A9122AA95F8}" dt="2024-02-25T21:07:13.962" v="2790"/>
+          <pc:sldLayoutMkLst>
+            <pc:docMk/>
+            <pc:sldMasterMk cId="2989193502" sldId="2147483884"/>
+            <pc:sldLayoutMk cId="1032340772" sldId="2147483885"/>
+          </pc:sldLayoutMkLst>
+        </pc:sldLayoutChg>
+        <pc:sldLayoutChg chg="addSp delSp modSp mod setBg">
+          <pc:chgData name="Sean O Fithcheallaigh" userId="47659c31-a575-4792-8be3-61268c4ee0d6" providerId="ADAL" clId="{B7574C7C-3686-460F-9B9F-2A9122AA95F8}" dt="2024-02-25T21:07:13.962" v="2790"/>
           <pc:sldLayoutMkLst>
             <pc:docMk/>
             <pc:sldMasterMk cId="2989193502" sldId="2147483884"/>
             <pc:sldLayoutMk cId="2634379243" sldId="2147483886"/>
+          </pc:sldLayoutMkLst>
+          <pc:spChg chg="mod">
+            <ac:chgData name="Sean O Fithcheallaigh" userId="47659c31-a575-4792-8be3-61268c4ee0d6" providerId="ADAL" clId="{B7574C7C-3686-460F-9B9F-2A9122AA95F8}" dt="2024-02-25T21:02:07.995" v="2772" actId="14100"/>
+            <ac:spMkLst>
+              <pc:docMk/>
+              <pc:sldMasterMk cId="2989193502" sldId="2147483884"/>
+              <pc:sldLayoutMk cId="2634379243" sldId="2147483886"/>
+              <ac:spMk id="2" creationId="{00000000-0000-0000-0000-000000000000}"/>
+            </ac:spMkLst>
+          </pc:spChg>
+          <pc:spChg chg="mod">
+            <ac:chgData name="Sean O Fithcheallaigh" userId="47659c31-a575-4792-8be3-61268c4ee0d6" providerId="ADAL" clId="{B7574C7C-3686-460F-9B9F-2A9122AA95F8}" dt="2024-02-25T21:02:12.752" v="2773" actId="14100"/>
+            <ac:spMkLst>
+              <pc:docMk/>
+              <pc:sldMasterMk cId="2989193502" sldId="2147483884"/>
+              <pc:sldLayoutMk cId="2634379243" sldId="2147483886"/>
+              <ac:spMk id="3" creationId="{00000000-0000-0000-0000-000000000000}"/>
+            </ac:spMkLst>
+          </pc:spChg>
+          <pc:spChg chg="del">
+            <ac:chgData name="Sean O Fithcheallaigh" userId="47659c31-a575-4792-8be3-61268c4ee0d6" providerId="ADAL" clId="{B7574C7C-3686-460F-9B9F-2A9122AA95F8}" dt="2024-02-25T20:48:42.690" v="2585"/>
+            <ac:spMkLst>
+              <pc:docMk/>
+              <pc:sldMasterMk cId="2989193502" sldId="2147483884"/>
+              <pc:sldLayoutMk cId="2634379243" sldId="2147483886"/>
+              <ac:spMk id="4" creationId="{00000000-0000-0000-0000-000000000000}"/>
+            </ac:spMkLst>
+          </pc:spChg>
+          <pc:spChg chg="del">
+            <ac:chgData name="Sean O Fithcheallaigh" userId="47659c31-a575-4792-8be3-61268c4ee0d6" providerId="ADAL" clId="{B7574C7C-3686-460F-9B9F-2A9122AA95F8}" dt="2024-02-25T20:48:42.690" v="2585"/>
+            <ac:spMkLst>
+              <pc:docMk/>
+              <pc:sldMasterMk cId="2989193502" sldId="2147483884"/>
+              <pc:sldLayoutMk cId="2634379243" sldId="2147483886"/>
+              <ac:spMk id="5" creationId="{00000000-0000-0000-0000-000000000000}"/>
+            </ac:spMkLst>
+          </pc:spChg>
+          <pc:spChg chg="del">
+            <ac:chgData name="Sean O Fithcheallaigh" userId="47659c31-a575-4792-8be3-61268c4ee0d6" providerId="ADAL" clId="{B7574C7C-3686-460F-9B9F-2A9122AA95F8}" dt="2024-02-25T20:48:42.690" v="2585"/>
+            <ac:spMkLst>
+              <pc:docMk/>
+              <pc:sldMasterMk cId="2989193502" sldId="2147483884"/>
+              <pc:sldLayoutMk cId="2634379243" sldId="2147483886"/>
+              <ac:spMk id="6" creationId="{00000000-0000-0000-0000-000000000000}"/>
+            </ac:spMkLst>
+          </pc:spChg>
+          <pc:spChg chg="add mod">
+            <ac:chgData name="Sean O Fithcheallaigh" userId="47659c31-a575-4792-8be3-61268c4ee0d6" providerId="ADAL" clId="{B7574C7C-3686-460F-9B9F-2A9122AA95F8}" dt="2024-02-25T20:48:43.348" v="2586"/>
+            <ac:spMkLst>
+              <pc:docMk/>
+              <pc:sldMasterMk cId="2989193502" sldId="2147483884"/>
+              <pc:sldLayoutMk cId="2634379243" sldId="2147483886"/>
+              <ac:spMk id="7" creationId="{4B72DB9C-5DEA-6DD4-784F-41BD58908A73}"/>
+            </ac:spMkLst>
+          </pc:spChg>
+          <pc:spChg chg="add mod">
+            <ac:chgData name="Sean O Fithcheallaigh" userId="47659c31-a575-4792-8be3-61268c4ee0d6" providerId="ADAL" clId="{B7574C7C-3686-460F-9B9F-2A9122AA95F8}" dt="2024-02-25T20:48:43.348" v="2586"/>
+            <ac:spMkLst>
+              <pc:docMk/>
+              <pc:sldMasterMk cId="2989193502" sldId="2147483884"/>
+              <pc:sldLayoutMk cId="2634379243" sldId="2147483886"/>
+              <ac:spMk id="8" creationId="{A289F02A-CEE2-6F05-59EC-E6ABF87D1DC6}"/>
+            </ac:spMkLst>
+          </pc:spChg>
+          <pc:spChg chg="add mod">
+            <ac:chgData name="Sean O Fithcheallaigh" userId="47659c31-a575-4792-8be3-61268c4ee0d6" providerId="ADAL" clId="{B7574C7C-3686-460F-9B9F-2A9122AA95F8}" dt="2024-02-25T20:48:43.348" v="2586"/>
+            <ac:spMkLst>
+              <pc:docMk/>
+              <pc:sldMasterMk cId="2989193502" sldId="2147483884"/>
+              <pc:sldLayoutMk cId="2634379243" sldId="2147483886"/>
+              <ac:spMk id="9" creationId="{AF8782C5-747C-DD09-7234-882A1D5FD405}"/>
+            </ac:spMkLst>
+          </pc:spChg>
+        </pc:sldLayoutChg>
+        <pc:sldLayoutChg chg="setBg">
+          <pc:chgData name="Sean O Fithcheallaigh" userId="47659c31-a575-4792-8be3-61268c4ee0d6" providerId="ADAL" clId="{B7574C7C-3686-460F-9B9F-2A9122AA95F8}" dt="2024-02-25T21:07:13.962" v="2790"/>
+          <pc:sldLayoutMkLst>
+            <pc:docMk/>
+            <pc:sldMasterMk cId="2989193502" sldId="2147483884"/>
+            <pc:sldLayoutMk cId="2601701279" sldId="2147483887"/>
+          </pc:sldLayoutMkLst>
+        </pc:sldLayoutChg>
+        <pc:sldLayoutChg chg="setBg">
+          <pc:chgData name="Sean O Fithcheallaigh" userId="47659c31-a575-4792-8be3-61268c4ee0d6" providerId="ADAL" clId="{B7574C7C-3686-460F-9B9F-2A9122AA95F8}" dt="2024-02-25T21:07:13.962" v="2790"/>
+          <pc:sldLayoutMkLst>
+            <pc:docMk/>
+            <pc:sldMasterMk cId="2989193502" sldId="2147483884"/>
+            <pc:sldLayoutMk cId="2006694186" sldId="2147483888"/>
+          </pc:sldLayoutMkLst>
+        </pc:sldLayoutChg>
+        <pc:sldLayoutChg chg="setBg">
+          <pc:chgData name="Sean O Fithcheallaigh" userId="47659c31-a575-4792-8be3-61268c4ee0d6" providerId="ADAL" clId="{B7574C7C-3686-460F-9B9F-2A9122AA95F8}" dt="2024-02-25T21:07:13.962" v="2790"/>
+          <pc:sldLayoutMkLst>
+            <pc:docMk/>
+            <pc:sldMasterMk cId="2989193502" sldId="2147483884"/>
+            <pc:sldLayoutMk cId="2349671932" sldId="2147483889"/>
+          </pc:sldLayoutMkLst>
+        </pc:sldLayoutChg>
+        <pc:sldLayoutChg chg="setBg">
+          <pc:chgData name="Sean O Fithcheallaigh" userId="47659c31-a575-4792-8be3-61268c4ee0d6" providerId="ADAL" clId="{B7574C7C-3686-460F-9B9F-2A9122AA95F8}" dt="2024-02-25T21:07:13.962" v="2790"/>
+          <pc:sldLayoutMkLst>
+            <pc:docMk/>
+            <pc:sldMasterMk cId="2989193502" sldId="2147483884"/>
+            <pc:sldLayoutMk cId="2885172000" sldId="2147483890"/>
+          </pc:sldLayoutMkLst>
+        </pc:sldLayoutChg>
+        <pc:sldLayoutChg chg="setBg">
+          <pc:chgData name="Sean O Fithcheallaigh" userId="47659c31-a575-4792-8be3-61268c4ee0d6" providerId="ADAL" clId="{B7574C7C-3686-460F-9B9F-2A9122AA95F8}" dt="2024-02-25T21:07:13.962" v="2790"/>
+          <pc:sldLayoutMkLst>
+            <pc:docMk/>
+            <pc:sldMasterMk cId="2989193502" sldId="2147483884"/>
+            <pc:sldLayoutMk cId="873411810" sldId="2147483891"/>
+          </pc:sldLayoutMkLst>
+        </pc:sldLayoutChg>
+        <pc:sldLayoutChg chg="setBg">
+          <pc:chgData name="Sean O Fithcheallaigh" userId="47659c31-a575-4792-8be3-61268c4ee0d6" providerId="ADAL" clId="{B7574C7C-3686-460F-9B9F-2A9122AA95F8}" dt="2024-02-25T21:07:13.962" v="2790"/>
+          <pc:sldLayoutMkLst>
+            <pc:docMk/>
+            <pc:sldMasterMk cId="2989193502" sldId="2147483884"/>
+            <pc:sldLayoutMk cId="1387623995" sldId="2147483892"/>
+          </pc:sldLayoutMkLst>
+        </pc:sldLayoutChg>
+        <pc:sldLayoutChg chg="setBg">
+          <pc:chgData name="Sean O Fithcheallaigh" userId="47659c31-a575-4792-8be3-61268c4ee0d6" providerId="ADAL" clId="{B7574C7C-3686-460F-9B9F-2A9122AA95F8}" dt="2024-02-25T21:07:13.962" v="2790"/>
+          <pc:sldLayoutMkLst>
+            <pc:docMk/>
+            <pc:sldMasterMk cId="2989193502" sldId="2147483884"/>
+            <pc:sldLayoutMk cId="4025620083" sldId="2147483893"/>
+          </pc:sldLayoutMkLst>
+        </pc:sldLayoutChg>
+        <pc:sldLayoutChg chg="setBg">
+          <pc:chgData name="Sean O Fithcheallaigh" userId="47659c31-a575-4792-8be3-61268c4ee0d6" providerId="ADAL" clId="{B7574C7C-3686-460F-9B9F-2A9122AA95F8}" dt="2024-02-25T21:07:13.962" v="2790"/>
+          <pc:sldLayoutMkLst>
+            <pc:docMk/>
+            <pc:sldMasterMk cId="2989193502" sldId="2147483884"/>
+            <pc:sldLayoutMk cId="508955739" sldId="2147483894"/>
+          </pc:sldLayoutMkLst>
+        </pc:sldLayoutChg>
+        <pc:sldLayoutChg chg="setBg">
+          <pc:chgData name="Sean O Fithcheallaigh" userId="47659c31-a575-4792-8be3-61268c4ee0d6" providerId="ADAL" clId="{B7574C7C-3686-460F-9B9F-2A9122AA95F8}" dt="2024-02-25T21:07:13.962" v="2790"/>
+          <pc:sldLayoutMkLst>
+            <pc:docMk/>
+            <pc:sldMasterMk cId="2989193502" sldId="2147483884"/>
+            <pc:sldLayoutMk cId="4079772589" sldId="2147483895"/>
           </pc:sldLayoutMkLst>
         </pc:sldLayoutChg>
       </pc:sldMasterChg>
@@ -2444,7 +2788,7 @@
 </file>
 
 <file path=ppt/slideLayouts/slideLayout1.xml><?xml version="1.0" encoding="utf-8"?>
-<p:sldLayout xmlns:a="http://schemas.openxmlformats.org/drawingml/2006/main" xmlns:r="http://schemas.openxmlformats.org/officeDocument/2006/relationships" xmlns:p="http://schemas.openxmlformats.org/presentationml/2006/main" showMasterSp="0" type="title" preserve="1">
+<p:sldLayout xmlns:a="http://schemas.openxmlformats.org/drawingml/2006/main" xmlns:r="http://schemas.openxmlformats.org/officeDocument/2006/relationships" xmlns:p="http://schemas.openxmlformats.org/presentationml/2006/main" type="title" preserve="1">
   <p:cSld name="Title Slide">
     <p:spTree>
       <p:nvGrpSpPr>
@@ -2671,7 +3015,7 @@
           <a:p>
             <a:fld id="{0CD94E99-FA29-4EFF-88BE-3447E30E8C4D}" type="datetimeFigureOut">
               <a:rPr lang="en-GB" smtClean="0"/>
-              <a:t>21/02/2024</a:t>
+              <a:t>25/02/2024</a:t>
             </a:fld>
             <a:endParaRPr lang="en-GB"/>
           </a:p>
@@ -2879,7 +3223,7 @@
           <a:p>
             <a:fld id="{0CD94E99-FA29-4EFF-88BE-3447E30E8C4D}" type="datetimeFigureOut">
               <a:rPr lang="en-GB" smtClean="0"/>
-              <a:t>21/02/2024</a:t>
+              <a:t>25/02/2024</a:t>
             </a:fld>
             <a:endParaRPr lang="en-GB"/>
           </a:p>
@@ -2941,7 +3285,7 @@
 </file>
 
 <file path=ppt/slideLayouts/slideLayout11.xml><?xml version="1.0" encoding="utf-8"?>
-<p:sldLayout xmlns:a="http://schemas.openxmlformats.org/drawingml/2006/main" xmlns:r="http://schemas.openxmlformats.org/officeDocument/2006/relationships" xmlns:p="http://schemas.openxmlformats.org/presentationml/2006/main" showMasterSp="0" type="vertTitleAndTx" preserve="1">
+<p:sldLayout xmlns:a="http://schemas.openxmlformats.org/drawingml/2006/main" xmlns:r="http://schemas.openxmlformats.org/officeDocument/2006/relationships" xmlns:p="http://schemas.openxmlformats.org/presentationml/2006/main" type="vertTitleAndTx" preserve="1">
   <p:cSld name="Vertical Title and Text">
     <p:spTree>
       <p:nvGrpSpPr>
@@ -3137,7 +3481,7 @@
           <a:p>
             <a:fld id="{0CD94E99-FA29-4EFF-88BE-3447E30E8C4D}" type="datetimeFigureOut">
               <a:rPr lang="en-GB" smtClean="0"/>
-              <a:t>21/02/2024</a:t>
+              <a:t>25/02/2024</a:t>
             </a:fld>
             <a:endParaRPr lang="en-GB"/>
           </a:p>
@@ -3201,14 +3545,6 @@
 <file path=ppt/slideLayouts/slideLayout2.xml><?xml version="1.0" encoding="utf-8"?>
 <p:sldLayout xmlns:a="http://schemas.openxmlformats.org/drawingml/2006/main" xmlns:r="http://schemas.openxmlformats.org/officeDocument/2006/relationships" xmlns:p="http://schemas.openxmlformats.org/presentationml/2006/main" type="obj" preserve="1">
   <p:cSld name="Title and Content">
-    <p:bg>
-      <p:bgPr>
-        <a:solidFill>
-          <a:schemeClr val="bg1"/>
-        </a:solidFill>
-        <a:effectLst/>
-      </p:bgPr>
-    </p:bg>
     <p:spTree>
       <p:nvGrpSpPr>
         <p:cNvPr id="1" name=""/>
@@ -3233,7 +3569,12 @@
             <p:ph type="title"/>
           </p:nvPr>
         </p:nvSpPr>
-        <p:spPr/>
+        <p:spPr>
+          <a:xfrm>
+            <a:off x="1097280" y="286603"/>
+            <a:ext cx="10058400" cy="902117"/>
+          </a:xfrm>
+        </p:spPr>
         <p:txBody>
           <a:bodyPr/>
           <a:lstStyle/>
@@ -3256,7 +3597,12 @@
             <p:ph idx="1"/>
           </p:nvPr>
         </p:nvSpPr>
-        <p:spPr/>
+        <p:spPr>
+          <a:xfrm>
+            <a:off x="1097280" y="1396538"/>
+            <a:ext cx="10058400" cy="4472555"/>
+          </a:xfrm>
+        </p:spPr>
         <p:txBody>
           <a:bodyPr/>
           <a:lstStyle/>
@@ -3300,7 +3646,13 @@
       </p:sp>
       <p:sp>
         <p:nvSpPr>
-          <p:cNvPr id="4" name="Date Placeholder 3"/>
+          <p:cNvPr id="7" name="Date Placeholder 6">
+            <a:extLst>
+              <a:ext uri="{FF2B5EF4-FFF2-40B4-BE49-F238E27FC236}">
+                <a16:creationId xmlns:a16="http://schemas.microsoft.com/office/drawing/2014/main" id="{4B72DB9C-5DEA-6DD4-784F-41BD58908A73}"/>
+              </a:ext>
+            </a:extLst>
+          </p:cNvPr>
           <p:cNvSpPr>
             <a:spLocks noGrp="1"/>
           </p:cNvSpPr>
@@ -3315,7 +3667,7 @@
           <a:p>
             <a:fld id="{0CD94E99-FA29-4EFF-88BE-3447E30E8C4D}" type="datetimeFigureOut">
               <a:rPr lang="en-GB" smtClean="0"/>
-              <a:t>21/02/2024</a:t>
+              <a:t>25/02/2024</a:t>
             </a:fld>
             <a:endParaRPr lang="en-GB"/>
           </a:p>
@@ -3323,7 +3675,13 @@
       </p:sp>
       <p:sp>
         <p:nvSpPr>
-          <p:cNvPr id="5" name="Footer Placeholder 4"/>
+          <p:cNvPr id="8" name="Footer Placeholder 7">
+            <a:extLst>
+              <a:ext uri="{FF2B5EF4-FFF2-40B4-BE49-F238E27FC236}">
+                <a16:creationId xmlns:a16="http://schemas.microsoft.com/office/drawing/2014/main" id="{A289F02A-CEE2-6F05-59EC-E6ABF87D1DC6}"/>
+              </a:ext>
+            </a:extLst>
+          </p:cNvPr>
           <p:cNvSpPr>
             <a:spLocks noGrp="1"/>
           </p:cNvSpPr>
@@ -3342,7 +3700,13 @@
       </p:sp>
       <p:sp>
         <p:nvSpPr>
-          <p:cNvPr id="6" name="Slide Number Placeholder 5"/>
+          <p:cNvPr id="9" name="Slide Number Placeholder 8">
+            <a:extLst>
+              <a:ext uri="{FF2B5EF4-FFF2-40B4-BE49-F238E27FC236}">
+                <a16:creationId xmlns:a16="http://schemas.microsoft.com/office/drawing/2014/main" id="{AF8782C5-747C-DD09-7234-882A1D5FD405}"/>
+              </a:ext>
+            </a:extLst>
+          </p:cNvPr>
           <p:cNvSpPr>
             <a:spLocks noGrp="1"/>
           </p:cNvSpPr>
@@ -3377,7 +3741,7 @@
 </file>
 
 <file path=ppt/slideLayouts/slideLayout3.xml><?xml version="1.0" encoding="utf-8"?>
-<p:sldLayout xmlns:a="http://schemas.openxmlformats.org/drawingml/2006/main" xmlns:r="http://schemas.openxmlformats.org/officeDocument/2006/relationships" xmlns:p="http://schemas.openxmlformats.org/presentationml/2006/main" showMasterSp="0" type="secHead" preserve="1">
+<p:sldLayout xmlns:a="http://schemas.openxmlformats.org/drawingml/2006/main" xmlns:r="http://schemas.openxmlformats.org/officeDocument/2006/relationships" xmlns:p="http://schemas.openxmlformats.org/presentationml/2006/main" type="secHead" preserve="1">
   <p:cSld name="Section Header">
     <p:spTree>
       <p:nvGrpSpPr>
@@ -3652,7 +4016,7 @@
           <a:p>
             <a:fld id="{0CD94E99-FA29-4EFF-88BE-3447E30E8C4D}" type="datetimeFigureOut">
               <a:rPr lang="en-GB" smtClean="0"/>
-              <a:t>21/02/2024</a:t>
+              <a:t>25/02/2024</a:t>
             </a:fld>
             <a:endParaRPr lang="en-GB"/>
           </a:p>
@@ -3754,11 +4118,6 @@
 <file path=ppt/slideLayouts/slideLayout4.xml><?xml version="1.0" encoding="utf-8"?>
 <p:sldLayout xmlns:a="http://schemas.openxmlformats.org/drawingml/2006/main" xmlns:r="http://schemas.openxmlformats.org/officeDocument/2006/relationships" xmlns:p="http://schemas.openxmlformats.org/presentationml/2006/main" type="twoObj" preserve="1">
   <p:cSld name="Two Content">
-    <p:bg>
-      <p:bgRef idx="1002">
-        <a:schemeClr val="bg1"/>
-      </p:bgRef>
-    </p:bg>
     <p:spTree>
       <p:nvGrpSpPr>
         <p:cNvPr id="1" name=""/>
@@ -3932,7 +4291,7 @@
           <a:p>
             <a:fld id="{0CD94E99-FA29-4EFF-88BE-3447E30E8C4D}" type="datetimeFigureOut">
               <a:rPr lang="en-GB" smtClean="0"/>
-              <a:t>21/02/2024</a:t>
+              <a:t>25/02/2024</a:t>
             </a:fld>
             <a:endParaRPr lang="en-GB"/>
           </a:p>
@@ -3988,7 +4347,7 @@
     </p:extLst>
   </p:cSld>
   <p:clrMapOvr>
-    <a:overrideClrMapping bg1="lt1" tx1="dk1" bg2="lt2" tx2="dk2" accent1="accent1" accent2="accent2" accent3="accent3" accent4="accent4" accent5="accent5" accent6="accent6" hlink="hlink" folHlink="folHlink"/>
+    <a:masterClrMapping/>
   </p:clrMapOvr>
 </p:sldLayout>
 </file>
@@ -4311,7 +4670,7 @@
           <a:p>
             <a:fld id="{0CD94E99-FA29-4EFF-88BE-3447E30E8C4D}" type="datetimeFigureOut">
               <a:rPr lang="en-GB" smtClean="0"/>
-              <a:t>21/02/2024</a:t>
+              <a:t>25/02/2024</a:t>
             </a:fld>
             <a:endParaRPr lang="en-GB"/>
           </a:p>
@@ -4429,7 +4788,7 @@
           <a:p>
             <a:fld id="{0CD94E99-FA29-4EFF-88BE-3447E30E8C4D}" type="datetimeFigureOut">
               <a:rPr lang="en-GB" smtClean="0"/>
-              <a:t>21/02/2024</a:t>
+              <a:t>25/02/2024</a:t>
             </a:fld>
             <a:endParaRPr lang="en-GB"/>
           </a:p>
@@ -4491,7 +4850,7 @@
 </file>
 
 <file path=ppt/slideLayouts/slideLayout7.xml><?xml version="1.0" encoding="utf-8"?>
-<p:sldLayout xmlns:a="http://schemas.openxmlformats.org/drawingml/2006/main" xmlns:r="http://schemas.openxmlformats.org/officeDocument/2006/relationships" xmlns:p="http://schemas.openxmlformats.org/presentationml/2006/main" showMasterSp="0" type="blank" preserve="1">
+<p:sldLayout xmlns:a="http://schemas.openxmlformats.org/drawingml/2006/main" xmlns:r="http://schemas.openxmlformats.org/officeDocument/2006/relationships" xmlns:p="http://schemas.openxmlformats.org/presentationml/2006/main" type="blank" preserve="1">
   <p:cSld name="Blank">
     <p:spTree>
       <p:nvGrpSpPr>
@@ -4602,7 +4961,7 @@
           <a:p>
             <a:fld id="{0CD94E99-FA29-4EFF-88BE-3447E30E8C4D}" type="datetimeFigureOut">
               <a:rPr lang="en-GB" smtClean="0"/>
-              <a:t>21/02/2024</a:t>
+              <a:t>25/02/2024</a:t>
             </a:fld>
             <a:endParaRPr lang="en-GB"/>
           </a:p>
@@ -4672,7 +5031,7 @@
 </file>
 
 <file path=ppt/slideLayouts/slideLayout8.xml><?xml version="1.0" encoding="utf-8"?>
-<p:sldLayout xmlns:a="http://schemas.openxmlformats.org/drawingml/2006/main" xmlns:r="http://schemas.openxmlformats.org/officeDocument/2006/relationships" xmlns:p="http://schemas.openxmlformats.org/presentationml/2006/main" showMasterSp="0" type="objTx" preserve="1">
+<p:sldLayout xmlns:a="http://schemas.openxmlformats.org/drawingml/2006/main" xmlns:r="http://schemas.openxmlformats.org/officeDocument/2006/relationships" xmlns:p="http://schemas.openxmlformats.org/presentationml/2006/main" type="objTx" preserve="1">
   <p:cSld name="Content with Caption">
     <p:spTree>
       <p:nvGrpSpPr>
@@ -4958,7 +5317,7 @@
           <a:p>
             <a:fld id="{0CD94E99-FA29-4EFF-88BE-3447E30E8C4D}" type="datetimeFigureOut">
               <a:rPr lang="en-GB" smtClean="0"/>
-              <a:t>21/02/2024</a:t>
+              <a:t>25/02/2024</a:t>
             </a:fld>
             <a:endParaRPr lang="en-GB"/>
           </a:p>
@@ -5041,7 +5400,7 @@
 </file>
 
 <file path=ppt/slideLayouts/slideLayout9.xml><?xml version="1.0" encoding="utf-8"?>
-<p:sldLayout xmlns:a="http://schemas.openxmlformats.org/drawingml/2006/main" xmlns:r="http://schemas.openxmlformats.org/officeDocument/2006/relationships" xmlns:p="http://schemas.openxmlformats.org/presentationml/2006/main" showMasterSp="0" type="picTx" preserve="1">
+<p:sldLayout xmlns:a="http://schemas.openxmlformats.org/drawingml/2006/main" xmlns:r="http://schemas.openxmlformats.org/officeDocument/2006/relationships" xmlns:p="http://schemas.openxmlformats.org/presentationml/2006/main" type="picTx" preserve="1">
   <p:cSld name="Picture with Caption">
     <p:spTree>
       <p:nvGrpSpPr>
@@ -5337,7 +5696,7 @@
           <a:p>
             <a:fld id="{0CD94E99-FA29-4EFF-88BE-3447E30E8C4D}" type="datetimeFigureOut">
               <a:rPr lang="en-GB" smtClean="0"/>
-              <a:t>21/02/2024</a:t>
+              <a:t>25/02/2024</a:t>
             </a:fld>
             <a:endParaRPr lang="en-GB"/>
           </a:p>
@@ -5402,9 +5761,12 @@
 <p:sldMaster xmlns:a="http://schemas.openxmlformats.org/drawingml/2006/main" xmlns:r="http://schemas.openxmlformats.org/officeDocument/2006/relationships" xmlns:p="http://schemas.openxmlformats.org/presentationml/2006/main">
   <p:cSld>
     <p:bg>
-      <p:bgRef idx="1001">
-        <a:schemeClr val="bg2"/>
-      </p:bgRef>
+      <p:bgPr>
+        <a:solidFill>
+          <a:schemeClr val="bg1"/>
+        </a:solidFill>
+        <a:effectLst/>
+      </p:bgPr>
     </p:bg>
     <p:spTree>
       <p:nvGrpSpPr>
@@ -5510,8 +5872,8 @@
         </p:nvSpPr>
         <p:spPr>
           <a:xfrm>
-            <a:off x="1097280" y="286603"/>
-            <a:ext cx="10058400" cy="1450757"/>
+            <a:off x="1097280" y="286604"/>
+            <a:ext cx="10058400" cy="943855"/>
           </a:xfrm>
           <a:prstGeom prst="rect">
             <a:avLst/>
@@ -5543,8 +5905,8 @@
         </p:nvSpPr>
         <p:spPr>
           <a:xfrm>
-            <a:off x="1097280" y="1845734"/>
-            <a:ext cx="10058400" cy="4023360"/>
+            <a:off x="1097280" y="1355929"/>
+            <a:ext cx="10058400" cy="4513165"/>
           </a:xfrm>
           <a:prstGeom prst="rect">
             <a:avLst/>
@@ -5626,7 +5988,7 @@
           <a:p>
             <a:fld id="{0CD94E99-FA29-4EFF-88BE-3447E30E8C4D}" type="datetimeFigureOut">
               <a:rPr lang="en-GB" smtClean="0"/>
-              <a:t>21/02/2024</a:t>
+              <a:t>25/02/2024</a:t>
             </a:fld>
             <a:endParaRPr lang="en-GB"/>
           </a:p>
@@ -5714,7 +6076,7 @@
         </p:nvCxnSpPr>
         <p:spPr>
           <a:xfrm>
-            <a:off x="1193532" y="1737845"/>
+            <a:off x="1188720" y="1289444"/>
             <a:ext cx="9966960" cy="0"/>
           </a:xfrm>
           <a:prstGeom prst="line">
@@ -6136,14 +6498,6 @@
 <file path=ppt/slides/slide1.xml><?xml version="1.0" encoding="utf-8"?>
 <p:sld xmlns:a="http://schemas.openxmlformats.org/drawingml/2006/main" xmlns:r="http://schemas.openxmlformats.org/officeDocument/2006/relationships" xmlns:p="http://schemas.openxmlformats.org/presentationml/2006/main">
   <p:cSld>
-    <p:bg>
-      <p:bgPr>
-        <a:solidFill>
-          <a:schemeClr val="bg1"/>
-        </a:solidFill>
-        <a:effectLst/>
-      </p:bgPr>
-    </p:bg>
     <p:spTree>
       <p:nvGrpSpPr>
         <p:cNvPr id="1" name=""/>
@@ -6158,6 +6512,66 @@
           <a:chExt cx="0" cy="0"/>
         </a:xfrm>
       </p:grpSpPr>
+      <p:sp useBgFill="1">
+        <p:nvSpPr>
+          <p:cNvPr id="13" name="Rectangle 12">
+            <a:extLst>
+              <a:ext uri="{FF2B5EF4-FFF2-40B4-BE49-F238E27FC236}">
+                <a16:creationId xmlns:a16="http://schemas.microsoft.com/office/drawing/2014/main" id="{4030725F-96B1-4047-B74B-7CC19DB1CB42}"/>
+              </a:ext>
+              <a:ext uri="{C183D7F6-B498-43B3-948B-1728B52AA6E4}">
+                <adec:decorative xmlns:adec="http://schemas.microsoft.com/office/drawing/2017/decorative" val="1"/>
+              </a:ext>
+            </a:extLst>
+          </p:cNvPr>
+          <p:cNvSpPr>
+            <a:spLocks noGrp="1" noRot="1" noChangeAspect="1" noMove="1" noResize="1" noEditPoints="1" noAdjustHandles="1" noChangeArrowheads="1" noChangeShapeType="1" noTextEdit="1"/>
+          </p:cNvSpPr>
+          <p:nvPr>
+            <p:extLst>
+              <p:ext uri="{386F3935-93C4-4BCD-93E2-E3B085C9AB24}">
+                <p16:designElem xmlns:p16="http://schemas.microsoft.com/office/powerpoint/2015/main" val="1"/>
+              </p:ext>
+            </p:extLst>
+          </p:nvPr>
+        </p:nvSpPr>
+        <p:spPr>
+          <a:xfrm>
+            <a:off x="0" y="0"/>
+            <a:ext cx="12192001" cy="6334316"/>
+          </a:xfrm>
+          <a:prstGeom prst="rect">
+            <a:avLst/>
+          </a:prstGeom>
+          <a:ln>
+            <a:noFill/>
+          </a:ln>
+        </p:spPr>
+        <p:style>
+          <a:lnRef idx="2">
+            <a:schemeClr val="accent1">
+              <a:shade val="50000"/>
+            </a:schemeClr>
+          </a:lnRef>
+          <a:fillRef idx="1">
+            <a:schemeClr val="accent1"/>
+          </a:fillRef>
+          <a:effectRef idx="0">
+            <a:schemeClr val="accent1"/>
+          </a:effectRef>
+          <a:fontRef idx="minor">
+            <a:schemeClr val="lt1"/>
+          </a:fontRef>
+        </p:style>
+        <p:txBody>
+          <a:bodyPr rtlCol="0" anchor="ctr"/>
+          <a:lstStyle/>
+          <a:p>
+            <a:pPr algn="ctr"/>
+            <a:endParaRPr lang="en-US"/>
+          </a:p>
+        </p:txBody>
+      </p:sp>
       <p:sp>
         <p:nvSpPr>
           <p:cNvPr id="2" name="Title 1">
@@ -6176,30 +6590,21 @@
         </p:nvSpPr>
         <p:spPr>
           <a:xfrm>
-            <a:off x="804672" y="3121701"/>
-            <a:ext cx="3658053" cy="1786515"/>
+            <a:off x="5289754" y="639097"/>
+            <a:ext cx="6253317" cy="3686015"/>
           </a:xfrm>
         </p:spPr>
         <p:txBody>
-          <a:bodyPr anchor="t">
+          <a:bodyPr>
             <a:normAutofit/>
           </a:bodyPr>
           <a:lstStyle/>
           <a:p>
-            <a:pPr algn="l"/>
             <a:r>
-              <a:rPr lang="en-US" sz="4000" dirty="0">
-                <a:solidFill>
-                  <a:schemeClr val="tx2"/>
-                </a:solidFill>
-              </a:rPr>
+              <a:rPr lang="en-US"/>
               <a:t>PhD Supervisors Meeting</a:t>
             </a:r>
-            <a:endParaRPr lang="en-GB" sz="4000" dirty="0">
-              <a:solidFill>
-                <a:schemeClr val="tx2"/>
-              </a:solidFill>
-            </a:endParaRPr>
+            <a:endParaRPr lang="en-GB"/>
           </a:p>
         </p:txBody>
       </p:sp>
@@ -6221,32 +6626,33 @@
         </p:nvSpPr>
         <p:spPr>
           <a:xfrm>
-            <a:off x="804672" y="2032347"/>
-            <a:ext cx="3658053" cy="955111"/>
+            <a:off x="5289753" y="4455621"/>
+            <a:ext cx="6269347" cy="1238616"/>
           </a:xfrm>
         </p:spPr>
         <p:txBody>
-          <a:bodyPr anchor="b">
+          <a:bodyPr>
             <a:normAutofit/>
           </a:bodyPr>
           <a:lstStyle/>
           <a:p>
-            <a:pPr algn="l"/>
             <a:r>
-              <a:rPr lang="en-US" sz="2000" dirty="0"/>
-              <a:t>xx</a:t>
-            </a:r>
-            <a:r>
-              <a:rPr lang="en-US" sz="2000" dirty="0">
+              <a:rPr lang="en-US" dirty="0">
                 <a:solidFill>
-                  <a:schemeClr val="tx2"/>
+                  <a:schemeClr val="tx1">
+                    <a:lumMod val="85000"/>
+                    <a:lumOff val="15000"/>
+                  </a:schemeClr>
                 </a:solidFill>
               </a:rPr>
-              <a:t>/xx/24</a:t>
+              <a:t>01/03/24</a:t>
             </a:r>
-            <a:endParaRPr lang="en-GB" sz="2000" dirty="0">
+            <a:endParaRPr lang="en-GB" dirty="0">
               <a:solidFill>
-                <a:schemeClr val="tx2"/>
+                <a:schemeClr val="tx1">
+                  <a:lumMod val="85000"/>
+                  <a:lumOff val="15000"/>
+                </a:schemeClr>
               </a:solidFill>
             </a:endParaRPr>
           </a:p>
@@ -6283,17 +6689,194 @@
         </p:blipFill>
         <p:spPr>
           <a:xfrm>
-            <a:off x="6379341" y="910518"/>
-            <a:ext cx="5029200" cy="5029200"/>
+            <a:off x="633999" y="1163529"/>
+            <a:ext cx="4001315" cy="4001315"/>
           </a:xfrm>
           <a:prstGeom prst="rect">
             <a:avLst/>
           </a:prstGeom>
-          <a:ln w="9525">
+        </p:spPr>
+      </p:pic>
+      <p:cxnSp>
+        <p:nvCxnSpPr>
+          <p:cNvPr id="15" name="Straight Connector 14">
+            <a:extLst>
+              <a:ext uri="{FF2B5EF4-FFF2-40B4-BE49-F238E27FC236}">
+                <a16:creationId xmlns:a16="http://schemas.microsoft.com/office/drawing/2014/main" id="{C14B5A7D-B352-42F9-83F6-4AF14C1BAE65}"/>
+              </a:ext>
+              <a:ext uri="{C183D7F6-B498-43B3-948B-1728B52AA6E4}">
+                <adec:decorative xmlns:adec="http://schemas.microsoft.com/office/drawing/2017/decorative" val="1"/>
+              </a:ext>
+            </a:extLst>
+          </p:cNvPr>
+          <p:cNvCxnSpPr>
+            <a:cxnSpLocks noGrp="1" noRot="1" noChangeAspect="1" noMove="1" noResize="1" noEditPoints="1" noAdjustHandles="1" noChangeArrowheads="1" noChangeShapeType="1"/>
+          </p:cNvCxnSpPr>
+          <p:nvPr>
+            <p:extLst>
+              <p:ext uri="{386F3935-93C4-4BCD-93E2-E3B085C9AB24}">
+                <p16:designElem xmlns:p16="http://schemas.microsoft.com/office/powerpoint/2015/main" val="1"/>
+              </p:ext>
+            </p:extLst>
+          </p:nvPr>
+        </p:nvCxnSpPr>
+        <p:spPr>
+          <a:xfrm>
+            <a:off x="5447071" y="4343400"/>
+            <a:ext cx="5636107" cy="0"/>
+          </a:xfrm>
+          <a:prstGeom prst="line">
+            <a:avLst/>
+          </a:prstGeom>
+          <a:ln w="6350">
+            <a:solidFill>
+              <a:schemeClr val="tx2">
+                <a:alpha val="90000"/>
+              </a:schemeClr>
+            </a:solidFill>
+          </a:ln>
+        </p:spPr>
+        <p:style>
+          <a:lnRef idx="1">
+            <a:schemeClr val="accent1"/>
+          </a:lnRef>
+          <a:fillRef idx="0">
+            <a:schemeClr val="accent1"/>
+          </a:fillRef>
+          <a:effectRef idx="0">
+            <a:schemeClr val="accent1"/>
+          </a:effectRef>
+          <a:fontRef idx="minor">
+            <a:schemeClr val="tx1"/>
+          </a:fontRef>
+        </p:style>
+      </p:cxnSp>
+      <p:sp>
+        <p:nvSpPr>
+          <p:cNvPr id="17" name="Rectangle 16">
+            <a:extLst>
+              <a:ext uri="{FF2B5EF4-FFF2-40B4-BE49-F238E27FC236}">
+                <a16:creationId xmlns:a16="http://schemas.microsoft.com/office/drawing/2014/main" id="{D03ABE8C-6A7E-4C35-B74C-CE45DA0B504B}"/>
+              </a:ext>
+              <a:ext uri="{C183D7F6-B498-43B3-948B-1728B52AA6E4}">
+                <adec:decorative xmlns:adec="http://schemas.microsoft.com/office/drawing/2017/decorative" val="1"/>
+              </a:ext>
+            </a:extLst>
+          </p:cNvPr>
+          <p:cNvSpPr>
+            <a:spLocks noGrp="1" noRot="1" noChangeAspect="1" noMove="1" noResize="1" noEditPoints="1" noAdjustHandles="1" noChangeArrowheads="1" noChangeShapeType="1" noTextEdit="1"/>
+          </p:cNvSpPr>
+          <p:nvPr>
+            <p:extLst>
+              <p:ext uri="{386F3935-93C4-4BCD-93E2-E3B085C9AB24}">
+                <p16:designElem xmlns:p16="http://schemas.microsoft.com/office/powerpoint/2015/main" val="1"/>
+              </p:ext>
+            </p:extLst>
+          </p:nvPr>
+        </p:nvSpPr>
+        <p:spPr>
+          <a:xfrm>
+            <a:off x="15" y="6334316"/>
+            <a:ext cx="12191985" cy="66484"/>
+          </a:xfrm>
+          <a:prstGeom prst="rect">
+            <a:avLst/>
+          </a:prstGeom>
+          <a:solidFill>
+            <a:schemeClr val="accent4"/>
+          </a:solidFill>
+          <a:ln>
             <a:noFill/>
           </a:ln>
         </p:spPr>
-      </p:pic>
+        <p:style>
+          <a:lnRef idx="2">
+            <a:schemeClr val="accent1">
+              <a:shade val="50000"/>
+            </a:schemeClr>
+          </a:lnRef>
+          <a:fillRef idx="1">
+            <a:schemeClr val="accent1"/>
+          </a:fillRef>
+          <a:effectRef idx="0">
+            <a:schemeClr val="accent1"/>
+          </a:effectRef>
+          <a:fontRef idx="minor">
+            <a:schemeClr val="lt1"/>
+          </a:fontRef>
+        </p:style>
+        <p:txBody>
+          <a:bodyPr/>
+          <a:lstStyle/>
+          <a:p>
+            <a:endParaRPr lang="en-GB"/>
+          </a:p>
+        </p:txBody>
+      </p:sp>
+      <p:sp>
+        <p:nvSpPr>
+          <p:cNvPr id="19" name="Rectangle 18">
+            <a:extLst>
+              <a:ext uri="{FF2B5EF4-FFF2-40B4-BE49-F238E27FC236}">
+                <a16:creationId xmlns:a16="http://schemas.microsoft.com/office/drawing/2014/main" id="{431B6D19-39C5-45BF-8B25-29192C5D1395}"/>
+              </a:ext>
+              <a:ext uri="{C183D7F6-B498-43B3-948B-1728B52AA6E4}">
+                <adec:decorative xmlns:adec="http://schemas.microsoft.com/office/drawing/2017/decorative" val="1"/>
+              </a:ext>
+            </a:extLst>
+          </p:cNvPr>
+          <p:cNvSpPr>
+            <a:spLocks noGrp="1" noRot="1" noChangeAspect="1" noMove="1" noResize="1" noEditPoints="1" noAdjustHandles="1" noChangeArrowheads="1" noChangeShapeType="1" noTextEdit="1"/>
+          </p:cNvSpPr>
+          <p:nvPr>
+            <p:extLst>
+              <p:ext uri="{386F3935-93C4-4BCD-93E2-E3B085C9AB24}">
+                <p16:designElem xmlns:p16="http://schemas.microsoft.com/office/powerpoint/2015/main" val="1"/>
+              </p:ext>
+            </p:extLst>
+          </p:nvPr>
+        </p:nvSpPr>
+        <p:spPr>
+          <a:xfrm>
+            <a:off x="1" y="6400800"/>
+            <a:ext cx="12192000" cy="457200"/>
+          </a:xfrm>
+          <a:prstGeom prst="rect">
+            <a:avLst/>
+          </a:prstGeom>
+          <a:solidFill>
+            <a:schemeClr val="accent4">
+              <a:lumMod val="75000"/>
+            </a:schemeClr>
+          </a:solidFill>
+          <a:ln>
+            <a:noFill/>
+          </a:ln>
+        </p:spPr>
+        <p:style>
+          <a:lnRef idx="2">
+            <a:schemeClr val="accent1">
+              <a:shade val="50000"/>
+            </a:schemeClr>
+          </a:lnRef>
+          <a:fillRef idx="1">
+            <a:schemeClr val="accent1"/>
+          </a:fillRef>
+          <a:effectRef idx="0">
+            <a:schemeClr val="accent1"/>
+          </a:effectRef>
+          <a:fontRef idx="minor">
+            <a:schemeClr val="lt1"/>
+          </a:fontRef>
+        </p:style>
+        <p:txBody>
+          <a:bodyPr/>
+          <a:lstStyle/>
+          <a:p>
+            <a:endParaRPr lang="en-GB"/>
+          </a:p>
+        </p:txBody>
+      </p:sp>
     </p:spTree>
     <p:extLst>
       <p:ext uri="{BB962C8B-B14F-4D97-AF65-F5344CB8AC3E}">
@@ -6310,14 +6893,6 @@
 <file path=ppt/slides/slide2.xml><?xml version="1.0" encoding="utf-8"?>
 <p:sld xmlns:a="http://schemas.openxmlformats.org/drawingml/2006/main" xmlns:r="http://schemas.openxmlformats.org/officeDocument/2006/relationships" xmlns:p="http://schemas.openxmlformats.org/presentationml/2006/main">
   <p:cSld>
-    <p:bg>
-      <p:bgPr>
-        <a:solidFill>
-          <a:schemeClr val="bg1"/>
-        </a:solidFill>
-        <a:effectLst/>
-      </p:bgPr>
-    </p:bg>
     <p:spTree>
       <p:nvGrpSpPr>
         <p:cNvPr id="1" name=""/>
@@ -6351,7 +6926,7 @@
         <p:spPr>
           <a:xfrm>
             <a:off x="1097280" y="286603"/>
-            <a:ext cx="10058400" cy="1450757"/>
+            <a:ext cx="10058400" cy="903005"/>
           </a:xfrm>
         </p:spPr>
         <p:txBody>
@@ -6361,10 +6936,10 @@
           <a:lstStyle/>
           <a:p>
             <a:r>
-              <a:rPr lang="en-US"/>
+              <a:rPr lang="en-US" dirty="0"/>
               <a:t>Agenda	</a:t>
             </a:r>
-            <a:endParaRPr lang="en-GB"/>
+            <a:endParaRPr lang="en-GB" dirty="0"/>
           </a:p>
         </p:txBody>
       </p:sp>
@@ -6854,43 +7429,6 @@
       </p:grpSpPr>
       <p:sp>
         <p:nvSpPr>
-          <p:cNvPr id="2" name="Title 1">
-            <a:extLst>
-              <a:ext uri="{FF2B5EF4-FFF2-40B4-BE49-F238E27FC236}">
-                <a16:creationId xmlns:a16="http://schemas.microsoft.com/office/drawing/2014/main" id="{F6D46A62-CBF9-68D8-6244-B4D9F731BD4E}"/>
-              </a:ext>
-            </a:extLst>
-          </p:cNvPr>
-          <p:cNvSpPr>
-            <a:spLocks noGrp="1"/>
-          </p:cNvSpPr>
-          <p:nvPr>
-            <p:ph type="title"/>
-          </p:nvPr>
-        </p:nvSpPr>
-        <p:spPr>
-          <a:xfrm>
-            <a:off x="1202924" y="408541"/>
-            <a:ext cx="3262544" cy="1112812"/>
-          </a:xfrm>
-        </p:spPr>
-        <p:txBody>
-          <a:bodyPr>
-            <a:normAutofit fontScale="90000"/>
-          </a:bodyPr>
-          <a:lstStyle/>
-          <a:p>
-            <a:pPr algn="ctr"/>
-            <a:r>
-              <a:rPr lang="en-US" dirty="0"/>
-              <a:t>Research Question 1</a:t>
-            </a:r>
-            <a:endParaRPr lang="en-GB" dirty="0"/>
-          </a:p>
-        </p:txBody>
-      </p:sp>
-      <p:sp>
-        <p:nvSpPr>
           <p:cNvPr id="10" name="TextBox 9">
             <a:extLst>
               <a:ext uri="{FF2B5EF4-FFF2-40B4-BE49-F238E27FC236}">
@@ -6903,8 +7441,8 @@
         </p:nvSpPr>
         <p:spPr>
           <a:xfrm>
-            <a:off x="4782693" y="463166"/>
-            <a:ext cx="5805997" cy="1058187"/>
+            <a:off x="5208821" y="349779"/>
+            <a:ext cx="6447559" cy="753075"/>
           </a:xfrm>
           <a:prstGeom prst="rect">
             <a:avLst/>
@@ -6913,7 +7451,7 @@
         </p:spPr>
         <p:txBody>
           <a:bodyPr wrap="square">
-            <a:normAutofit fontScale="92500" lnSpcReduction="10000"/>
+            <a:normAutofit fontScale="85000" lnSpcReduction="10000"/>
           </a:bodyPr>
           <a:lstStyle/>
           <a:p>
@@ -6944,8 +7482,8 @@
         </p:nvSpPr>
         <p:spPr>
           <a:xfrm>
-            <a:off x="4811695" y="408541"/>
-            <a:ext cx="5805997" cy="1112812"/>
+            <a:off x="5237823" y="322467"/>
+            <a:ext cx="6418557" cy="807700"/>
           </a:xfrm>
           <a:prstGeom prst="roundRect">
             <a:avLst/>
@@ -7005,14 +7543,72 @@
         </p:blipFill>
         <p:spPr>
           <a:xfrm>
-            <a:off x="1464815" y="1815945"/>
-            <a:ext cx="9439922" cy="4484957"/>
+            <a:off x="1464815" y="1331651"/>
+            <a:ext cx="9439922" cy="4969252"/>
           </a:xfrm>
           <a:prstGeom prst="rect">
             <a:avLst/>
           </a:prstGeom>
         </p:spPr>
       </p:pic>
+      <p:sp>
+        <p:nvSpPr>
+          <p:cNvPr id="3" name="Title 1">
+            <a:extLst>
+              <a:ext uri="{FF2B5EF4-FFF2-40B4-BE49-F238E27FC236}">
+                <a16:creationId xmlns:a16="http://schemas.microsoft.com/office/drawing/2014/main" id="{6E0278D4-A37C-DE0F-37CD-F271C3D0E448}"/>
+              </a:ext>
+            </a:extLst>
+          </p:cNvPr>
+          <p:cNvSpPr txBox="1">
+            <a:spLocks/>
+          </p:cNvSpPr>
+          <p:nvPr/>
+        </p:nvSpPr>
+        <p:spPr>
+          <a:xfrm>
+            <a:off x="1162975" y="329312"/>
+            <a:ext cx="3959441" cy="719427"/>
+          </a:xfrm>
+          <a:prstGeom prst="rect">
+            <a:avLst/>
+          </a:prstGeom>
+        </p:spPr>
+        <p:txBody>
+          <a:bodyPr vert="horz" lIns="91440" tIns="45720" rIns="91440" bIns="45720" rtlCol="0" anchor="b">
+            <a:normAutofit fontScale="75000" lnSpcReduction="20000"/>
+          </a:bodyPr>
+          <a:lstStyle>
+            <a:lvl1pPr algn="l" defTabSz="914400" rtl="0" eaLnBrk="1" latinLnBrk="0" hangingPunct="1">
+              <a:lnSpc>
+                <a:spcPct val="85000"/>
+              </a:lnSpc>
+              <a:spcBef>
+                <a:spcPct val="0"/>
+              </a:spcBef>
+              <a:buNone/>
+              <a:defRPr sz="4800" kern="1200" spc="-50" baseline="0">
+                <a:solidFill>
+                  <a:schemeClr val="tx1">
+                    <a:lumMod val="75000"/>
+                    <a:lumOff val="25000"/>
+                  </a:schemeClr>
+                </a:solidFill>
+                <a:latin typeface="+mj-lt"/>
+                <a:ea typeface="+mj-ea"/>
+                <a:cs typeface="+mj-cs"/>
+              </a:defRPr>
+            </a:lvl1pPr>
+          </a:lstStyle>
+          <a:p>
+            <a:r>
+              <a:rPr lang="en-US" dirty="0"/>
+              <a:t>Research Question 1</a:t>
+            </a:r>
+            <a:endParaRPr lang="en-GB" dirty="0"/>
+          </a:p>
+        </p:txBody>
+      </p:sp>
     </p:spTree>
     <p:extLst>
       <p:ext uri="{BB962C8B-B14F-4D97-AF65-F5344CB8AC3E}">
@@ -7051,43 +7647,6 @@
       </p:grpSpPr>
       <p:sp>
         <p:nvSpPr>
-          <p:cNvPr id="2" name="Title 1">
-            <a:extLst>
-              <a:ext uri="{FF2B5EF4-FFF2-40B4-BE49-F238E27FC236}">
-                <a16:creationId xmlns:a16="http://schemas.microsoft.com/office/drawing/2014/main" id="{31E878F4-4676-0EB5-3DD7-1EBC366A2B7F}"/>
-              </a:ext>
-            </a:extLst>
-          </p:cNvPr>
-          <p:cNvSpPr>
-            <a:spLocks noGrp="1"/>
-          </p:cNvSpPr>
-          <p:nvPr>
-            <p:ph type="title"/>
-          </p:nvPr>
-        </p:nvSpPr>
-        <p:spPr>
-          <a:xfrm>
-            <a:off x="1202924" y="408541"/>
-            <a:ext cx="3262544" cy="1112812"/>
-          </a:xfrm>
-        </p:spPr>
-        <p:txBody>
-          <a:bodyPr>
-            <a:normAutofit fontScale="90000"/>
-          </a:bodyPr>
-          <a:lstStyle/>
-          <a:p>
-            <a:pPr algn="ctr"/>
-            <a:r>
-              <a:rPr lang="en-US" dirty="0"/>
-              <a:t>Research Question 2</a:t>
-            </a:r>
-            <a:endParaRPr lang="en-GB" dirty="0"/>
-          </a:p>
-        </p:txBody>
-      </p:sp>
-      <p:sp>
-        <p:nvSpPr>
           <p:cNvPr id="15" name="Rectangle: Rounded Corners 14">
             <a:extLst>
               <a:ext uri="{FF2B5EF4-FFF2-40B4-BE49-F238E27FC236}">
@@ -7100,8 +7659,8 @@
         </p:nvSpPr>
         <p:spPr>
           <a:xfrm>
-            <a:off x="4811695" y="408541"/>
-            <a:ext cx="5805997" cy="1112812"/>
+            <a:off x="5273336" y="132620"/>
+            <a:ext cx="6208897" cy="1112812"/>
           </a:xfrm>
           <a:prstGeom prst="roundRect">
             <a:avLst/>
@@ -7147,8 +7706,8 @@
         </p:nvSpPr>
         <p:spPr>
           <a:xfrm>
-            <a:off x="4873840" y="506027"/>
-            <a:ext cx="5592933" cy="987980"/>
+            <a:off x="5335480" y="257452"/>
+            <a:ext cx="5933689" cy="987980"/>
           </a:xfrm>
           <a:prstGeom prst="rect">
             <a:avLst/>
@@ -7157,7 +7716,7 @@
         </p:spPr>
         <p:txBody>
           <a:bodyPr wrap="square">
-            <a:normAutofit fontScale="85000" lnSpcReduction="10000"/>
+            <a:normAutofit fontScale="92500" lnSpcReduction="20000"/>
           </a:bodyPr>
           <a:lstStyle/>
           <a:p>
@@ -7208,14 +7767,72 @@
         </p:blipFill>
         <p:spPr>
           <a:xfrm>
-            <a:off x="878440" y="1826162"/>
-            <a:ext cx="10435119" cy="4373527"/>
+            <a:off x="878440" y="1370264"/>
+            <a:ext cx="10435119" cy="4829425"/>
           </a:xfrm>
           <a:prstGeom prst="rect">
             <a:avLst/>
           </a:prstGeom>
         </p:spPr>
       </p:pic>
+      <p:sp>
+        <p:nvSpPr>
+          <p:cNvPr id="3" name="Title 1">
+            <a:extLst>
+              <a:ext uri="{FF2B5EF4-FFF2-40B4-BE49-F238E27FC236}">
+                <a16:creationId xmlns:a16="http://schemas.microsoft.com/office/drawing/2014/main" id="{F48022CB-9AA6-E5AB-13E3-835BF32A1988}"/>
+              </a:ext>
+            </a:extLst>
+          </p:cNvPr>
+          <p:cNvSpPr txBox="1">
+            <a:spLocks/>
+          </p:cNvSpPr>
+          <p:nvPr/>
+        </p:nvSpPr>
+        <p:spPr>
+          <a:xfrm>
+            <a:off x="1162975" y="329312"/>
+            <a:ext cx="3959441" cy="719427"/>
+          </a:xfrm>
+          <a:prstGeom prst="rect">
+            <a:avLst/>
+          </a:prstGeom>
+        </p:spPr>
+        <p:txBody>
+          <a:bodyPr vert="horz" lIns="91440" tIns="45720" rIns="91440" bIns="45720" rtlCol="0" anchor="b">
+            <a:normAutofit fontScale="75000" lnSpcReduction="20000"/>
+          </a:bodyPr>
+          <a:lstStyle>
+            <a:lvl1pPr algn="l" defTabSz="914400" rtl="0" eaLnBrk="1" latinLnBrk="0" hangingPunct="1">
+              <a:lnSpc>
+                <a:spcPct val="85000"/>
+              </a:lnSpc>
+              <a:spcBef>
+                <a:spcPct val="0"/>
+              </a:spcBef>
+              <a:buNone/>
+              <a:defRPr sz="4800" kern="1200" spc="-50" baseline="0">
+                <a:solidFill>
+                  <a:schemeClr val="tx1">
+                    <a:lumMod val="75000"/>
+                    <a:lumOff val="25000"/>
+                  </a:schemeClr>
+                </a:solidFill>
+                <a:latin typeface="+mj-lt"/>
+                <a:ea typeface="+mj-ea"/>
+                <a:cs typeface="+mj-cs"/>
+              </a:defRPr>
+            </a:lvl1pPr>
+          </a:lstStyle>
+          <a:p>
+            <a:r>
+              <a:rPr lang="en-US" dirty="0"/>
+              <a:t>Research Question 2</a:t>
+            </a:r>
+            <a:endParaRPr lang="en-GB" dirty="0"/>
+          </a:p>
+        </p:txBody>
+      </p:sp>
     </p:spTree>
     <p:extLst>
       <p:ext uri="{BB962C8B-B14F-4D97-AF65-F5344CB8AC3E}">
@@ -7254,43 +7871,6 @@
       </p:grpSpPr>
       <p:sp>
         <p:nvSpPr>
-          <p:cNvPr id="2" name="Title 1">
-            <a:extLst>
-              <a:ext uri="{FF2B5EF4-FFF2-40B4-BE49-F238E27FC236}">
-                <a16:creationId xmlns:a16="http://schemas.microsoft.com/office/drawing/2014/main" id="{1FD7FD30-CABE-80F9-096F-63AAA66F52B5}"/>
-              </a:ext>
-            </a:extLst>
-          </p:cNvPr>
-          <p:cNvSpPr>
-            <a:spLocks noGrp="1"/>
-          </p:cNvSpPr>
-          <p:nvPr>
-            <p:ph type="title"/>
-          </p:nvPr>
-        </p:nvSpPr>
-        <p:spPr>
-          <a:xfrm>
-            <a:off x="1202924" y="408541"/>
-            <a:ext cx="3262544" cy="1112812"/>
-          </a:xfrm>
-        </p:spPr>
-        <p:txBody>
-          <a:bodyPr>
-            <a:normAutofit fontScale="90000"/>
-          </a:bodyPr>
-          <a:lstStyle/>
-          <a:p>
-            <a:pPr algn="ctr"/>
-            <a:r>
-              <a:rPr lang="en-US" dirty="0"/>
-              <a:t>Research Question 3</a:t>
-            </a:r>
-            <a:endParaRPr lang="en-GB" dirty="0"/>
-          </a:p>
-        </p:txBody>
-      </p:sp>
-      <p:sp>
-        <p:nvSpPr>
           <p:cNvPr id="15" name="Rectangle: Rounded Corners 14">
             <a:extLst>
               <a:ext uri="{FF2B5EF4-FFF2-40B4-BE49-F238E27FC236}">
@@ -7303,8 +7883,8 @@
         </p:nvSpPr>
         <p:spPr>
           <a:xfrm>
-            <a:off x="4811695" y="408541"/>
-            <a:ext cx="5805997" cy="1112812"/>
+            <a:off x="5522647" y="267958"/>
+            <a:ext cx="5805997" cy="930696"/>
           </a:xfrm>
           <a:prstGeom prst="roundRect">
             <a:avLst/>
@@ -7350,7 +7930,7 @@
         </p:nvSpPr>
         <p:spPr>
           <a:xfrm>
-            <a:off x="4955955" y="488271"/>
+            <a:off x="5522647" y="267958"/>
             <a:ext cx="5466429" cy="1033081"/>
           </a:xfrm>
           <a:prstGeom prst="rect">
@@ -7407,14 +7987,72 @@
         </p:blipFill>
         <p:spPr>
           <a:xfrm>
-            <a:off x="1779973" y="1800856"/>
-            <a:ext cx="8632054" cy="4272645"/>
+            <a:off x="1779973" y="1438184"/>
+            <a:ext cx="8632054" cy="4635318"/>
           </a:xfrm>
           <a:prstGeom prst="rect">
             <a:avLst/>
           </a:prstGeom>
         </p:spPr>
       </p:pic>
+      <p:sp>
+        <p:nvSpPr>
+          <p:cNvPr id="8" name="Title 1">
+            <a:extLst>
+              <a:ext uri="{FF2B5EF4-FFF2-40B4-BE49-F238E27FC236}">
+                <a16:creationId xmlns:a16="http://schemas.microsoft.com/office/drawing/2014/main" id="{F81BE618-FCDB-5266-C293-407EFD814C8B}"/>
+              </a:ext>
+            </a:extLst>
+          </p:cNvPr>
+          <p:cNvSpPr txBox="1">
+            <a:spLocks/>
+          </p:cNvSpPr>
+          <p:nvPr/>
+        </p:nvSpPr>
+        <p:spPr>
+          <a:xfrm>
+            <a:off x="1162975" y="329312"/>
+            <a:ext cx="3959441" cy="719427"/>
+          </a:xfrm>
+          <a:prstGeom prst="rect">
+            <a:avLst/>
+          </a:prstGeom>
+        </p:spPr>
+        <p:txBody>
+          <a:bodyPr vert="horz" lIns="91440" tIns="45720" rIns="91440" bIns="45720" rtlCol="0" anchor="b">
+            <a:normAutofit fontScale="75000" lnSpcReduction="20000"/>
+          </a:bodyPr>
+          <a:lstStyle>
+            <a:lvl1pPr algn="l" defTabSz="914400" rtl="0" eaLnBrk="1" latinLnBrk="0" hangingPunct="1">
+              <a:lnSpc>
+                <a:spcPct val="85000"/>
+              </a:lnSpc>
+              <a:spcBef>
+                <a:spcPct val="0"/>
+              </a:spcBef>
+              <a:buNone/>
+              <a:defRPr sz="4800" kern="1200" spc="-50" baseline="0">
+                <a:solidFill>
+                  <a:schemeClr val="tx1">
+                    <a:lumMod val="75000"/>
+                    <a:lumOff val="25000"/>
+                  </a:schemeClr>
+                </a:solidFill>
+                <a:latin typeface="+mj-lt"/>
+                <a:ea typeface="+mj-ea"/>
+                <a:cs typeface="+mj-cs"/>
+              </a:defRPr>
+            </a:lvl1pPr>
+          </a:lstStyle>
+          <a:p>
+            <a:r>
+              <a:rPr lang="en-US" dirty="0"/>
+              <a:t>Research Question 3</a:t>
+            </a:r>
+            <a:endParaRPr lang="en-GB" dirty="0"/>
+          </a:p>
+        </p:txBody>
+      </p:sp>
     </p:spTree>
     <p:extLst>
       <p:ext uri="{BB962C8B-B14F-4D97-AF65-F5344CB8AC3E}">
@@ -7451,6 +8089,42 @@
           <a:chExt cx="0" cy="0"/>
         </a:xfrm>
       </p:grpSpPr>
+      <p:pic>
+        <p:nvPicPr>
+          <p:cNvPr id="6" name="Picture 5" descr="A diagram of a cloud computing system&#10;&#10;Description automatically generated">
+            <a:extLst>
+              <a:ext uri="{FF2B5EF4-FFF2-40B4-BE49-F238E27FC236}">
+                <a16:creationId xmlns:a16="http://schemas.microsoft.com/office/drawing/2014/main" id="{3392B3E4-AC63-EB8B-96D5-17FDDBE2504E}"/>
+              </a:ext>
+            </a:extLst>
+          </p:cNvPr>
+          <p:cNvPicPr>
+            <a:picLocks noChangeAspect="1"/>
+          </p:cNvPicPr>
+          <p:nvPr/>
+        </p:nvPicPr>
+        <p:blipFill>
+          <a:blip r:embed="rId2">
+            <a:extLst>
+              <a:ext uri="{28A0092B-C50C-407E-A947-70E740481C1C}">
+                <a14:useLocalDpi xmlns:a14="http://schemas.microsoft.com/office/drawing/2010/main" val="0"/>
+              </a:ext>
+            </a:extLst>
+          </a:blip>
+          <a:stretch>
+            <a:fillRect/>
+          </a:stretch>
+        </p:blipFill>
+        <p:spPr>
+          <a:xfrm>
+            <a:off x="1931404" y="1322772"/>
+            <a:ext cx="8329191" cy="4994051"/>
+          </a:xfrm>
+          <a:prstGeom prst="rect">
+            <a:avLst/>
+          </a:prstGeom>
+        </p:spPr>
+      </p:pic>
       <p:sp>
         <p:nvSpPr>
           <p:cNvPr id="2" name="Title 1">
@@ -7467,105 +8141,23 @@
             <p:ph type="title"/>
           </p:nvPr>
         </p:nvSpPr>
-        <p:spPr/>
-        <p:txBody>
-          <a:bodyPr/>
+        <p:spPr>
+          <a:xfrm>
+            <a:off x="1171852" y="310718"/>
+            <a:ext cx="6782539" cy="827618"/>
+          </a:xfrm>
+        </p:spPr>
+        <p:txBody>
+          <a:bodyPr>
+            <a:normAutofit fontScale="90000"/>
+          </a:bodyPr>
           <a:lstStyle/>
           <a:p>
-            <a:pPr algn="ctr"/>
             <a:r>
               <a:rPr lang="en-US" dirty="0"/>
-              <a:t>Research Questions</a:t>
+              <a:t>Federated Learning Diagram</a:t>
             </a:r>
             <a:endParaRPr lang="en-GB" dirty="0"/>
-          </a:p>
-        </p:txBody>
-      </p:sp>
-      <p:sp>
-        <p:nvSpPr>
-          <p:cNvPr id="3" name="TextBox 2">
-            <a:extLst>
-              <a:ext uri="{FF2B5EF4-FFF2-40B4-BE49-F238E27FC236}">
-                <a16:creationId xmlns:a16="http://schemas.microsoft.com/office/drawing/2014/main" id="{883692FF-0424-E482-2817-86677FBB9EAC}"/>
-              </a:ext>
-            </a:extLst>
-          </p:cNvPr>
-          <p:cNvSpPr txBox="1"/>
-          <p:nvPr/>
-        </p:nvSpPr>
-        <p:spPr>
-          <a:xfrm>
-            <a:off x="5997200" y="5376185"/>
-            <a:ext cx="6094520" cy="928382"/>
-          </a:xfrm>
-          <a:prstGeom prst="rect">
-            <a:avLst/>
-          </a:prstGeom>
-          <a:noFill/>
-        </p:spPr>
-        <p:txBody>
-          <a:bodyPr wrap="square">
-            <a:normAutofit/>
-          </a:bodyPr>
-          <a:lstStyle/>
-          <a:p>
-            <a:pPr algn="ctr"/>
-            <a:r>
-              <a:rPr lang="en-US" dirty="0"/>
-              <a:t>When thinking about robust and resilient FL systems, can blockchain </a:t>
-            </a:r>
-          </a:p>
-          <a:p>
-            <a:endParaRPr lang="en-US" dirty="0"/>
-          </a:p>
-        </p:txBody>
-      </p:sp>
-      <p:sp>
-        <p:nvSpPr>
-          <p:cNvPr id="4" name="Rectangle: Rounded Corners 3">
-            <a:extLst>
-              <a:ext uri="{FF2B5EF4-FFF2-40B4-BE49-F238E27FC236}">
-                <a16:creationId xmlns:a16="http://schemas.microsoft.com/office/drawing/2014/main" id="{34DED446-234A-C834-8B07-E6D1D3AA7F65}"/>
-              </a:ext>
-            </a:extLst>
-          </p:cNvPr>
-          <p:cNvSpPr/>
-          <p:nvPr/>
-        </p:nvSpPr>
-        <p:spPr>
-          <a:xfrm>
-            <a:off x="5997200" y="5338446"/>
-            <a:ext cx="6094520" cy="954485"/>
-          </a:xfrm>
-          <a:prstGeom prst="roundRect">
-            <a:avLst/>
-          </a:prstGeom>
-          <a:noFill/>
-        </p:spPr>
-        <p:style>
-          <a:lnRef idx="2">
-            <a:schemeClr val="accent1">
-              <a:shade val="15000"/>
-            </a:schemeClr>
-          </a:lnRef>
-          <a:fillRef idx="1">
-            <a:schemeClr val="accent1"/>
-          </a:fillRef>
-          <a:effectRef idx="0">
-            <a:schemeClr val="accent1"/>
-          </a:effectRef>
-          <a:fontRef idx="minor">
-            <a:schemeClr val="lt1"/>
-          </a:fontRef>
-        </p:style>
-        <p:txBody>
-          <a:bodyPr rtlCol="0" anchor="ctr">
-            <a:normAutofit/>
-          </a:bodyPr>
-          <a:lstStyle/>
-          <a:p>
-            <a:pPr algn="ctr"/>
-            <a:endParaRPr lang="en-GB"/>
           </a:p>
         </p:txBody>
       </p:sp>

</xml_diff>